<commit_message>
Create a table page (on-going)
</commit_message>
<xml_diff>
--- a/design/DynamoDB Manager.pptx
+++ b/design/DynamoDB Manager.pptx
@@ -205,7 +205,7 @@
             <a:fld id="{3EFBCEC4-59EF-4924-85C6-6463810B52A1}" type="datetimeFigureOut">
               <a:rPr lang="zh-TW" altLang="en-US" smtClean="0"/>
               <a:pPr/>
-              <a:t>2020/5/11</a:t>
+              <a:t>2020/5/12</a:t>
             </a:fld>
             <a:endParaRPr lang="zh-TW" altLang="en-US"/>
           </a:p>
@@ -1315,7 +1315,7 @@
             <a:fld id="{06EDFE59-1DA3-406F-94B4-33B1A2438A5C}" type="datetimeFigureOut">
               <a:rPr lang="zh-TW" altLang="en-US" smtClean="0"/>
               <a:pPr/>
-              <a:t>2020/5/11</a:t>
+              <a:t>2020/5/12</a:t>
             </a:fld>
             <a:endParaRPr lang="zh-TW" altLang="en-US"/>
           </a:p>
@@ -1482,7 +1482,7 @@
             <a:fld id="{06EDFE59-1DA3-406F-94B4-33B1A2438A5C}" type="datetimeFigureOut">
               <a:rPr lang="zh-TW" altLang="en-US" smtClean="0"/>
               <a:pPr/>
-              <a:t>2020/5/11</a:t>
+              <a:t>2020/5/12</a:t>
             </a:fld>
             <a:endParaRPr lang="zh-TW" altLang="en-US"/>
           </a:p>
@@ -1659,7 +1659,7 @@
             <a:fld id="{06EDFE59-1DA3-406F-94B4-33B1A2438A5C}" type="datetimeFigureOut">
               <a:rPr lang="zh-TW" altLang="en-US" smtClean="0"/>
               <a:pPr/>
-              <a:t>2020/5/11</a:t>
+              <a:t>2020/5/12</a:t>
             </a:fld>
             <a:endParaRPr lang="zh-TW" altLang="en-US"/>
           </a:p>
@@ -1826,7 +1826,7 @@
             <a:fld id="{06EDFE59-1DA3-406F-94B4-33B1A2438A5C}" type="datetimeFigureOut">
               <a:rPr lang="zh-TW" altLang="en-US" smtClean="0"/>
               <a:pPr/>
-              <a:t>2020/5/11</a:t>
+              <a:t>2020/5/12</a:t>
             </a:fld>
             <a:endParaRPr lang="zh-TW" altLang="en-US"/>
           </a:p>
@@ -2069,7 +2069,7 @@
             <a:fld id="{06EDFE59-1DA3-406F-94B4-33B1A2438A5C}" type="datetimeFigureOut">
               <a:rPr lang="zh-TW" altLang="en-US" smtClean="0"/>
               <a:pPr/>
-              <a:t>2020/5/11</a:t>
+              <a:t>2020/5/12</a:t>
             </a:fld>
             <a:endParaRPr lang="zh-TW" altLang="en-US"/>
           </a:p>
@@ -2354,7 +2354,7 @@
             <a:fld id="{06EDFE59-1DA3-406F-94B4-33B1A2438A5C}" type="datetimeFigureOut">
               <a:rPr lang="zh-TW" altLang="en-US" smtClean="0"/>
               <a:pPr/>
-              <a:t>2020/5/11</a:t>
+              <a:t>2020/5/12</a:t>
             </a:fld>
             <a:endParaRPr lang="zh-TW" altLang="en-US"/>
           </a:p>
@@ -2773,7 +2773,7 @@
             <a:fld id="{06EDFE59-1DA3-406F-94B4-33B1A2438A5C}" type="datetimeFigureOut">
               <a:rPr lang="zh-TW" altLang="en-US" smtClean="0"/>
               <a:pPr/>
-              <a:t>2020/5/11</a:t>
+              <a:t>2020/5/12</a:t>
             </a:fld>
             <a:endParaRPr lang="zh-TW" altLang="en-US"/>
           </a:p>
@@ -2888,7 +2888,7 @@
             <a:fld id="{06EDFE59-1DA3-406F-94B4-33B1A2438A5C}" type="datetimeFigureOut">
               <a:rPr lang="zh-TW" altLang="en-US" smtClean="0"/>
               <a:pPr/>
-              <a:t>2020/5/11</a:t>
+              <a:t>2020/5/12</a:t>
             </a:fld>
             <a:endParaRPr lang="zh-TW" altLang="en-US"/>
           </a:p>
@@ -2980,7 +2980,7 @@
             <a:fld id="{06EDFE59-1DA3-406F-94B4-33B1A2438A5C}" type="datetimeFigureOut">
               <a:rPr lang="zh-TW" altLang="en-US" smtClean="0"/>
               <a:pPr/>
-              <a:t>2020/5/11</a:t>
+              <a:t>2020/5/12</a:t>
             </a:fld>
             <a:endParaRPr lang="zh-TW" altLang="en-US"/>
           </a:p>
@@ -3254,7 +3254,7 @@
             <a:fld id="{06EDFE59-1DA3-406F-94B4-33B1A2438A5C}" type="datetimeFigureOut">
               <a:rPr lang="zh-TW" altLang="en-US" smtClean="0"/>
               <a:pPr/>
-              <a:t>2020/5/11</a:t>
+              <a:t>2020/5/12</a:t>
             </a:fld>
             <a:endParaRPr lang="zh-TW" altLang="en-US"/>
           </a:p>
@@ -3504,7 +3504,7 @@
             <a:fld id="{06EDFE59-1DA3-406F-94B4-33B1A2438A5C}" type="datetimeFigureOut">
               <a:rPr lang="zh-TW" altLang="en-US" smtClean="0"/>
               <a:pPr/>
-              <a:t>2020/5/11</a:t>
+              <a:t>2020/5/12</a:t>
             </a:fld>
             <a:endParaRPr lang="zh-TW" altLang="en-US"/>
           </a:p>
@@ -3714,7 +3714,7 @@
             <a:fld id="{06EDFE59-1DA3-406F-94B4-33B1A2438A5C}" type="datetimeFigureOut">
               <a:rPr lang="zh-TW" altLang="en-US" smtClean="0"/>
               <a:pPr/>
-              <a:t>2020/5/11</a:t>
+              <a:t>2020/5/12</a:t>
             </a:fld>
             <a:endParaRPr lang="zh-TW" altLang="en-US"/>
           </a:p>
@@ -9776,7 +9776,7 @@
         </p:nvSpPr>
         <p:spPr>
           <a:xfrm>
-            <a:off x="1857356" y="1416594"/>
+            <a:off x="1857356" y="3429000"/>
             <a:ext cx="5643602" cy="1285884"/>
           </a:xfrm>
           <a:prstGeom prst="rect">
@@ -9860,7 +9860,7 @@
         </p:nvSpPr>
         <p:spPr>
           <a:xfrm>
-            <a:off x="1857356" y="1416594"/>
+            <a:off x="1857356" y="3429000"/>
             <a:ext cx="1554785" cy="430887"/>
           </a:xfrm>
           <a:prstGeom prst="rect">
@@ -9890,8 +9890,8 @@
         </p:nvSpPr>
         <p:spPr>
           <a:xfrm>
-            <a:off x="2928926" y="1845222"/>
-            <a:ext cx="4429156" cy="357190"/>
+            <a:off x="3357554" y="3857628"/>
+            <a:ext cx="4000528" cy="357190"/>
           </a:xfrm>
           <a:prstGeom prst="rect">
             <a:avLst/>
@@ -9928,7 +9928,7 @@
                   </a:schemeClr>
                 </a:solidFill>
               </a:rPr>
-              <a:t>Enter attribute name</a:t>
+              <a:t>Choose an attribute…</a:t>
             </a:r>
             <a:endParaRPr lang="zh-TW" altLang="en-US" dirty="0">
               <a:solidFill>
@@ -9942,20 +9942,23 @@
       </p:sp>
       <p:sp>
         <p:nvSpPr>
-          <p:cNvPr id="25" name="矩形 24"/>
+          <p:cNvPr id="26" name="矩形 25"/>
           <p:cNvSpPr/>
           <p:nvPr/>
         </p:nvSpPr>
         <p:spPr>
           <a:xfrm>
-            <a:off x="2928926" y="2273850"/>
-            <a:ext cx="4429156" cy="357190"/>
+            <a:off x="1857356" y="1357298"/>
+            <a:ext cx="5643602" cy="1928826"/>
           </a:xfrm>
           <a:prstGeom prst="rect">
             <a:avLst/>
           </a:prstGeom>
           <a:solidFill>
-            <a:schemeClr val="bg1"/>
+            <a:schemeClr val="accent5">
+              <a:lumMod val="40000"/>
+              <a:lumOff val="60000"/>
+            </a:schemeClr>
           </a:solidFill>
         </p:spPr>
         <p:style>
@@ -9978,67 +9981,6 @@
           <a:bodyPr rtlCol="0" anchor="ctr"/>
           <a:lstStyle/>
           <a:p>
-            <a:r>
-              <a:rPr lang="en-US" altLang="zh-TW" dirty="0" smtClean="0">
-                <a:solidFill>
-                  <a:schemeClr val="bg1">
-                    <a:lumMod val="65000"/>
-                  </a:schemeClr>
-                </a:solidFill>
-              </a:rPr>
-              <a:t>Enter attribute name</a:t>
-            </a:r>
-            <a:endParaRPr lang="zh-TW" altLang="en-US" dirty="0">
-              <a:solidFill>
-                <a:schemeClr val="bg1">
-                  <a:lumMod val="65000"/>
-                </a:schemeClr>
-              </a:solidFill>
-            </a:endParaRPr>
-          </a:p>
-        </p:txBody>
-      </p:sp>
-      <p:sp>
-        <p:nvSpPr>
-          <p:cNvPr id="26" name="矩形 25"/>
-          <p:cNvSpPr/>
-          <p:nvPr/>
-        </p:nvSpPr>
-        <p:spPr>
-          <a:xfrm>
-            <a:off x="1857356" y="2845354"/>
-            <a:ext cx="5643602" cy="1928826"/>
-          </a:xfrm>
-          <a:prstGeom prst="rect">
-            <a:avLst/>
-          </a:prstGeom>
-          <a:solidFill>
-            <a:schemeClr val="accent5">
-              <a:lumMod val="40000"/>
-              <a:lumOff val="60000"/>
-            </a:schemeClr>
-          </a:solidFill>
-        </p:spPr>
-        <p:style>
-          <a:lnRef idx="2">
-            <a:schemeClr val="accent1">
-              <a:shade val="50000"/>
-            </a:schemeClr>
-          </a:lnRef>
-          <a:fillRef idx="1">
-            <a:schemeClr val="accent1"/>
-          </a:fillRef>
-          <a:effectRef idx="0">
-            <a:schemeClr val="accent1"/>
-          </a:effectRef>
-          <a:fontRef idx="minor">
-            <a:schemeClr val="lt1"/>
-          </a:fontRef>
-        </p:style>
-        <p:txBody>
-          <a:bodyPr rtlCol="0" anchor="ctr"/>
-          <a:lstStyle/>
-          <a:p>
             <a:pPr algn="ctr"/>
             <a:endParaRPr lang="zh-TW" altLang="en-US" dirty="0"/>
           </a:p>
@@ -10052,7 +9994,7 @@
         </p:nvSpPr>
         <p:spPr>
           <a:xfrm>
-            <a:off x="1857356" y="2845354"/>
+            <a:off x="1857356" y="1357298"/>
             <a:ext cx="2519601" cy="430887"/>
           </a:xfrm>
           <a:prstGeom prst="rect">
@@ -10082,7 +10024,7 @@
         </p:nvSpPr>
         <p:spPr>
           <a:xfrm>
-            <a:off x="2500298" y="3774048"/>
+            <a:off x="2500298" y="2285992"/>
             <a:ext cx="1143008" cy="369332"/>
           </a:xfrm>
           <a:prstGeom prst="rect">
@@ -10126,7 +10068,7 @@
         </p:nvSpPr>
         <p:spPr>
           <a:xfrm>
-            <a:off x="3786182" y="3774048"/>
+            <a:off x="3786182" y="2285992"/>
             <a:ext cx="3643338" cy="357190"/>
           </a:xfrm>
           <a:prstGeom prst="rect">
@@ -10164,7 +10106,17 @@
                   </a:schemeClr>
                 </a:solidFill>
               </a:rPr>
-              <a:t>Enter attribute name</a:t>
+              <a:t>Enter attribute </a:t>
+            </a:r>
+            <a:r>
+              <a:rPr lang="en-US" altLang="zh-TW" dirty="0" smtClean="0">
+                <a:solidFill>
+                  <a:schemeClr val="bg1">
+                    <a:lumMod val="65000"/>
+                  </a:schemeClr>
+                </a:solidFill>
+              </a:rPr>
+              <a:t>name…</a:t>
             </a:r>
             <a:endParaRPr lang="zh-TW" altLang="en-US" dirty="0">
               <a:solidFill>
@@ -10454,7 +10406,7 @@
         </p:nvSpPr>
         <p:spPr>
           <a:xfrm>
-            <a:off x="7286644" y="571504"/>
+            <a:off x="7358082" y="142852"/>
             <a:ext cx="214314" cy="142876"/>
           </a:xfrm>
           <a:prstGeom prst="flowChartMerge">
@@ -10497,8 +10449,8 @@
         </p:nvSpPr>
         <p:spPr>
           <a:xfrm>
-            <a:off x="1928794" y="1845222"/>
-            <a:ext cx="881973" cy="369332"/>
+            <a:off x="1928794" y="3857628"/>
+            <a:ext cx="1249766" cy="369332"/>
           </a:xfrm>
           <a:prstGeom prst="rect">
             <a:avLst/>
@@ -10521,7 +10473,7 @@
             </a:r>
             <a:r>
               <a:rPr lang="en-US" altLang="zh-TW" dirty="0" smtClean="0"/>
-              <a:t>Hash:</a:t>
+              <a:t>Hash key:</a:t>
             </a:r>
             <a:endParaRPr lang="zh-TW" altLang="en-US" dirty="0"/>
           </a:p>
@@ -10535,8 +10487,8 @@
         </p:nvSpPr>
         <p:spPr>
           <a:xfrm>
-            <a:off x="1928794" y="2273850"/>
-            <a:ext cx="995465" cy="369332"/>
+            <a:off x="1928794" y="4286256"/>
+            <a:ext cx="1363258" cy="369332"/>
           </a:xfrm>
           <a:prstGeom prst="rect">
             <a:avLst/>
@@ -10559,7 +10511,7 @@
             </a:r>
             <a:r>
               <a:rPr lang="en-US" altLang="zh-TW" dirty="0" smtClean="0"/>
-              <a:t>Range:</a:t>
+              <a:t>Range key:</a:t>
             </a:r>
             <a:endParaRPr lang="zh-TW" altLang="en-US" dirty="0"/>
           </a:p>
@@ -10573,7 +10525,7 @@
         </p:nvSpPr>
         <p:spPr>
           <a:xfrm>
-            <a:off x="2000232" y="3774048"/>
+            <a:off x="2000232" y="2285992"/>
             <a:ext cx="304892" cy="369332"/>
           </a:xfrm>
           <a:prstGeom prst="rect">
@@ -10607,7 +10559,7 @@
         </p:nvSpPr>
         <p:spPr>
           <a:xfrm>
-            <a:off x="2500298" y="4274114"/>
+            <a:off x="2500298" y="2786058"/>
             <a:ext cx="1143008" cy="369332"/>
           </a:xfrm>
           <a:prstGeom prst="rect">
@@ -10651,7 +10603,7 @@
         </p:nvSpPr>
         <p:spPr>
           <a:xfrm>
-            <a:off x="3786182" y="4274114"/>
+            <a:off x="3786182" y="2786058"/>
             <a:ext cx="3643338" cy="357190"/>
           </a:xfrm>
           <a:prstGeom prst="rect">
@@ -10689,7 +10641,17 @@
                   </a:schemeClr>
                 </a:solidFill>
               </a:rPr>
-              <a:t>Choose…</a:t>
+              <a:t>Enter attribute </a:t>
+            </a:r>
+            <a:r>
+              <a:rPr lang="en-US" altLang="zh-TW" dirty="0" smtClean="0">
+                <a:solidFill>
+                  <a:schemeClr val="bg1">
+                    <a:lumMod val="65000"/>
+                  </a:schemeClr>
+                </a:solidFill>
+              </a:rPr>
+              <a:t>name…</a:t>
             </a:r>
             <a:endParaRPr lang="zh-TW" altLang="en-US" dirty="0">
               <a:solidFill>
@@ -10709,7 +10671,7 @@
         </p:nvSpPr>
         <p:spPr>
           <a:xfrm>
-            <a:off x="2000232" y="4274114"/>
+            <a:off x="2000232" y="2786058"/>
             <a:ext cx="304892" cy="369332"/>
           </a:xfrm>
           <a:prstGeom prst="rect">
@@ -10737,49 +10699,6 @@
       </p:sp>
       <p:sp>
         <p:nvSpPr>
-          <p:cNvPr id="60" name="流程圖: 合併 59"/>
-          <p:cNvSpPr/>
-          <p:nvPr/>
-        </p:nvSpPr>
-        <p:spPr>
-          <a:xfrm>
-            <a:off x="7143768" y="4416990"/>
-            <a:ext cx="214314" cy="142876"/>
-          </a:xfrm>
-          <a:prstGeom prst="flowChartMerge">
-            <a:avLst/>
-          </a:prstGeom>
-          <a:solidFill>
-            <a:schemeClr val="bg1"/>
-          </a:solidFill>
-        </p:spPr>
-        <p:style>
-          <a:lnRef idx="2">
-            <a:schemeClr val="accent1">
-              <a:shade val="50000"/>
-            </a:schemeClr>
-          </a:lnRef>
-          <a:fillRef idx="1">
-            <a:schemeClr val="accent1"/>
-          </a:fillRef>
-          <a:effectRef idx="0">
-            <a:schemeClr val="accent1"/>
-          </a:effectRef>
-          <a:fontRef idx="minor">
-            <a:schemeClr val="lt1"/>
-          </a:fontRef>
-        </p:style>
-        <p:txBody>
-          <a:bodyPr rtlCol="0" anchor="ctr"/>
-          <a:lstStyle/>
-          <a:p>
-            <a:pPr algn="ctr"/>
-            <a:endParaRPr lang="zh-TW" altLang="en-US"/>
-          </a:p>
-        </p:txBody>
-      </p:sp>
-      <p:sp>
-        <p:nvSpPr>
           <p:cNvPr id="61" name="文字方塊 60"/>
           <p:cNvSpPr txBox="1"/>
           <p:nvPr/>
@@ -10864,7 +10783,7 @@
         </p:nvSpPr>
         <p:spPr>
           <a:xfrm>
-            <a:off x="1928794" y="3345420"/>
+            <a:off x="1928794" y="1857364"/>
             <a:ext cx="561372" cy="369332"/>
           </a:xfrm>
           <a:prstGeom prst="rect">
@@ -10907,7 +10826,7 @@
         </p:nvSpPr>
         <p:spPr>
           <a:xfrm>
-            <a:off x="3500430" y="3202544"/>
+            <a:off x="3917599" y="1714488"/>
             <a:ext cx="1297343" cy="369332"/>
           </a:xfrm>
           <a:prstGeom prst="rect">
@@ -10936,9 +10855,9 @@
           <p:nvPr/>
         </p:nvCxnSpPr>
         <p:spPr>
-          <a:xfrm rot="5400000" flipH="1" flipV="1">
-            <a:off x="3357554" y="3559734"/>
-            <a:ext cx="285752" cy="285752"/>
+          <a:xfrm flipV="1">
+            <a:off x="3357554" y="1928802"/>
+            <a:ext cx="642942" cy="428628"/>
           </a:xfrm>
           <a:prstGeom prst="straightConnector1">
             <a:avLst/>
@@ -10964,14 +10883,14 @@
       </p:cxnSp>
       <p:sp>
         <p:nvSpPr>
-          <p:cNvPr id="43" name="文字方塊 42"/>
+          <p:cNvPr id="37" name="文字方塊 36"/>
           <p:cNvSpPr txBox="1"/>
           <p:nvPr/>
         </p:nvSpPr>
         <p:spPr>
           <a:xfrm>
-            <a:off x="4786314" y="2845354"/>
-            <a:ext cx="2717154" cy="369332"/>
+            <a:off x="1714480" y="0"/>
+            <a:ext cx="1776448" cy="430887"/>
           </a:xfrm>
           <a:prstGeom prst="rect">
             <a:avLst/>
@@ -10985,37 +10904,206 @@
           <a:lstStyle/>
           <a:p>
             <a:r>
-              <a:rPr lang="en-US" altLang="zh-TW" dirty="0" smtClean="0"/>
-              <a:t>(</a:t>
-            </a:r>
-            <a:r>
-              <a:rPr lang="zh-TW" altLang="en-US" dirty="0" smtClean="0"/>
-              <a:t>要自動列出</a:t>
-            </a:r>
-            <a:r>
-              <a:rPr lang="en-US" altLang="zh-TW" dirty="0" smtClean="0"/>
-              <a:t>hash &amp; range)</a:t>
-            </a:r>
-            <a:endParaRPr lang="zh-TW" altLang="en-US" dirty="0"/>
-          </a:p>
-        </p:txBody>
-      </p:sp>
-      <p:sp>
-        <p:nvSpPr>
-          <p:cNvPr id="37" name="文字方塊 36"/>
+              <a:rPr lang="en-US" altLang="zh-TW" sz="2200" dirty="0" smtClean="0"/>
+              <a:t>Create a table</a:t>
+            </a:r>
+            <a:endParaRPr lang="zh-TW" altLang="en-US" sz="2200" b="1" dirty="0"/>
+          </a:p>
+        </p:txBody>
+      </p:sp>
+      <p:sp>
+        <p:nvSpPr>
+          <p:cNvPr id="40" name="矩形 39"/>
+          <p:cNvSpPr/>
+          <p:nvPr/>
+        </p:nvSpPr>
+        <p:spPr>
+          <a:xfrm>
+            <a:off x="3357554" y="4286256"/>
+            <a:ext cx="4000528" cy="357190"/>
+          </a:xfrm>
+          <a:prstGeom prst="rect">
+            <a:avLst/>
+          </a:prstGeom>
+          <a:solidFill>
+            <a:schemeClr val="bg1"/>
+          </a:solidFill>
+        </p:spPr>
+        <p:style>
+          <a:lnRef idx="2">
+            <a:schemeClr val="accent1">
+              <a:shade val="50000"/>
+            </a:schemeClr>
+          </a:lnRef>
+          <a:fillRef idx="1">
+            <a:schemeClr val="accent1"/>
+          </a:fillRef>
+          <a:effectRef idx="0">
+            <a:schemeClr val="accent1"/>
+          </a:effectRef>
+          <a:fontRef idx="minor">
+            <a:schemeClr val="lt1"/>
+          </a:fontRef>
+        </p:style>
+        <p:txBody>
+          <a:bodyPr rtlCol="0" anchor="ctr"/>
+          <a:lstStyle/>
+          <a:p>
+            <a:r>
+              <a:rPr lang="en-US" altLang="zh-TW" dirty="0" smtClean="0">
+                <a:solidFill>
+                  <a:schemeClr val="bg1">
+                    <a:lumMod val="65000"/>
+                  </a:schemeClr>
+                </a:solidFill>
+              </a:rPr>
+              <a:t>Choose </a:t>
+            </a:r>
+            <a:r>
+              <a:rPr lang="en-US" altLang="zh-TW" dirty="0" smtClean="0">
+                <a:solidFill>
+                  <a:schemeClr val="bg1">
+                    <a:lumMod val="65000"/>
+                  </a:schemeClr>
+                </a:solidFill>
+              </a:rPr>
+              <a:t>an </a:t>
+            </a:r>
+            <a:r>
+              <a:rPr lang="en-US" altLang="zh-TW" dirty="0" smtClean="0">
+                <a:solidFill>
+                  <a:schemeClr val="bg1">
+                    <a:lumMod val="65000"/>
+                  </a:schemeClr>
+                </a:solidFill>
+              </a:rPr>
+              <a:t>attribute…</a:t>
+            </a:r>
+            <a:endParaRPr lang="zh-TW" altLang="en-US" dirty="0">
+              <a:solidFill>
+                <a:schemeClr val="bg1">
+                  <a:lumMod val="65000"/>
+                </a:schemeClr>
+              </a:solidFill>
+            </a:endParaRPr>
+          </a:p>
+        </p:txBody>
+      </p:sp>
+      <p:sp>
+        <p:nvSpPr>
+          <p:cNvPr id="45" name="流程圖: 合併 44"/>
+          <p:cNvSpPr/>
+          <p:nvPr/>
+        </p:nvSpPr>
+        <p:spPr>
+          <a:xfrm>
+            <a:off x="7000892" y="4000504"/>
+            <a:ext cx="214314" cy="142876"/>
+          </a:xfrm>
+          <a:prstGeom prst="flowChartMerge">
+            <a:avLst/>
+          </a:prstGeom>
+          <a:solidFill>
+            <a:schemeClr val="bg1"/>
+          </a:solidFill>
+        </p:spPr>
+        <p:style>
+          <a:lnRef idx="2">
+            <a:schemeClr val="accent1">
+              <a:shade val="50000"/>
+            </a:schemeClr>
+          </a:lnRef>
+          <a:fillRef idx="1">
+            <a:schemeClr val="accent1"/>
+          </a:fillRef>
+          <a:effectRef idx="0">
+            <a:schemeClr val="accent1"/>
+          </a:effectRef>
+          <a:fontRef idx="minor">
+            <a:schemeClr val="lt1"/>
+          </a:fontRef>
+        </p:style>
+        <p:txBody>
+          <a:bodyPr rtlCol="0" anchor="ctr"/>
+          <a:lstStyle/>
+          <a:p>
+            <a:pPr algn="ctr"/>
+            <a:endParaRPr lang="zh-TW" altLang="en-US"/>
+          </a:p>
+        </p:txBody>
+      </p:sp>
+      <p:sp>
+        <p:nvSpPr>
+          <p:cNvPr id="46" name="流程圖: 合併 45"/>
+          <p:cNvSpPr/>
+          <p:nvPr/>
+        </p:nvSpPr>
+        <p:spPr>
+          <a:xfrm>
+            <a:off x="7000892" y="4429132"/>
+            <a:ext cx="214314" cy="142876"/>
+          </a:xfrm>
+          <a:prstGeom prst="flowChartMerge">
+            <a:avLst/>
+          </a:prstGeom>
+          <a:solidFill>
+            <a:schemeClr val="bg1"/>
+          </a:solidFill>
+        </p:spPr>
+        <p:style>
+          <a:lnRef idx="2">
+            <a:schemeClr val="accent1">
+              <a:shade val="50000"/>
+            </a:schemeClr>
+          </a:lnRef>
+          <a:fillRef idx="1">
+            <a:schemeClr val="accent1"/>
+          </a:fillRef>
+          <a:effectRef idx="0">
+            <a:schemeClr val="accent1"/>
+          </a:effectRef>
+          <a:fontRef idx="minor">
+            <a:schemeClr val="lt1"/>
+          </a:fontRef>
+        </p:style>
+        <p:txBody>
+          <a:bodyPr rtlCol="0" anchor="ctr"/>
+          <a:lstStyle/>
+          <a:p>
+            <a:pPr algn="ctr"/>
+            <a:endParaRPr lang="zh-TW" altLang="en-US"/>
+          </a:p>
+        </p:txBody>
+      </p:sp>
+      <p:sp>
+        <p:nvSpPr>
+          <p:cNvPr id="47" name="文字方塊 46"/>
           <p:cNvSpPr txBox="1"/>
           <p:nvPr/>
         </p:nvSpPr>
         <p:spPr>
           <a:xfrm>
-            <a:off x="1714480" y="0"/>
-            <a:ext cx="935128" cy="430887"/>
-          </a:xfrm>
-          <a:prstGeom prst="rect">
-            <a:avLst/>
-          </a:prstGeom>
-          <a:noFill/>
-        </p:spPr>
+            <a:off x="2643174" y="1857364"/>
+            <a:ext cx="1091453" cy="369332"/>
+          </a:xfrm>
+          <a:prstGeom prst="rect">
+            <a:avLst/>
+          </a:prstGeom>
+        </p:spPr>
+        <p:style>
+          <a:lnRef idx="2">
+            <a:schemeClr val="accent5"/>
+          </a:lnRef>
+          <a:fillRef idx="1">
+            <a:schemeClr val="lt1"/>
+          </a:fillRef>
+          <a:effectRef idx="0">
+            <a:schemeClr val="accent5"/>
+          </a:effectRef>
+          <a:fontRef idx="minor">
+            <a:schemeClr val="dk1"/>
+          </a:fontRef>
+        </p:style>
         <p:txBody>
           <a:bodyPr wrap="none" rtlCol="0">
             <a:spAutoFit/>
@@ -11023,10 +11111,10 @@
           <a:lstStyle/>
           <a:p>
             <a:r>
-              <a:rPr lang="en-US" altLang="zh-TW" sz="2200" dirty="0" smtClean="0"/>
-              <a:t>Create</a:t>
-            </a:r>
-            <a:endParaRPr lang="zh-TW" altLang="en-US" sz="2200" b="1" dirty="0"/>
+              <a:rPr lang="en-US" altLang="zh-TW" dirty="0" smtClean="0"/>
+              <a:t>Delete All</a:t>
+            </a:r>
+            <a:endParaRPr lang="zh-TW" altLang="en-US" dirty="0"/>
           </a:p>
         </p:txBody>
       </p:sp>

</xml_diff>

<commit_message>
Use ReactJS to build "Delete Tables" page
</commit_message>
<xml_diff>
--- a/design/DynamoDB Manager.pptx
+++ b/design/DynamoDB Manager.pptx
@@ -205,7 +205,7 @@
             <a:fld id="{3EFBCEC4-59EF-4924-85C6-6463810B52A1}" type="datetimeFigureOut">
               <a:rPr lang="zh-TW" altLang="en-US" smtClean="0"/>
               <a:pPr/>
-              <a:t>2020/5/25</a:t>
+              <a:t>2020/5/28</a:t>
             </a:fld>
             <a:endParaRPr lang="zh-TW" altLang="en-US"/>
           </a:p>
@@ -1315,7 +1315,7 @@
             <a:fld id="{06EDFE59-1DA3-406F-94B4-33B1A2438A5C}" type="datetimeFigureOut">
               <a:rPr lang="zh-TW" altLang="en-US" smtClean="0"/>
               <a:pPr/>
-              <a:t>2020/5/25</a:t>
+              <a:t>2020/5/28</a:t>
             </a:fld>
             <a:endParaRPr lang="zh-TW" altLang="en-US"/>
           </a:p>
@@ -1482,7 +1482,7 @@
             <a:fld id="{06EDFE59-1DA3-406F-94B4-33B1A2438A5C}" type="datetimeFigureOut">
               <a:rPr lang="zh-TW" altLang="en-US" smtClean="0"/>
               <a:pPr/>
-              <a:t>2020/5/25</a:t>
+              <a:t>2020/5/28</a:t>
             </a:fld>
             <a:endParaRPr lang="zh-TW" altLang="en-US"/>
           </a:p>
@@ -1659,7 +1659,7 @@
             <a:fld id="{06EDFE59-1DA3-406F-94B4-33B1A2438A5C}" type="datetimeFigureOut">
               <a:rPr lang="zh-TW" altLang="en-US" smtClean="0"/>
               <a:pPr/>
-              <a:t>2020/5/25</a:t>
+              <a:t>2020/5/28</a:t>
             </a:fld>
             <a:endParaRPr lang="zh-TW" altLang="en-US"/>
           </a:p>
@@ -1826,7 +1826,7 @@
             <a:fld id="{06EDFE59-1DA3-406F-94B4-33B1A2438A5C}" type="datetimeFigureOut">
               <a:rPr lang="zh-TW" altLang="en-US" smtClean="0"/>
               <a:pPr/>
-              <a:t>2020/5/25</a:t>
+              <a:t>2020/5/28</a:t>
             </a:fld>
             <a:endParaRPr lang="zh-TW" altLang="en-US"/>
           </a:p>
@@ -2069,7 +2069,7 @@
             <a:fld id="{06EDFE59-1DA3-406F-94B4-33B1A2438A5C}" type="datetimeFigureOut">
               <a:rPr lang="zh-TW" altLang="en-US" smtClean="0"/>
               <a:pPr/>
-              <a:t>2020/5/25</a:t>
+              <a:t>2020/5/28</a:t>
             </a:fld>
             <a:endParaRPr lang="zh-TW" altLang="en-US"/>
           </a:p>
@@ -2354,7 +2354,7 @@
             <a:fld id="{06EDFE59-1DA3-406F-94B4-33B1A2438A5C}" type="datetimeFigureOut">
               <a:rPr lang="zh-TW" altLang="en-US" smtClean="0"/>
               <a:pPr/>
-              <a:t>2020/5/25</a:t>
+              <a:t>2020/5/28</a:t>
             </a:fld>
             <a:endParaRPr lang="zh-TW" altLang="en-US"/>
           </a:p>
@@ -2773,7 +2773,7 @@
             <a:fld id="{06EDFE59-1DA3-406F-94B4-33B1A2438A5C}" type="datetimeFigureOut">
               <a:rPr lang="zh-TW" altLang="en-US" smtClean="0"/>
               <a:pPr/>
-              <a:t>2020/5/25</a:t>
+              <a:t>2020/5/28</a:t>
             </a:fld>
             <a:endParaRPr lang="zh-TW" altLang="en-US"/>
           </a:p>
@@ -2888,7 +2888,7 @@
             <a:fld id="{06EDFE59-1DA3-406F-94B4-33B1A2438A5C}" type="datetimeFigureOut">
               <a:rPr lang="zh-TW" altLang="en-US" smtClean="0"/>
               <a:pPr/>
-              <a:t>2020/5/25</a:t>
+              <a:t>2020/5/28</a:t>
             </a:fld>
             <a:endParaRPr lang="zh-TW" altLang="en-US"/>
           </a:p>
@@ -2980,7 +2980,7 @@
             <a:fld id="{06EDFE59-1DA3-406F-94B4-33B1A2438A5C}" type="datetimeFigureOut">
               <a:rPr lang="zh-TW" altLang="en-US" smtClean="0"/>
               <a:pPr/>
-              <a:t>2020/5/25</a:t>
+              <a:t>2020/5/28</a:t>
             </a:fld>
             <a:endParaRPr lang="zh-TW" altLang="en-US"/>
           </a:p>
@@ -3254,7 +3254,7 @@
             <a:fld id="{06EDFE59-1DA3-406F-94B4-33B1A2438A5C}" type="datetimeFigureOut">
               <a:rPr lang="zh-TW" altLang="en-US" smtClean="0"/>
               <a:pPr/>
-              <a:t>2020/5/25</a:t>
+              <a:t>2020/5/28</a:t>
             </a:fld>
             <a:endParaRPr lang="zh-TW" altLang="en-US"/>
           </a:p>
@@ -3504,7 +3504,7 @@
             <a:fld id="{06EDFE59-1DA3-406F-94B4-33B1A2438A5C}" type="datetimeFigureOut">
               <a:rPr lang="zh-TW" altLang="en-US" smtClean="0"/>
               <a:pPr/>
-              <a:t>2020/5/25</a:t>
+              <a:t>2020/5/28</a:t>
             </a:fld>
             <a:endParaRPr lang="zh-TW" altLang="en-US"/>
           </a:p>
@@ -3714,7 +3714,7 @@
             <a:fld id="{06EDFE59-1DA3-406F-94B4-33B1A2438A5C}" type="datetimeFigureOut">
               <a:rPr lang="zh-TW" altLang="en-US" smtClean="0"/>
               <a:pPr/>
-              <a:t>2020/5/25</a:t>
+              <a:t>2020/5/28</a:t>
             </a:fld>
             <a:endParaRPr lang="zh-TW" altLang="en-US"/>
           </a:p>
@@ -11112,7 +11112,7 @@
         <p:spPr>
           <a:xfrm>
             <a:off x="2285984" y="1071546"/>
-            <a:ext cx="4000528" cy="2428892"/>
+            <a:ext cx="5000660" cy="2428892"/>
           </a:xfrm>
           <a:prstGeom prst="rect">
             <a:avLst/>
@@ -11156,7 +11156,7 @@
         </p:nvSpPr>
         <p:spPr>
           <a:xfrm>
-            <a:off x="5357818" y="2988230"/>
+            <a:off x="6344062" y="2988230"/>
             <a:ext cx="799706" cy="369332"/>
           </a:xfrm>
           <a:prstGeom prst="rect">
@@ -11201,7 +11201,7 @@
         </p:nvGraphicFramePr>
         <p:xfrm>
           <a:off x="2357422" y="1618766"/>
-          <a:ext cx="3786214" cy="1255269"/>
+          <a:ext cx="4857784" cy="1255269"/>
         </p:xfrm>
         <a:graphic>
           <a:graphicData uri="http://schemas.openxmlformats.org/drawingml/2006/table">
@@ -11210,8 +11210,8 @@
                 <a:tableStyleId>{3B4B98B0-60AC-42C2-AFA5-B58CD77FA1E5}</a:tableStyleId>
               </a:tblPr>
               <a:tblGrid>
-                <a:gridCol w="1893107"/>
-                <a:gridCol w="1893107"/>
+                <a:gridCol w="2428892"/>
+                <a:gridCol w="2428892"/>
               </a:tblGrid>
               <a:tr h="418423">
                 <a:tc>
@@ -11451,7 +11451,7 @@
         </p:nvSpPr>
         <p:spPr>
           <a:xfrm>
-            <a:off x="4214810" y="2988230"/>
+            <a:off x="5201054" y="2988230"/>
             <a:ext cx="1040670" cy="369332"/>
           </a:xfrm>
           <a:prstGeom prst="rect">
@@ -11494,7 +11494,7 @@
         </p:nvSpPr>
         <p:spPr>
           <a:xfrm>
-            <a:off x="5929322" y="1214422"/>
+            <a:off x="7000892" y="1214422"/>
             <a:ext cx="214314" cy="142876"/>
           </a:xfrm>
           <a:prstGeom prst="flowChartMerge">
@@ -11567,7 +11567,7 @@
         </p:nvSpPr>
         <p:spPr>
           <a:xfrm>
-            <a:off x="2857488" y="2988230"/>
+            <a:off x="3843732" y="2988230"/>
             <a:ext cx="1282723" cy="369332"/>
           </a:xfrm>
           <a:prstGeom prst="rect">
@@ -11610,7 +11610,7 @@
         </p:nvSpPr>
         <p:spPr>
           <a:xfrm>
-            <a:off x="2357422" y="1142984"/>
+            <a:off x="2786050" y="3000372"/>
             <a:ext cx="893706" cy="369332"/>
           </a:xfrm>
           <a:prstGeom prst="rect">

</xml_diff>

<commit_message>
Form control component: Select
</commit_message>
<xml_diff>
--- a/design/DynamoDB Manager.pptx
+++ b/design/DynamoDB Manager.pptx
@@ -205,7 +205,7 @@
             <a:fld id="{3EFBCEC4-59EF-4924-85C6-6463810B52A1}" type="datetimeFigureOut">
               <a:rPr lang="zh-TW" altLang="en-US" smtClean="0"/>
               <a:pPr/>
-              <a:t>2020/5/28</a:t>
+              <a:t>2020/6/8</a:t>
             </a:fld>
             <a:endParaRPr lang="zh-TW" altLang="en-US"/>
           </a:p>
@@ -1315,7 +1315,7 @@
             <a:fld id="{06EDFE59-1DA3-406F-94B4-33B1A2438A5C}" type="datetimeFigureOut">
               <a:rPr lang="zh-TW" altLang="en-US" smtClean="0"/>
               <a:pPr/>
-              <a:t>2020/5/28</a:t>
+              <a:t>2020/6/8</a:t>
             </a:fld>
             <a:endParaRPr lang="zh-TW" altLang="en-US"/>
           </a:p>
@@ -1482,7 +1482,7 @@
             <a:fld id="{06EDFE59-1DA3-406F-94B4-33B1A2438A5C}" type="datetimeFigureOut">
               <a:rPr lang="zh-TW" altLang="en-US" smtClean="0"/>
               <a:pPr/>
-              <a:t>2020/5/28</a:t>
+              <a:t>2020/6/8</a:t>
             </a:fld>
             <a:endParaRPr lang="zh-TW" altLang="en-US"/>
           </a:p>
@@ -1659,7 +1659,7 @@
             <a:fld id="{06EDFE59-1DA3-406F-94B4-33B1A2438A5C}" type="datetimeFigureOut">
               <a:rPr lang="zh-TW" altLang="en-US" smtClean="0"/>
               <a:pPr/>
-              <a:t>2020/5/28</a:t>
+              <a:t>2020/6/8</a:t>
             </a:fld>
             <a:endParaRPr lang="zh-TW" altLang="en-US"/>
           </a:p>
@@ -1826,7 +1826,7 @@
             <a:fld id="{06EDFE59-1DA3-406F-94B4-33B1A2438A5C}" type="datetimeFigureOut">
               <a:rPr lang="zh-TW" altLang="en-US" smtClean="0"/>
               <a:pPr/>
-              <a:t>2020/5/28</a:t>
+              <a:t>2020/6/8</a:t>
             </a:fld>
             <a:endParaRPr lang="zh-TW" altLang="en-US"/>
           </a:p>
@@ -2069,7 +2069,7 @@
             <a:fld id="{06EDFE59-1DA3-406F-94B4-33B1A2438A5C}" type="datetimeFigureOut">
               <a:rPr lang="zh-TW" altLang="en-US" smtClean="0"/>
               <a:pPr/>
-              <a:t>2020/5/28</a:t>
+              <a:t>2020/6/8</a:t>
             </a:fld>
             <a:endParaRPr lang="zh-TW" altLang="en-US"/>
           </a:p>
@@ -2354,7 +2354,7 @@
             <a:fld id="{06EDFE59-1DA3-406F-94B4-33B1A2438A5C}" type="datetimeFigureOut">
               <a:rPr lang="zh-TW" altLang="en-US" smtClean="0"/>
               <a:pPr/>
-              <a:t>2020/5/28</a:t>
+              <a:t>2020/6/8</a:t>
             </a:fld>
             <a:endParaRPr lang="zh-TW" altLang="en-US"/>
           </a:p>
@@ -2773,7 +2773,7 @@
             <a:fld id="{06EDFE59-1DA3-406F-94B4-33B1A2438A5C}" type="datetimeFigureOut">
               <a:rPr lang="zh-TW" altLang="en-US" smtClean="0"/>
               <a:pPr/>
-              <a:t>2020/5/28</a:t>
+              <a:t>2020/6/8</a:t>
             </a:fld>
             <a:endParaRPr lang="zh-TW" altLang="en-US"/>
           </a:p>
@@ -2888,7 +2888,7 @@
             <a:fld id="{06EDFE59-1DA3-406F-94B4-33B1A2438A5C}" type="datetimeFigureOut">
               <a:rPr lang="zh-TW" altLang="en-US" smtClean="0"/>
               <a:pPr/>
-              <a:t>2020/5/28</a:t>
+              <a:t>2020/6/8</a:t>
             </a:fld>
             <a:endParaRPr lang="zh-TW" altLang="en-US"/>
           </a:p>
@@ -2980,7 +2980,7 @@
             <a:fld id="{06EDFE59-1DA3-406F-94B4-33B1A2438A5C}" type="datetimeFigureOut">
               <a:rPr lang="zh-TW" altLang="en-US" smtClean="0"/>
               <a:pPr/>
-              <a:t>2020/5/28</a:t>
+              <a:t>2020/6/8</a:t>
             </a:fld>
             <a:endParaRPr lang="zh-TW" altLang="en-US"/>
           </a:p>
@@ -3254,7 +3254,7 @@
             <a:fld id="{06EDFE59-1DA3-406F-94B4-33B1A2438A5C}" type="datetimeFigureOut">
               <a:rPr lang="zh-TW" altLang="en-US" smtClean="0"/>
               <a:pPr/>
-              <a:t>2020/5/28</a:t>
+              <a:t>2020/6/8</a:t>
             </a:fld>
             <a:endParaRPr lang="zh-TW" altLang="en-US"/>
           </a:p>
@@ -3504,7 +3504,7 @@
             <a:fld id="{06EDFE59-1DA3-406F-94B4-33B1A2438A5C}" type="datetimeFigureOut">
               <a:rPr lang="zh-TW" altLang="en-US" smtClean="0"/>
               <a:pPr/>
-              <a:t>2020/5/28</a:t>
+              <a:t>2020/6/8</a:t>
             </a:fld>
             <a:endParaRPr lang="zh-TW" altLang="en-US"/>
           </a:p>
@@ -3714,7 +3714,7 @@
             <a:fld id="{06EDFE59-1DA3-406F-94B4-33B1A2438A5C}" type="datetimeFigureOut">
               <a:rPr lang="zh-TW" altLang="en-US" smtClean="0"/>
               <a:pPr/>
-              <a:t>2020/5/28</a:t>
+              <a:t>2020/6/8</a:t>
             </a:fld>
             <a:endParaRPr lang="zh-TW" altLang="en-US"/>
           </a:p>
@@ -6766,8 +6766,8 @@
         </p:nvSpPr>
         <p:spPr>
           <a:xfrm>
-            <a:off x="428596" y="1000108"/>
-            <a:ext cx="8286808" cy="3500462"/>
+            <a:off x="428596" y="1285860"/>
+            <a:ext cx="8286808" cy="4071966"/>
           </a:xfrm>
           <a:prstGeom prst="rect">
             <a:avLst/>
@@ -6841,7 +6841,7 @@
         </p:nvSpPr>
         <p:spPr>
           <a:xfrm>
-            <a:off x="1000100" y="2273825"/>
+            <a:off x="1000100" y="3131081"/>
             <a:ext cx="1261499" cy="369332"/>
           </a:xfrm>
           <a:prstGeom prst="rect">
@@ -6870,7 +6870,11 @@
           <a:p>
             <a:r>
               <a:rPr lang="en-US" altLang="zh-TW" dirty="0" smtClean="0"/>
-              <a:t>Attribute 1:</a:t>
+              <a:t>Attribute </a:t>
+            </a:r>
+            <a:r>
+              <a:rPr lang="en-US" altLang="zh-TW" dirty="0" smtClean="0"/>
+              <a:t>X:</a:t>
             </a:r>
             <a:endParaRPr lang="zh-TW" altLang="en-US" dirty="0"/>
           </a:p>
@@ -6884,7 +6888,7 @@
         </p:nvSpPr>
         <p:spPr>
           <a:xfrm>
-            <a:off x="2857488" y="2273825"/>
+            <a:off x="2857488" y="3131081"/>
             <a:ext cx="5429288" cy="369357"/>
           </a:xfrm>
           <a:prstGeom prst="rect">
@@ -6942,7 +6946,7 @@
         </p:nvSpPr>
         <p:spPr>
           <a:xfrm>
-            <a:off x="2857488" y="2714620"/>
+            <a:off x="2857488" y="3571876"/>
             <a:ext cx="5429288" cy="369357"/>
           </a:xfrm>
           <a:prstGeom prst="rect">
@@ -7000,7 +7004,7 @@
         </p:nvSpPr>
         <p:spPr>
           <a:xfrm>
-            <a:off x="2857488" y="3143248"/>
+            <a:off x="2857488" y="4000504"/>
             <a:ext cx="5429288" cy="369357"/>
           </a:xfrm>
           <a:prstGeom prst="rect">
@@ -7058,7 +7062,7 @@
         </p:nvSpPr>
         <p:spPr>
           <a:xfrm>
-            <a:off x="3857620" y="3273958"/>
+            <a:off x="3857620" y="4131214"/>
             <a:ext cx="214314" cy="142876"/>
           </a:xfrm>
           <a:prstGeom prst="flowChartMerge">
@@ -7101,7 +7105,7 @@
         </p:nvSpPr>
         <p:spPr>
           <a:xfrm>
-            <a:off x="4214810" y="3131082"/>
+            <a:off x="4214810" y="3988338"/>
             <a:ext cx="2374881" cy="369332"/>
           </a:xfrm>
           <a:prstGeom prst="rect">
@@ -7131,7 +7135,7 @@
         </p:nvSpPr>
         <p:spPr>
           <a:xfrm>
-            <a:off x="2330673" y="2273826"/>
+            <a:off x="2330673" y="3131082"/>
             <a:ext cx="428628" cy="369357"/>
           </a:xfrm>
           <a:prstGeom prst="rect">
@@ -7190,7 +7194,7 @@
         </p:nvSpPr>
         <p:spPr>
           <a:xfrm>
-            <a:off x="2330673" y="2702454"/>
+            <a:off x="2330673" y="3559710"/>
             <a:ext cx="428628" cy="369357"/>
           </a:xfrm>
           <a:prstGeom prst="rect">
@@ -7249,7 +7253,7 @@
         </p:nvSpPr>
         <p:spPr>
           <a:xfrm>
-            <a:off x="2330673" y="3131082"/>
+            <a:off x="2330673" y="3988338"/>
             <a:ext cx="428628" cy="369357"/>
           </a:xfrm>
           <a:prstGeom prst="rect">
@@ -7308,7 +7312,7 @@
         </p:nvSpPr>
         <p:spPr>
           <a:xfrm>
-            <a:off x="2259235" y="3714752"/>
+            <a:off x="2259235" y="4572008"/>
             <a:ext cx="2169889" cy="369332"/>
           </a:xfrm>
           <a:prstGeom prst="rect">
@@ -7340,7 +7344,7 @@
         </p:nvCxnSpPr>
         <p:spPr>
           <a:xfrm rot="16200000" flipH="1">
-            <a:off x="2473550" y="3571876"/>
+            <a:off x="2473550" y="4429132"/>
             <a:ext cx="285751" cy="142876"/>
           </a:xfrm>
           <a:prstGeom prst="straightConnector1">
@@ -7373,7 +7377,7 @@
         </p:nvSpPr>
         <p:spPr>
           <a:xfrm>
-            <a:off x="571472" y="1785926"/>
+            <a:off x="571472" y="2643182"/>
             <a:ext cx="2500330" cy="369332"/>
           </a:xfrm>
           <a:prstGeom prst="rect">
@@ -7421,7 +7425,7 @@
         </p:nvSpPr>
         <p:spPr>
           <a:xfrm>
-            <a:off x="2714612" y="1928802"/>
+            <a:off x="2714612" y="2786058"/>
             <a:ext cx="214314" cy="142876"/>
           </a:xfrm>
           <a:prstGeom prst="flowChartMerge">
@@ -7464,7 +7468,7 @@
         </p:nvSpPr>
         <p:spPr>
           <a:xfrm>
-            <a:off x="7523875" y="3631172"/>
+            <a:off x="7523875" y="4488428"/>
             <a:ext cx="762901" cy="369332"/>
           </a:xfrm>
           <a:prstGeom prst="rect">
@@ -7566,8 +7570,8 @@
         </p:nvSpPr>
         <p:spPr>
           <a:xfrm>
-            <a:off x="500034" y="1357298"/>
-            <a:ext cx="1300356" cy="400110"/>
+            <a:off x="500034" y="2214554"/>
+            <a:ext cx="2000548" cy="400110"/>
           </a:xfrm>
           <a:prstGeom prst="rect">
             <a:avLst/>
@@ -7589,7 +7593,7 @@
                   </a:schemeClr>
                 </a:solidFill>
               </a:rPr>
-              <a:t>Conditions</a:t>
+              <a:t>Query Conditions</a:t>
             </a:r>
             <a:endParaRPr lang="zh-TW" altLang="en-US" sz="2000" dirty="0">
               <a:solidFill>
@@ -7610,7 +7614,7 @@
         </p:nvSpPr>
         <p:spPr>
           <a:xfrm>
-            <a:off x="642910" y="2285992"/>
+            <a:off x="642910" y="3143248"/>
             <a:ext cx="304892" cy="369332"/>
           </a:xfrm>
           <a:prstGeom prst="rect">
@@ -7648,7 +7652,7 @@
         </p:nvSpPr>
         <p:spPr>
           <a:xfrm>
-            <a:off x="5462635" y="3631172"/>
+            <a:off x="5462635" y="4488428"/>
             <a:ext cx="1966885" cy="369332"/>
           </a:xfrm>
           <a:prstGeom prst="rect">
@@ -7696,7 +7700,7 @@
         </p:nvSpPr>
         <p:spPr>
           <a:xfrm>
-            <a:off x="8429652" y="1142984"/>
+            <a:off x="8429652" y="1345156"/>
             <a:ext cx="214314" cy="142876"/>
           </a:xfrm>
           <a:prstGeom prst="flowChartMerge">
@@ -7739,7 +7743,7 @@
         </p:nvSpPr>
         <p:spPr>
           <a:xfrm>
-            <a:off x="5286380" y="1214422"/>
+            <a:off x="5286380" y="1416594"/>
             <a:ext cx="2984150" cy="369332"/>
           </a:xfrm>
           <a:prstGeom prst="rect">
@@ -7769,7 +7773,7 @@
         </p:nvCxnSpPr>
         <p:spPr>
           <a:xfrm rot="10800000" flipV="1">
-            <a:off x="8143901" y="1214420"/>
+            <a:off x="8143901" y="1416592"/>
             <a:ext cx="214321" cy="214318"/>
           </a:xfrm>
           <a:prstGeom prst="straightConnector1">
@@ -7802,7 +7806,7 @@
         </p:nvSpPr>
         <p:spPr>
           <a:xfrm>
-            <a:off x="1000100" y="2714620"/>
+            <a:off x="1000100" y="3571876"/>
             <a:ext cx="1261499" cy="369332"/>
           </a:xfrm>
           <a:prstGeom prst="rect">
@@ -7831,7 +7835,11 @@
           <a:p>
             <a:r>
               <a:rPr lang="en-US" altLang="zh-TW" dirty="0" smtClean="0"/>
-              <a:t>Attribute 1:</a:t>
+              <a:t>Attribute </a:t>
+            </a:r>
+            <a:r>
+              <a:rPr lang="en-US" altLang="zh-TW" dirty="0" smtClean="0"/>
+              <a:t>Y:</a:t>
             </a:r>
             <a:endParaRPr lang="zh-TW" altLang="en-US" dirty="0"/>
           </a:p>
@@ -7845,7 +7853,7 @@
         </p:nvSpPr>
         <p:spPr>
           <a:xfrm>
-            <a:off x="642910" y="2726787"/>
+            <a:off x="642910" y="3584043"/>
             <a:ext cx="304892" cy="369332"/>
           </a:xfrm>
           <a:prstGeom prst="rect">
@@ -7883,7 +7891,7 @@
         </p:nvSpPr>
         <p:spPr>
           <a:xfrm>
-            <a:off x="1000100" y="3143248"/>
+            <a:off x="1000100" y="4000504"/>
             <a:ext cx="1261499" cy="369332"/>
           </a:xfrm>
           <a:prstGeom prst="rect">
@@ -7911,8 +7919,12 @@
           <a:lstStyle/>
           <a:p>
             <a:r>
-              <a:rPr lang="en-US" altLang="zh-TW" dirty="0" smtClean="0"/>
-              <a:t>Attribute 1:</a:t>
+              <a:rPr lang="en-US" altLang="zh-TW" smtClean="0"/>
+              <a:t>Attribute </a:t>
+            </a:r>
+            <a:r>
+              <a:rPr lang="en-US" altLang="zh-TW" smtClean="0"/>
+              <a:t>Z:</a:t>
             </a:r>
             <a:endParaRPr lang="zh-TW" altLang="en-US" dirty="0"/>
           </a:p>
@@ -7926,7 +7938,7 @@
         </p:nvSpPr>
         <p:spPr>
           <a:xfrm>
-            <a:off x="642910" y="3155415"/>
+            <a:off x="642910" y="4012671"/>
             <a:ext cx="304892" cy="369332"/>
           </a:xfrm>
           <a:prstGeom prst="rect">
@@ -7964,7 +7976,7 @@
         </p:nvSpPr>
         <p:spPr>
           <a:xfrm>
-            <a:off x="500034" y="4059800"/>
+            <a:off x="500034" y="4917056"/>
             <a:ext cx="1630575" cy="400110"/>
           </a:xfrm>
           <a:prstGeom prst="rect">
@@ -8008,7 +8020,7 @@
         </p:nvSpPr>
         <p:spPr>
           <a:xfrm>
-            <a:off x="1285852" y="4643446"/>
+            <a:off x="1285852" y="5500702"/>
             <a:ext cx="1018227" cy="369332"/>
           </a:xfrm>
           <a:prstGeom prst="rect">
@@ -8046,7 +8058,7 @@
         </p:nvCxnSpPr>
         <p:spPr>
           <a:xfrm rot="16200000" flipH="1">
-            <a:off x="1500167" y="4500570"/>
+            <a:off x="1500167" y="5357826"/>
             <a:ext cx="285751" cy="142876"/>
           </a:xfrm>
           <a:prstGeom prst="straightConnector1">
@@ -8071,6 +8083,145 @@
           </a:fontRef>
         </p:style>
       </p:cxnSp>
+      <p:sp>
+        <p:nvSpPr>
+          <p:cNvPr id="32" name="文字方塊 31"/>
+          <p:cNvSpPr txBox="1"/>
+          <p:nvPr/>
+        </p:nvSpPr>
+        <p:spPr>
+          <a:xfrm>
+            <a:off x="571472" y="1785926"/>
+            <a:ext cx="2500330" cy="369332"/>
+          </a:xfrm>
+          <a:prstGeom prst="rect">
+            <a:avLst/>
+          </a:prstGeom>
+          <a:solidFill>
+            <a:schemeClr val="bg1">
+              <a:lumMod val="85000"/>
+            </a:schemeClr>
+          </a:solidFill>
+        </p:spPr>
+        <p:style>
+          <a:lnRef idx="2">
+            <a:schemeClr val="accent1"/>
+          </a:lnRef>
+          <a:fillRef idx="1">
+            <a:schemeClr val="lt1"/>
+          </a:fillRef>
+          <a:effectRef idx="0">
+            <a:schemeClr val="accent1"/>
+          </a:effectRef>
+          <a:fontRef idx="minor">
+            <a:schemeClr val="dk1"/>
+          </a:fontRef>
+        </p:style>
+        <p:txBody>
+          <a:bodyPr wrap="square" rtlCol="0" anchor="ctr">
+            <a:spAutoFit/>
+          </a:bodyPr>
+          <a:lstStyle/>
+          <a:p>
+            <a:r>
+              <a:rPr lang="en-US" altLang="zh-TW" dirty="0" smtClean="0"/>
+              <a:t>Choose </a:t>
+            </a:r>
+            <a:r>
+              <a:rPr lang="en-US" altLang="zh-TW" dirty="0" smtClean="0"/>
+              <a:t>a table…</a:t>
+            </a:r>
+            <a:endParaRPr lang="zh-TW" altLang="en-US" dirty="0"/>
+          </a:p>
+        </p:txBody>
+      </p:sp>
+      <p:sp>
+        <p:nvSpPr>
+          <p:cNvPr id="33" name="流程圖: 合併 32"/>
+          <p:cNvSpPr/>
+          <p:nvPr/>
+        </p:nvSpPr>
+        <p:spPr>
+          <a:xfrm>
+            <a:off x="2714612" y="1928802"/>
+            <a:ext cx="214314" cy="142876"/>
+          </a:xfrm>
+          <a:prstGeom prst="flowChartMerge">
+            <a:avLst/>
+          </a:prstGeom>
+          <a:solidFill>
+            <a:schemeClr val="bg1"/>
+          </a:solidFill>
+        </p:spPr>
+        <p:style>
+          <a:lnRef idx="2">
+            <a:schemeClr val="accent1">
+              <a:shade val="50000"/>
+            </a:schemeClr>
+          </a:lnRef>
+          <a:fillRef idx="1">
+            <a:schemeClr val="accent1"/>
+          </a:fillRef>
+          <a:effectRef idx="0">
+            <a:schemeClr val="accent1"/>
+          </a:effectRef>
+          <a:fontRef idx="minor">
+            <a:schemeClr val="lt1"/>
+          </a:fontRef>
+        </p:style>
+        <p:txBody>
+          <a:bodyPr rtlCol="0" anchor="ctr"/>
+          <a:lstStyle/>
+          <a:p>
+            <a:pPr algn="ctr"/>
+            <a:endParaRPr lang="zh-TW" altLang="en-US"/>
+          </a:p>
+        </p:txBody>
+      </p:sp>
+      <p:sp>
+        <p:nvSpPr>
+          <p:cNvPr id="34" name="文字方塊 33"/>
+          <p:cNvSpPr txBox="1"/>
+          <p:nvPr/>
+        </p:nvSpPr>
+        <p:spPr>
+          <a:xfrm>
+            <a:off x="500034" y="1357298"/>
+            <a:ext cx="1414939" cy="400110"/>
+          </a:xfrm>
+          <a:prstGeom prst="rect">
+            <a:avLst/>
+          </a:prstGeom>
+          <a:noFill/>
+        </p:spPr>
+        <p:txBody>
+          <a:bodyPr wrap="none" rtlCol="0">
+            <a:spAutoFit/>
+          </a:bodyPr>
+          <a:lstStyle/>
+          <a:p>
+            <a:r>
+              <a:rPr lang="en-US" altLang="zh-TW" sz="2000" dirty="0" smtClean="0">
+                <a:solidFill>
+                  <a:schemeClr val="tx2">
+                    <a:lumMod val="60000"/>
+                    <a:lumOff val="40000"/>
+                  </a:schemeClr>
+                </a:solidFill>
+              </a:rPr>
+              <a:t>Table Name</a:t>
+            </a:r>
+            <a:endParaRPr lang="zh-TW" altLang="en-US" sz="2000" dirty="0">
+              <a:solidFill>
+                <a:schemeClr val="tx2">
+                  <a:lumMod val="60000"/>
+                  <a:lumOff val="40000"/>
+                </a:schemeClr>
+              </a:solidFill>
+            </a:endParaRPr>
+          </a:p>
+        </p:txBody>
+      </p:sp>
     </p:spTree>
   </p:cSld>
   <p:clrMapOvr>

</xml_diff>

<commit_message>
Update item mothod: delete/edit/undo (on-going)
</commit_message>
<xml_diff>
--- a/design/DynamoDB Manager.pptx
+++ b/design/DynamoDB Manager.pptx
@@ -5,7 +5,7 @@
     <p:sldMasterId id="2147483648" r:id="rId1"/>
   </p:sldMasterIdLst>
   <p:notesMasterIdLst>
-    <p:notesMasterId r:id="rId18"/>
+    <p:notesMasterId r:id="rId19"/>
   </p:notesMasterIdLst>
   <p:sldIdLst>
     <p:sldId id="256" r:id="rId2"/>
@@ -24,6 +24,7 @@
     <p:sldId id="274" r:id="rId15"/>
     <p:sldId id="279" r:id="rId16"/>
     <p:sldId id="282" r:id="rId17"/>
+    <p:sldId id="283" r:id="rId18"/>
   </p:sldIdLst>
   <p:sldSz cx="9144000" cy="6858000" type="screen4x3"/>
   <p:notesSz cx="6858000" cy="9144000"/>
@@ -208,7 +209,7 @@
             <a:fld id="{3EFBCEC4-59EF-4924-85C6-6463810B52A1}" type="datetimeFigureOut">
               <a:rPr lang="zh-TW" altLang="en-US" smtClean="0"/>
               <a:pPr/>
-              <a:t>2020/6/17</a:t>
+              <a:t>2020/6/18</a:t>
             </a:fld>
             <a:endParaRPr lang="zh-TW" altLang="en-US"/>
           </a:p>
@@ -1318,7 +1319,7 @@
             <a:fld id="{06EDFE59-1DA3-406F-94B4-33B1A2438A5C}" type="datetimeFigureOut">
               <a:rPr lang="zh-TW" altLang="en-US" smtClean="0"/>
               <a:pPr/>
-              <a:t>2020/6/17</a:t>
+              <a:t>2020/6/18</a:t>
             </a:fld>
             <a:endParaRPr lang="zh-TW" altLang="en-US"/>
           </a:p>
@@ -1485,7 +1486,7 @@
             <a:fld id="{06EDFE59-1DA3-406F-94B4-33B1A2438A5C}" type="datetimeFigureOut">
               <a:rPr lang="zh-TW" altLang="en-US" smtClean="0"/>
               <a:pPr/>
-              <a:t>2020/6/17</a:t>
+              <a:t>2020/6/18</a:t>
             </a:fld>
             <a:endParaRPr lang="zh-TW" altLang="en-US"/>
           </a:p>
@@ -1662,7 +1663,7 @@
             <a:fld id="{06EDFE59-1DA3-406F-94B4-33B1A2438A5C}" type="datetimeFigureOut">
               <a:rPr lang="zh-TW" altLang="en-US" smtClean="0"/>
               <a:pPr/>
-              <a:t>2020/6/17</a:t>
+              <a:t>2020/6/18</a:t>
             </a:fld>
             <a:endParaRPr lang="zh-TW" altLang="en-US"/>
           </a:p>
@@ -1829,7 +1830,7 @@
             <a:fld id="{06EDFE59-1DA3-406F-94B4-33B1A2438A5C}" type="datetimeFigureOut">
               <a:rPr lang="zh-TW" altLang="en-US" smtClean="0"/>
               <a:pPr/>
-              <a:t>2020/6/17</a:t>
+              <a:t>2020/6/18</a:t>
             </a:fld>
             <a:endParaRPr lang="zh-TW" altLang="en-US"/>
           </a:p>
@@ -2072,7 +2073,7 @@
             <a:fld id="{06EDFE59-1DA3-406F-94B4-33B1A2438A5C}" type="datetimeFigureOut">
               <a:rPr lang="zh-TW" altLang="en-US" smtClean="0"/>
               <a:pPr/>
-              <a:t>2020/6/17</a:t>
+              <a:t>2020/6/18</a:t>
             </a:fld>
             <a:endParaRPr lang="zh-TW" altLang="en-US"/>
           </a:p>
@@ -2357,7 +2358,7 @@
             <a:fld id="{06EDFE59-1DA3-406F-94B4-33B1A2438A5C}" type="datetimeFigureOut">
               <a:rPr lang="zh-TW" altLang="en-US" smtClean="0"/>
               <a:pPr/>
-              <a:t>2020/6/17</a:t>
+              <a:t>2020/6/18</a:t>
             </a:fld>
             <a:endParaRPr lang="zh-TW" altLang="en-US"/>
           </a:p>
@@ -2776,7 +2777,7 @@
             <a:fld id="{06EDFE59-1DA3-406F-94B4-33B1A2438A5C}" type="datetimeFigureOut">
               <a:rPr lang="zh-TW" altLang="en-US" smtClean="0"/>
               <a:pPr/>
-              <a:t>2020/6/17</a:t>
+              <a:t>2020/6/18</a:t>
             </a:fld>
             <a:endParaRPr lang="zh-TW" altLang="en-US"/>
           </a:p>
@@ -2891,7 +2892,7 @@
             <a:fld id="{06EDFE59-1DA3-406F-94B4-33B1A2438A5C}" type="datetimeFigureOut">
               <a:rPr lang="zh-TW" altLang="en-US" smtClean="0"/>
               <a:pPr/>
-              <a:t>2020/6/17</a:t>
+              <a:t>2020/6/18</a:t>
             </a:fld>
             <a:endParaRPr lang="zh-TW" altLang="en-US"/>
           </a:p>
@@ -2983,7 +2984,7 @@
             <a:fld id="{06EDFE59-1DA3-406F-94B4-33B1A2438A5C}" type="datetimeFigureOut">
               <a:rPr lang="zh-TW" altLang="en-US" smtClean="0"/>
               <a:pPr/>
-              <a:t>2020/6/17</a:t>
+              <a:t>2020/6/18</a:t>
             </a:fld>
             <a:endParaRPr lang="zh-TW" altLang="en-US"/>
           </a:p>
@@ -3257,7 +3258,7 @@
             <a:fld id="{06EDFE59-1DA3-406F-94B4-33B1A2438A5C}" type="datetimeFigureOut">
               <a:rPr lang="zh-TW" altLang="en-US" smtClean="0"/>
               <a:pPr/>
-              <a:t>2020/6/17</a:t>
+              <a:t>2020/6/18</a:t>
             </a:fld>
             <a:endParaRPr lang="zh-TW" altLang="en-US"/>
           </a:p>
@@ -3507,7 +3508,7 @@
             <a:fld id="{06EDFE59-1DA3-406F-94B4-33B1A2438A5C}" type="datetimeFigureOut">
               <a:rPr lang="zh-TW" altLang="en-US" smtClean="0"/>
               <a:pPr/>
-              <a:t>2020/6/17</a:t>
+              <a:t>2020/6/18</a:t>
             </a:fld>
             <a:endParaRPr lang="zh-TW" altLang="en-US"/>
           </a:p>
@@ -3722,7 +3723,7 @@
             <a:fld id="{06EDFE59-1DA3-406F-94B4-33B1A2438A5C}" type="datetimeFigureOut">
               <a:rPr lang="zh-TW" altLang="en-US" smtClean="0"/>
               <a:pPr/>
-              <a:t>2020/6/17</a:t>
+              <a:t>2020/6/18</a:t>
             </a:fld>
             <a:endParaRPr lang="zh-TW" altLang="en-US"/>
           </a:p>
@@ -9842,1087 +9843,7 @@
 </p:sld>
 </file>
 
-<file path=ppt/slides/slide2.xml><?xml version="1.0" encoding="utf-8"?>
-<p:sld xmlns:a="http://schemas.openxmlformats.org/drawingml/2006/main" xmlns:r="http://schemas.openxmlformats.org/officeDocument/2006/relationships" xmlns:p="http://schemas.openxmlformats.org/presentationml/2006/main">
-  <p:cSld>
-    <p:spTree>
-      <p:nvGrpSpPr>
-        <p:cNvPr id="1" name=""/>
-        <p:cNvGrpSpPr/>
-        <p:nvPr/>
-      </p:nvGrpSpPr>
-      <p:grpSpPr>
-        <a:xfrm>
-          <a:off x="0" y="0"/>
-          <a:ext cx="0" cy="0"/>
-          <a:chOff x="0" y="0"/>
-          <a:chExt cx="0" cy="0"/>
-        </a:xfrm>
-      </p:grpSpPr>
-      <p:sp>
-        <p:nvSpPr>
-          <p:cNvPr id="28" name="文字方塊 27"/>
-          <p:cNvSpPr txBox="1"/>
-          <p:nvPr/>
-        </p:nvSpPr>
-        <p:spPr>
-          <a:xfrm>
-            <a:off x="3428992" y="0"/>
-            <a:ext cx="2996782" cy="492443"/>
-          </a:xfrm>
-          <a:prstGeom prst="rect">
-            <a:avLst/>
-          </a:prstGeom>
-          <a:noFill/>
-        </p:spPr>
-        <p:txBody>
-          <a:bodyPr wrap="none" rtlCol="0">
-            <a:spAutoFit/>
-          </a:bodyPr>
-          <a:lstStyle/>
-          <a:p>
-            <a:r>
-              <a:rPr lang="en-US" altLang="zh-TW" sz="2600" dirty="0" err="1" smtClean="0"/>
-              <a:t>DynamoDB</a:t>
-            </a:r>
-            <a:r>
-              <a:rPr lang="en-US" altLang="zh-TW" sz="2600" dirty="0" smtClean="0"/>
-              <a:t> Manager</a:t>
-            </a:r>
-            <a:endParaRPr lang="zh-TW" altLang="en-US" sz="2600" dirty="0"/>
-          </a:p>
-        </p:txBody>
-      </p:sp>
-      <p:sp>
-        <p:nvSpPr>
-          <p:cNvPr id="19" name="文字方塊 18"/>
-          <p:cNvSpPr txBox="1"/>
-          <p:nvPr/>
-        </p:nvSpPr>
-        <p:spPr>
-          <a:xfrm>
-            <a:off x="428596" y="642918"/>
-            <a:ext cx="1661160" cy="430887"/>
-          </a:xfrm>
-          <a:prstGeom prst="rect">
-            <a:avLst/>
-          </a:prstGeom>
-          <a:solidFill>
-            <a:schemeClr val="bg1">
-              <a:lumMod val="95000"/>
-            </a:schemeClr>
-          </a:solidFill>
-          <a:ln>
-            <a:solidFill>
-              <a:schemeClr val="bg1">
-                <a:lumMod val="65000"/>
-              </a:schemeClr>
-            </a:solidFill>
-          </a:ln>
-        </p:spPr>
-        <p:txBody>
-          <a:bodyPr wrap="none" rtlCol="0">
-            <a:spAutoFit/>
-          </a:bodyPr>
-          <a:lstStyle/>
-          <a:p>
-            <a:r>
-              <a:rPr lang="en-US" altLang="zh-TW" sz="2200" dirty="0" smtClean="0"/>
-              <a:t>DB</a:t>
-            </a:r>
-            <a:r>
-              <a:rPr lang="zh-TW" altLang="en-US" sz="2200" dirty="0" smtClean="0"/>
-              <a:t> </a:t>
-            </a:r>
-            <a:r>
-              <a:rPr lang="en-US" altLang="zh-TW" sz="2200" dirty="0" smtClean="0"/>
-              <a:t>Overview</a:t>
-            </a:r>
-            <a:endParaRPr lang="zh-TW" altLang="en-US" sz="2200" dirty="0"/>
-          </a:p>
-        </p:txBody>
-      </p:sp>
-      <p:sp>
-        <p:nvSpPr>
-          <p:cNvPr id="20" name="文字方塊 19"/>
-          <p:cNvSpPr txBox="1"/>
-          <p:nvPr/>
-        </p:nvSpPr>
-        <p:spPr>
-          <a:xfrm>
-            <a:off x="2087217" y="642918"/>
-            <a:ext cx="1891480" cy="430887"/>
-          </a:xfrm>
-          <a:prstGeom prst="rect">
-            <a:avLst/>
-          </a:prstGeom>
-          <a:noFill/>
-          <a:ln>
-            <a:solidFill>
-              <a:schemeClr val="bg1">
-                <a:lumMod val="65000"/>
-              </a:schemeClr>
-            </a:solidFill>
-          </a:ln>
-        </p:spPr>
-        <p:txBody>
-          <a:bodyPr wrap="none" rtlCol="0">
-            <a:spAutoFit/>
-          </a:bodyPr>
-          <a:lstStyle/>
-          <a:p>
-            <a:r>
-              <a:rPr lang="en-US" altLang="zh-TW" sz="2200" dirty="0" smtClean="0"/>
-              <a:t>Manage Tables</a:t>
-            </a:r>
-            <a:endParaRPr lang="zh-TW" altLang="en-US" sz="2200" dirty="0"/>
-          </a:p>
-        </p:txBody>
-      </p:sp>
-      <p:sp>
-        <p:nvSpPr>
-          <p:cNvPr id="21" name="文字方塊 20"/>
-          <p:cNvSpPr txBox="1"/>
-          <p:nvPr/>
-        </p:nvSpPr>
-        <p:spPr>
-          <a:xfrm>
-            <a:off x="3944605" y="642918"/>
-            <a:ext cx="2484783" cy="430887"/>
-          </a:xfrm>
-          <a:prstGeom prst="rect">
-            <a:avLst/>
-          </a:prstGeom>
-          <a:noFill/>
-          <a:ln>
-            <a:solidFill>
-              <a:schemeClr val="bg1">
-                <a:lumMod val="65000"/>
-              </a:schemeClr>
-            </a:solidFill>
-          </a:ln>
-        </p:spPr>
-        <p:txBody>
-          <a:bodyPr wrap="none" rtlCol="0">
-            <a:spAutoFit/>
-          </a:bodyPr>
-          <a:lstStyle/>
-          <a:p>
-            <a:r>
-              <a:rPr lang="en-US" altLang="zh-TW" sz="2200" dirty="0" smtClean="0"/>
-              <a:t>Manage Table Items</a:t>
-            </a:r>
-            <a:endParaRPr lang="zh-TW" altLang="en-US" sz="2200" dirty="0"/>
-          </a:p>
-        </p:txBody>
-      </p:sp>
-      <p:sp>
-        <p:nvSpPr>
-          <p:cNvPr id="22" name="矩形 21"/>
-          <p:cNvSpPr/>
-          <p:nvPr/>
-        </p:nvSpPr>
-        <p:spPr>
-          <a:xfrm>
-            <a:off x="428596" y="1071546"/>
-            <a:ext cx="8286808" cy="2714644"/>
-          </a:xfrm>
-          <a:prstGeom prst="rect">
-            <a:avLst/>
-          </a:prstGeom>
-          <a:solidFill>
-            <a:schemeClr val="bg1">
-              <a:lumMod val="95000"/>
-            </a:schemeClr>
-          </a:solidFill>
-        </p:spPr>
-        <p:style>
-          <a:lnRef idx="2">
-            <a:schemeClr val="accent1">
-              <a:shade val="50000"/>
-            </a:schemeClr>
-          </a:lnRef>
-          <a:fillRef idx="1">
-            <a:schemeClr val="accent1"/>
-          </a:fillRef>
-          <a:effectRef idx="0">
-            <a:schemeClr val="accent1"/>
-          </a:effectRef>
-          <a:fontRef idx="minor">
-            <a:schemeClr val="lt1"/>
-          </a:fontRef>
-        </p:style>
-        <p:txBody>
-          <a:bodyPr rtlCol="0" anchor="ctr"/>
-          <a:lstStyle/>
-          <a:p>
-            <a:pPr algn="ctr"/>
-            <a:endParaRPr lang="zh-TW" altLang="en-US" dirty="0"/>
-          </a:p>
-        </p:txBody>
-      </p:sp>
-      <p:sp>
-        <p:nvSpPr>
-          <p:cNvPr id="23" name="文字方塊 22"/>
-          <p:cNvSpPr txBox="1"/>
-          <p:nvPr/>
-        </p:nvSpPr>
-        <p:spPr>
-          <a:xfrm>
-            <a:off x="571472" y="1214422"/>
-            <a:ext cx="2679580" cy="430887"/>
-          </a:xfrm>
-          <a:prstGeom prst="rect">
-            <a:avLst/>
-          </a:prstGeom>
-          <a:noFill/>
-        </p:spPr>
-        <p:txBody>
-          <a:bodyPr wrap="none" rtlCol="0">
-            <a:spAutoFit/>
-          </a:bodyPr>
-          <a:lstStyle/>
-          <a:p>
-            <a:r>
-              <a:rPr lang="en-US" altLang="zh-TW" sz="2200" dirty="0" smtClean="0"/>
-              <a:t>DB Name: My Test DB</a:t>
-            </a:r>
-            <a:endParaRPr lang="zh-TW" altLang="en-US" sz="2200" dirty="0"/>
-          </a:p>
-        </p:txBody>
-      </p:sp>
-      <p:sp>
-        <p:nvSpPr>
-          <p:cNvPr id="24" name="文字方塊 23"/>
-          <p:cNvSpPr txBox="1"/>
-          <p:nvPr/>
-        </p:nvSpPr>
-        <p:spPr>
-          <a:xfrm>
-            <a:off x="571472" y="1785926"/>
-            <a:ext cx="2076594" cy="430887"/>
-          </a:xfrm>
-          <a:prstGeom prst="rect">
-            <a:avLst/>
-          </a:prstGeom>
-          <a:noFill/>
-        </p:spPr>
-        <p:txBody>
-          <a:bodyPr wrap="none" rtlCol="0">
-            <a:spAutoFit/>
-          </a:bodyPr>
-          <a:lstStyle/>
-          <a:p>
-            <a:r>
-              <a:rPr lang="en-US" altLang="zh-TW" sz="2200" dirty="0" smtClean="0"/>
-              <a:t>Table Number: 5</a:t>
-            </a:r>
-            <a:endParaRPr lang="zh-TW" altLang="en-US" sz="2200" dirty="0"/>
-          </a:p>
-        </p:txBody>
-      </p:sp>
-      <p:sp>
-        <p:nvSpPr>
-          <p:cNvPr id="25" name="文字方塊 24"/>
-          <p:cNvSpPr txBox="1"/>
-          <p:nvPr/>
-        </p:nvSpPr>
-        <p:spPr>
-          <a:xfrm>
-            <a:off x="571472" y="2357430"/>
-            <a:ext cx="1239506" cy="430887"/>
-          </a:xfrm>
-          <a:prstGeom prst="rect">
-            <a:avLst/>
-          </a:prstGeom>
-          <a:noFill/>
-        </p:spPr>
-        <p:txBody>
-          <a:bodyPr wrap="none" rtlCol="0">
-            <a:spAutoFit/>
-          </a:bodyPr>
-          <a:lstStyle/>
-          <a:p>
-            <a:r>
-              <a:rPr lang="en-US" altLang="zh-TW" sz="2200" dirty="0" smtClean="0"/>
-              <a:t>Size: 1GB</a:t>
-            </a:r>
-            <a:endParaRPr lang="zh-TW" altLang="en-US" sz="2200" dirty="0"/>
-          </a:p>
-        </p:txBody>
-      </p:sp>
-    </p:spTree>
-  </p:cSld>
-  <p:clrMapOvr>
-    <a:masterClrMapping/>
-  </p:clrMapOvr>
-</p:sld>
-</file>
-
-<file path=ppt/slides/slide3.xml><?xml version="1.0" encoding="utf-8"?>
-<p:sld xmlns:a="http://schemas.openxmlformats.org/drawingml/2006/main" xmlns:r="http://schemas.openxmlformats.org/officeDocument/2006/relationships" xmlns:p="http://schemas.openxmlformats.org/presentationml/2006/main">
-  <p:cSld>
-    <p:spTree>
-      <p:nvGrpSpPr>
-        <p:cNvPr id="1" name=""/>
-        <p:cNvGrpSpPr/>
-        <p:nvPr/>
-      </p:nvGrpSpPr>
-      <p:grpSpPr>
-        <a:xfrm>
-          <a:off x="0" y="0"/>
-          <a:ext cx="0" cy="0"/>
-          <a:chOff x="0" y="0"/>
-          <a:chExt cx="0" cy="0"/>
-        </a:xfrm>
-      </p:grpSpPr>
-      <p:sp>
-        <p:nvSpPr>
-          <p:cNvPr id="28" name="文字方塊 27"/>
-          <p:cNvSpPr txBox="1"/>
-          <p:nvPr/>
-        </p:nvSpPr>
-        <p:spPr>
-          <a:xfrm>
-            <a:off x="3428992" y="0"/>
-            <a:ext cx="2996782" cy="492443"/>
-          </a:xfrm>
-          <a:prstGeom prst="rect">
-            <a:avLst/>
-          </a:prstGeom>
-          <a:noFill/>
-        </p:spPr>
-        <p:txBody>
-          <a:bodyPr wrap="none" rtlCol="0">
-            <a:spAutoFit/>
-          </a:bodyPr>
-          <a:lstStyle/>
-          <a:p>
-            <a:r>
-              <a:rPr lang="en-US" altLang="zh-TW" sz="2600" dirty="0" err="1" smtClean="0"/>
-              <a:t>DynamoDB</a:t>
-            </a:r>
-            <a:r>
-              <a:rPr lang="en-US" altLang="zh-TW" sz="2600" dirty="0" smtClean="0"/>
-              <a:t> Manager</a:t>
-            </a:r>
-            <a:endParaRPr lang="zh-TW" altLang="en-US" sz="2600" dirty="0"/>
-          </a:p>
-        </p:txBody>
-      </p:sp>
-      <p:sp>
-        <p:nvSpPr>
-          <p:cNvPr id="33" name="矩形 32"/>
-          <p:cNvSpPr/>
-          <p:nvPr/>
-        </p:nvSpPr>
-        <p:spPr>
-          <a:xfrm>
-            <a:off x="428596" y="1071546"/>
-            <a:ext cx="8286808" cy="2143140"/>
-          </a:xfrm>
-          <a:prstGeom prst="rect">
-            <a:avLst/>
-          </a:prstGeom>
-          <a:solidFill>
-            <a:schemeClr val="bg1">
-              <a:lumMod val="95000"/>
-            </a:schemeClr>
-          </a:solidFill>
-        </p:spPr>
-        <p:style>
-          <a:lnRef idx="2">
-            <a:schemeClr val="accent1">
-              <a:shade val="50000"/>
-            </a:schemeClr>
-          </a:lnRef>
-          <a:fillRef idx="1">
-            <a:schemeClr val="accent1"/>
-          </a:fillRef>
-          <a:effectRef idx="0">
-            <a:schemeClr val="accent1"/>
-          </a:effectRef>
-          <a:fontRef idx="minor">
-            <a:schemeClr val="lt1"/>
-          </a:fontRef>
-        </p:style>
-        <p:txBody>
-          <a:bodyPr rtlCol="0" anchor="ctr"/>
-          <a:lstStyle/>
-          <a:p>
-            <a:pPr algn="ctr"/>
-            <a:endParaRPr lang="zh-TW" altLang="en-US" dirty="0"/>
-          </a:p>
-        </p:txBody>
-      </p:sp>
-      <p:sp>
-        <p:nvSpPr>
-          <p:cNvPr id="12" name="文字方塊 11"/>
-          <p:cNvSpPr txBox="1"/>
-          <p:nvPr/>
-        </p:nvSpPr>
-        <p:spPr>
-          <a:xfrm>
-            <a:off x="500034" y="1702346"/>
-            <a:ext cx="8143932" cy="369332"/>
-          </a:xfrm>
-          <a:prstGeom prst="rect">
-            <a:avLst/>
-          </a:prstGeom>
-          <a:solidFill>
-            <a:schemeClr val="bg1">
-              <a:lumMod val="85000"/>
-            </a:schemeClr>
-          </a:solidFill>
-        </p:spPr>
-        <p:style>
-          <a:lnRef idx="2">
-            <a:schemeClr val="accent1"/>
-          </a:lnRef>
-          <a:fillRef idx="1">
-            <a:schemeClr val="lt1"/>
-          </a:fillRef>
-          <a:effectRef idx="0">
-            <a:schemeClr val="accent1"/>
-          </a:effectRef>
-          <a:fontRef idx="minor">
-            <a:schemeClr val="dk1"/>
-          </a:fontRef>
-        </p:style>
-        <p:txBody>
-          <a:bodyPr wrap="square" rtlCol="0" anchor="ctr">
-            <a:spAutoFit/>
-          </a:bodyPr>
-          <a:lstStyle/>
-          <a:p>
-            <a:endParaRPr lang="zh-TW" altLang="en-US" dirty="0"/>
-          </a:p>
-        </p:txBody>
-      </p:sp>
-      <p:sp>
-        <p:nvSpPr>
-          <p:cNvPr id="14" name="文字方塊 13"/>
-          <p:cNvSpPr txBox="1"/>
-          <p:nvPr/>
-        </p:nvSpPr>
-        <p:spPr>
-          <a:xfrm>
-            <a:off x="500034" y="2631040"/>
-            <a:ext cx="8143932" cy="369332"/>
-          </a:xfrm>
-          <a:prstGeom prst="rect">
-            <a:avLst/>
-          </a:prstGeom>
-          <a:solidFill>
-            <a:schemeClr val="bg1">
-              <a:lumMod val="85000"/>
-            </a:schemeClr>
-          </a:solidFill>
-        </p:spPr>
-        <p:style>
-          <a:lnRef idx="2">
-            <a:schemeClr val="accent1"/>
-          </a:lnRef>
-          <a:fillRef idx="1">
-            <a:schemeClr val="lt1"/>
-          </a:fillRef>
-          <a:effectRef idx="0">
-            <a:schemeClr val="accent1"/>
-          </a:effectRef>
-          <a:fontRef idx="minor">
-            <a:schemeClr val="dk1"/>
-          </a:fontRef>
-        </p:style>
-        <p:txBody>
-          <a:bodyPr wrap="square" rtlCol="0" anchor="ctr">
-            <a:spAutoFit/>
-          </a:bodyPr>
-          <a:lstStyle/>
-          <a:p>
-            <a:endParaRPr lang="zh-TW" altLang="en-US" dirty="0"/>
-          </a:p>
-        </p:txBody>
-      </p:sp>
-      <p:sp>
-        <p:nvSpPr>
-          <p:cNvPr id="19" name="文字方塊 18"/>
-          <p:cNvSpPr txBox="1"/>
-          <p:nvPr/>
-        </p:nvSpPr>
-        <p:spPr>
-          <a:xfrm>
-            <a:off x="428596" y="642918"/>
-            <a:ext cx="1661160" cy="430887"/>
-          </a:xfrm>
-          <a:prstGeom prst="rect">
-            <a:avLst/>
-          </a:prstGeom>
-          <a:noFill/>
-          <a:ln>
-            <a:solidFill>
-              <a:schemeClr val="bg1">
-                <a:lumMod val="65000"/>
-              </a:schemeClr>
-            </a:solidFill>
-          </a:ln>
-        </p:spPr>
-        <p:txBody>
-          <a:bodyPr wrap="none" rtlCol="0">
-            <a:spAutoFit/>
-          </a:bodyPr>
-          <a:lstStyle/>
-          <a:p>
-            <a:r>
-              <a:rPr lang="en-US" altLang="zh-TW" sz="2200" dirty="0" smtClean="0"/>
-              <a:t>DB Overview</a:t>
-            </a:r>
-            <a:endParaRPr lang="zh-TW" altLang="en-US" sz="2200" dirty="0"/>
-          </a:p>
-        </p:txBody>
-      </p:sp>
-      <p:sp>
-        <p:nvSpPr>
-          <p:cNvPr id="20" name="文字方塊 19"/>
-          <p:cNvSpPr txBox="1"/>
-          <p:nvPr/>
-        </p:nvSpPr>
-        <p:spPr>
-          <a:xfrm>
-            <a:off x="2087217" y="642918"/>
-            <a:ext cx="1891480" cy="430887"/>
-          </a:xfrm>
-          <a:prstGeom prst="rect">
-            <a:avLst/>
-          </a:prstGeom>
-          <a:solidFill>
-            <a:schemeClr val="bg1">
-              <a:lumMod val="85000"/>
-            </a:schemeClr>
-          </a:solidFill>
-          <a:ln>
-            <a:solidFill>
-              <a:schemeClr val="bg1">
-                <a:lumMod val="65000"/>
-              </a:schemeClr>
-            </a:solidFill>
-          </a:ln>
-        </p:spPr>
-        <p:txBody>
-          <a:bodyPr wrap="none" rtlCol="0">
-            <a:spAutoFit/>
-          </a:bodyPr>
-          <a:lstStyle/>
-          <a:p>
-            <a:r>
-              <a:rPr lang="en-US" altLang="zh-TW" sz="2200" dirty="0" smtClean="0"/>
-              <a:t>Manage Tables</a:t>
-            </a:r>
-            <a:endParaRPr lang="zh-TW" altLang="en-US" sz="2200" dirty="0"/>
-          </a:p>
-        </p:txBody>
-      </p:sp>
-      <p:sp>
-        <p:nvSpPr>
-          <p:cNvPr id="21" name="文字方塊 20"/>
-          <p:cNvSpPr txBox="1"/>
-          <p:nvPr/>
-        </p:nvSpPr>
-        <p:spPr>
-          <a:xfrm>
-            <a:off x="3944605" y="642918"/>
-            <a:ext cx="2484783" cy="430887"/>
-          </a:xfrm>
-          <a:prstGeom prst="rect">
-            <a:avLst/>
-          </a:prstGeom>
-          <a:noFill/>
-          <a:ln>
-            <a:solidFill>
-              <a:schemeClr val="bg1">
-                <a:lumMod val="65000"/>
-              </a:schemeClr>
-            </a:solidFill>
-          </a:ln>
-        </p:spPr>
-        <p:txBody>
-          <a:bodyPr wrap="none" rtlCol="0">
-            <a:spAutoFit/>
-          </a:bodyPr>
-          <a:lstStyle/>
-          <a:p>
-            <a:r>
-              <a:rPr lang="en-US" altLang="zh-TW" sz="2200" dirty="0" smtClean="0"/>
-              <a:t>Manage Table Items</a:t>
-            </a:r>
-            <a:endParaRPr lang="zh-TW" altLang="en-US" sz="2200" dirty="0"/>
-          </a:p>
-        </p:txBody>
-      </p:sp>
-      <p:sp>
-        <p:nvSpPr>
-          <p:cNvPr id="18" name="流程圖: 合併 17"/>
-          <p:cNvSpPr/>
-          <p:nvPr/>
-        </p:nvSpPr>
-        <p:spPr>
-          <a:xfrm>
-            <a:off x="8286776" y="1845222"/>
-            <a:ext cx="214314" cy="142876"/>
-          </a:xfrm>
-          <a:prstGeom prst="flowChartMerge">
-            <a:avLst/>
-          </a:prstGeom>
-          <a:solidFill>
-            <a:schemeClr val="bg1"/>
-          </a:solidFill>
-        </p:spPr>
-        <p:style>
-          <a:lnRef idx="2">
-            <a:schemeClr val="accent1">
-              <a:shade val="50000"/>
-            </a:schemeClr>
-          </a:lnRef>
-          <a:fillRef idx="1">
-            <a:schemeClr val="accent1"/>
-          </a:fillRef>
-          <a:effectRef idx="0">
-            <a:schemeClr val="accent1"/>
-          </a:effectRef>
-          <a:fontRef idx="minor">
-            <a:schemeClr val="lt1"/>
-          </a:fontRef>
-        </p:style>
-        <p:txBody>
-          <a:bodyPr rtlCol="0" anchor="ctr"/>
-          <a:lstStyle/>
-          <a:p>
-            <a:pPr algn="ctr"/>
-            <a:endParaRPr lang="zh-TW" altLang="en-US"/>
-          </a:p>
-        </p:txBody>
-      </p:sp>
-      <p:sp>
-        <p:nvSpPr>
-          <p:cNvPr id="23" name="流程圖: 合併 22"/>
-          <p:cNvSpPr/>
-          <p:nvPr/>
-        </p:nvSpPr>
-        <p:spPr>
-          <a:xfrm>
-            <a:off x="8286776" y="2714620"/>
-            <a:ext cx="214314" cy="142876"/>
-          </a:xfrm>
-          <a:prstGeom prst="flowChartMerge">
-            <a:avLst/>
-          </a:prstGeom>
-          <a:solidFill>
-            <a:schemeClr val="bg1"/>
-          </a:solidFill>
-        </p:spPr>
-        <p:style>
-          <a:lnRef idx="2">
-            <a:schemeClr val="accent1">
-              <a:shade val="50000"/>
-            </a:schemeClr>
-          </a:lnRef>
-          <a:fillRef idx="1">
-            <a:schemeClr val="accent1"/>
-          </a:fillRef>
-          <a:effectRef idx="0">
-            <a:schemeClr val="accent1"/>
-          </a:effectRef>
-          <a:fontRef idx="minor">
-            <a:schemeClr val="lt1"/>
-          </a:fontRef>
-        </p:style>
-        <p:txBody>
-          <a:bodyPr rtlCol="0" anchor="ctr"/>
-          <a:lstStyle/>
-          <a:p>
-            <a:pPr algn="ctr"/>
-            <a:endParaRPr lang="zh-TW" altLang="en-US"/>
-          </a:p>
-        </p:txBody>
-      </p:sp>
-      <p:sp>
-        <p:nvSpPr>
-          <p:cNvPr id="24" name="文字方塊 23"/>
-          <p:cNvSpPr txBox="1"/>
-          <p:nvPr/>
-        </p:nvSpPr>
-        <p:spPr>
-          <a:xfrm>
-            <a:off x="428596" y="1285860"/>
-            <a:ext cx="1511824" cy="369332"/>
-          </a:xfrm>
-          <a:prstGeom prst="rect">
-            <a:avLst/>
-          </a:prstGeom>
-          <a:noFill/>
-        </p:spPr>
-        <p:txBody>
-          <a:bodyPr wrap="none" rtlCol="0">
-            <a:spAutoFit/>
-          </a:bodyPr>
-          <a:lstStyle/>
-          <a:p>
-            <a:r>
-              <a:rPr lang="en-US" altLang="zh-TW" b="1" dirty="0" smtClean="0"/>
-              <a:t>Create a table</a:t>
-            </a:r>
-            <a:endParaRPr lang="zh-TW" altLang="en-US" b="1" dirty="0"/>
-          </a:p>
-        </p:txBody>
-      </p:sp>
-      <p:sp>
-        <p:nvSpPr>
-          <p:cNvPr id="25" name="文字方塊 24"/>
-          <p:cNvSpPr txBox="1"/>
-          <p:nvPr/>
-        </p:nvSpPr>
-        <p:spPr>
-          <a:xfrm>
-            <a:off x="428596" y="2214554"/>
-            <a:ext cx="1439561" cy="369332"/>
-          </a:xfrm>
-          <a:prstGeom prst="rect">
-            <a:avLst/>
-          </a:prstGeom>
-          <a:noFill/>
-        </p:spPr>
-        <p:txBody>
-          <a:bodyPr wrap="none" rtlCol="0">
-            <a:spAutoFit/>
-          </a:bodyPr>
-          <a:lstStyle/>
-          <a:p>
-            <a:r>
-              <a:rPr lang="en-US" altLang="zh-TW" b="1" dirty="0" smtClean="0"/>
-              <a:t>Delete tables</a:t>
-            </a:r>
-            <a:endParaRPr lang="zh-TW" altLang="en-US" b="1" dirty="0"/>
-          </a:p>
-        </p:txBody>
-      </p:sp>
-    </p:spTree>
-  </p:cSld>
-  <p:clrMapOvr>
-    <a:masterClrMapping/>
-  </p:clrMapOvr>
-</p:sld>
-</file>
-
-<file path=ppt/slides/slide4.xml><?xml version="1.0" encoding="utf-8"?>
-<p:sld xmlns:a="http://schemas.openxmlformats.org/drawingml/2006/main" xmlns:r="http://schemas.openxmlformats.org/officeDocument/2006/relationships" xmlns:p="http://schemas.openxmlformats.org/presentationml/2006/main">
-  <p:cSld>
-    <p:spTree>
-      <p:nvGrpSpPr>
-        <p:cNvPr id="1" name=""/>
-        <p:cNvGrpSpPr/>
-        <p:nvPr/>
-      </p:nvGrpSpPr>
-      <p:grpSpPr>
-        <a:xfrm>
-          <a:off x="0" y="0"/>
-          <a:ext cx="0" cy="0"/>
-          <a:chOff x="0" y="0"/>
-          <a:chExt cx="0" cy="0"/>
-        </a:xfrm>
-      </p:grpSpPr>
-      <p:sp>
-        <p:nvSpPr>
-          <p:cNvPr id="7" name="矩形 6"/>
-          <p:cNvSpPr/>
-          <p:nvPr/>
-        </p:nvSpPr>
-        <p:spPr>
-          <a:xfrm>
-            <a:off x="428596" y="1071546"/>
-            <a:ext cx="8286808" cy="785818"/>
-          </a:xfrm>
-          <a:prstGeom prst="rect">
-            <a:avLst/>
-          </a:prstGeom>
-          <a:solidFill>
-            <a:schemeClr val="bg1">
-              <a:lumMod val="95000"/>
-            </a:schemeClr>
-          </a:solidFill>
-        </p:spPr>
-        <p:style>
-          <a:lnRef idx="2">
-            <a:schemeClr val="accent1">
-              <a:shade val="50000"/>
-            </a:schemeClr>
-          </a:lnRef>
-          <a:fillRef idx="1">
-            <a:schemeClr val="accent1"/>
-          </a:fillRef>
-          <a:effectRef idx="0">
-            <a:schemeClr val="accent1"/>
-          </a:effectRef>
-          <a:fontRef idx="minor">
-            <a:schemeClr val="lt1"/>
-          </a:fontRef>
-        </p:style>
-        <p:txBody>
-          <a:bodyPr rtlCol="0" anchor="ctr"/>
-          <a:lstStyle/>
-          <a:p>
-            <a:pPr algn="ctr"/>
-            <a:endParaRPr lang="zh-TW" altLang="en-US" dirty="0"/>
-          </a:p>
-        </p:txBody>
-      </p:sp>
-      <p:sp>
-        <p:nvSpPr>
-          <p:cNvPr id="6" name="文字方塊 5"/>
-          <p:cNvSpPr txBox="1"/>
-          <p:nvPr/>
-        </p:nvSpPr>
-        <p:spPr>
-          <a:xfrm>
-            <a:off x="500034" y="1214422"/>
-            <a:ext cx="2011724" cy="369332"/>
-          </a:xfrm>
-          <a:prstGeom prst="rect">
-            <a:avLst/>
-          </a:prstGeom>
-          <a:solidFill>
-            <a:schemeClr val="bg1">
-              <a:lumMod val="85000"/>
-            </a:schemeClr>
-          </a:solidFill>
-        </p:spPr>
-        <p:style>
-          <a:lnRef idx="2">
-            <a:schemeClr val="accent1"/>
-          </a:lnRef>
-          <a:fillRef idx="1">
-            <a:schemeClr val="lt1"/>
-          </a:fillRef>
-          <a:effectRef idx="0">
-            <a:schemeClr val="accent1"/>
-          </a:effectRef>
-          <a:fontRef idx="minor">
-            <a:schemeClr val="dk1"/>
-          </a:fontRef>
-        </p:style>
-        <p:txBody>
-          <a:bodyPr wrap="square" rtlCol="0" anchor="ctr">
-            <a:spAutoFit/>
-          </a:bodyPr>
-          <a:lstStyle/>
-          <a:p>
-            <a:r>
-              <a:rPr lang="en-US" altLang="zh-TW" dirty="0" smtClean="0"/>
-              <a:t>Choose a table…</a:t>
-            </a:r>
-            <a:endParaRPr lang="zh-TW" altLang="en-US" dirty="0"/>
-          </a:p>
-        </p:txBody>
-      </p:sp>
-      <p:sp>
-        <p:nvSpPr>
-          <p:cNvPr id="28" name="文字方塊 27"/>
-          <p:cNvSpPr txBox="1"/>
-          <p:nvPr/>
-        </p:nvSpPr>
-        <p:spPr>
-          <a:xfrm>
-            <a:off x="3428992" y="0"/>
-            <a:ext cx="2996782" cy="492443"/>
-          </a:xfrm>
-          <a:prstGeom prst="rect">
-            <a:avLst/>
-          </a:prstGeom>
-          <a:noFill/>
-        </p:spPr>
-        <p:txBody>
-          <a:bodyPr wrap="none" rtlCol="0">
-            <a:spAutoFit/>
-          </a:bodyPr>
-          <a:lstStyle/>
-          <a:p>
-            <a:r>
-              <a:rPr lang="en-US" altLang="zh-TW" sz="2600" dirty="0" err="1" smtClean="0"/>
-              <a:t>DynamoDB</a:t>
-            </a:r>
-            <a:r>
-              <a:rPr lang="en-US" altLang="zh-TW" sz="2600" dirty="0" smtClean="0"/>
-              <a:t> Manager</a:t>
-            </a:r>
-            <a:endParaRPr lang="zh-TW" altLang="en-US" sz="2600" dirty="0"/>
-          </a:p>
-        </p:txBody>
-      </p:sp>
-      <p:sp>
-        <p:nvSpPr>
-          <p:cNvPr id="29" name="流程圖: 合併 28"/>
-          <p:cNvSpPr/>
-          <p:nvPr/>
-        </p:nvSpPr>
-        <p:spPr>
-          <a:xfrm>
-            <a:off x="2143108" y="1357298"/>
-            <a:ext cx="214314" cy="142876"/>
-          </a:xfrm>
-          <a:prstGeom prst="flowChartMerge">
-            <a:avLst/>
-          </a:prstGeom>
-          <a:solidFill>
-            <a:schemeClr val="bg1"/>
-          </a:solidFill>
-        </p:spPr>
-        <p:style>
-          <a:lnRef idx="2">
-            <a:schemeClr val="accent1">
-              <a:shade val="50000"/>
-            </a:schemeClr>
-          </a:lnRef>
-          <a:fillRef idx="1">
-            <a:schemeClr val="accent1"/>
-          </a:fillRef>
-          <a:effectRef idx="0">
-            <a:schemeClr val="accent1"/>
-          </a:effectRef>
-          <a:fontRef idx="minor">
-            <a:schemeClr val="lt1"/>
-          </a:fontRef>
-        </p:style>
-        <p:txBody>
-          <a:bodyPr rtlCol="0" anchor="ctr"/>
-          <a:lstStyle/>
-          <a:p>
-            <a:pPr algn="ctr"/>
-            <a:endParaRPr lang="zh-TW" altLang="en-US"/>
-          </a:p>
-        </p:txBody>
-      </p:sp>
-      <p:sp>
-        <p:nvSpPr>
-          <p:cNvPr id="19" name="文字方塊 18"/>
-          <p:cNvSpPr txBox="1"/>
-          <p:nvPr/>
-        </p:nvSpPr>
-        <p:spPr>
-          <a:xfrm>
-            <a:off x="428596" y="642918"/>
-            <a:ext cx="1661160" cy="430887"/>
-          </a:xfrm>
-          <a:prstGeom prst="rect">
-            <a:avLst/>
-          </a:prstGeom>
-          <a:noFill/>
-          <a:ln>
-            <a:solidFill>
-              <a:schemeClr val="bg1">
-                <a:lumMod val="65000"/>
-              </a:schemeClr>
-            </a:solidFill>
-          </a:ln>
-        </p:spPr>
-        <p:txBody>
-          <a:bodyPr wrap="none" rtlCol="0">
-            <a:spAutoFit/>
-          </a:bodyPr>
-          <a:lstStyle/>
-          <a:p>
-            <a:r>
-              <a:rPr lang="en-US" altLang="zh-TW" sz="2200" dirty="0" smtClean="0"/>
-              <a:t>DB Overview</a:t>
-            </a:r>
-            <a:endParaRPr lang="zh-TW" altLang="en-US" sz="2200" dirty="0"/>
-          </a:p>
-        </p:txBody>
-      </p:sp>
-      <p:sp>
-        <p:nvSpPr>
-          <p:cNvPr id="20" name="文字方塊 19"/>
-          <p:cNvSpPr txBox="1"/>
-          <p:nvPr/>
-        </p:nvSpPr>
-        <p:spPr>
-          <a:xfrm>
-            <a:off x="2087217" y="642918"/>
-            <a:ext cx="1891480" cy="430887"/>
-          </a:xfrm>
-          <a:prstGeom prst="rect">
-            <a:avLst/>
-          </a:prstGeom>
-          <a:noFill/>
-          <a:ln>
-            <a:solidFill>
-              <a:schemeClr val="bg1">
-                <a:lumMod val="65000"/>
-              </a:schemeClr>
-            </a:solidFill>
-          </a:ln>
-        </p:spPr>
-        <p:txBody>
-          <a:bodyPr wrap="none" rtlCol="0">
-            <a:spAutoFit/>
-          </a:bodyPr>
-          <a:lstStyle/>
-          <a:p>
-            <a:r>
-              <a:rPr lang="en-US" altLang="zh-TW" sz="2200" dirty="0" smtClean="0"/>
-              <a:t>Manage Tables</a:t>
-            </a:r>
-            <a:endParaRPr lang="zh-TW" altLang="en-US" sz="2200" dirty="0"/>
-          </a:p>
-        </p:txBody>
-      </p:sp>
-      <p:sp>
-        <p:nvSpPr>
-          <p:cNvPr id="21" name="文字方塊 20"/>
-          <p:cNvSpPr txBox="1"/>
-          <p:nvPr/>
-        </p:nvSpPr>
-        <p:spPr>
-          <a:xfrm>
-            <a:off x="3944605" y="642918"/>
-            <a:ext cx="2484783" cy="430887"/>
-          </a:xfrm>
-          <a:prstGeom prst="rect">
-            <a:avLst/>
-          </a:prstGeom>
-          <a:solidFill>
-            <a:schemeClr val="bg1">
-              <a:lumMod val="85000"/>
-            </a:schemeClr>
-          </a:solidFill>
-          <a:ln>
-            <a:solidFill>
-              <a:schemeClr val="bg1">
-                <a:lumMod val="65000"/>
-              </a:schemeClr>
-            </a:solidFill>
-          </a:ln>
-        </p:spPr>
-        <p:txBody>
-          <a:bodyPr wrap="none" rtlCol="0">
-            <a:spAutoFit/>
-          </a:bodyPr>
-          <a:lstStyle/>
-          <a:p>
-            <a:r>
-              <a:rPr lang="en-US" altLang="zh-TW" sz="2200" dirty="0" smtClean="0"/>
-              <a:t>Manage Table Items</a:t>
-            </a:r>
-            <a:endParaRPr lang="zh-TW" altLang="en-US" sz="2200" dirty="0"/>
-          </a:p>
-        </p:txBody>
-      </p:sp>
-    </p:spTree>
-  </p:cSld>
-  <p:clrMapOvr>
-    <a:masterClrMapping/>
-  </p:clrMapOvr>
-</p:sld>
-</file>
-
-<file path=ppt/slides/slide5.xml><?xml version="1.0" encoding="utf-8"?>
+<file path=ppt/slides/slide17.xml><?xml version="1.0" encoding="utf-8"?>
 <p:sld xmlns:a="http://schemas.openxmlformats.org/drawingml/2006/main" xmlns:r="http://schemas.openxmlformats.org/officeDocument/2006/relationships" xmlns:p="http://schemas.openxmlformats.org/presentationml/2006/main">
   <p:cSld>
     <p:spTree>
@@ -12078,14 +10999,6 @@
               </a:rPr>
               <a:t>: {attr1: A0, attr2: B0}},</a:t>
             </a:r>
-            <a:endParaRPr lang="en-US" altLang="zh-TW" sz="1200" dirty="0" smtClean="0">
-              <a:solidFill>
-                <a:schemeClr val="bg1"/>
-              </a:solidFill>
-              <a:latin typeface="Consolas" pitchFamily="49" charset="0"/>
-              <a:ea typeface="Cambria Math" pitchFamily="18" charset="0"/>
-              <a:cs typeface="Consolas" pitchFamily="49" charset="0"/>
-            </a:endParaRPr>
           </a:p>
           <a:p>
             <a:r>
@@ -12119,18 +11032,7 @@
                 <a:ea typeface="Cambria Math" pitchFamily="18" charset="0"/>
                 <a:cs typeface="Consolas" pitchFamily="49" charset="0"/>
               </a:rPr>
-              <a:t>: </a:t>
-            </a:r>
-            <a:r>
-              <a:rPr lang="en-US" altLang="zh-TW" sz="1200" dirty="0" smtClean="0">
-                <a:solidFill>
-                  <a:schemeClr val="bg1"/>
-                </a:solidFill>
-                <a:latin typeface="Consolas" pitchFamily="49" charset="0"/>
-                <a:ea typeface="Cambria Math" pitchFamily="18" charset="0"/>
-                <a:cs typeface="Consolas" pitchFamily="49" charset="0"/>
-              </a:rPr>
-              <a:t>modify, </a:t>
+              <a:t>: modify, </a:t>
             </a:r>
             <a:r>
               <a:rPr lang="en-US" altLang="zh-TW" sz="1200" dirty="0" err="1" smtClean="0">
@@ -12152,8 +11054,10 @@
                 <a:ea typeface="Cambria Math" pitchFamily="18" charset="0"/>
                 <a:cs typeface="Consolas" pitchFamily="49" charset="0"/>
               </a:rPr>
-              <a:t>: {attr1: A1, attr2: B1</a:t>
-            </a:r>
+              <a:t>: {attr1: A1, attr2: B1}},</a:t>
+            </a:r>
+          </a:p>
+          <a:p>
             <a:r>
               <a:rPr lang="en-US" altLang="zh-TW" sz="1200" dirty="0" smtClean="0">
                 <a:solidFill>
@@ -12163,42 +11067,7 @@
                 <a:ea typeface="Cambria Math" pitchFamily="18" charset="0"/>
                 <a:cs typeface="Consolas" pitchFamily="49" charset="0"/>
               </a:rPr>
-              <a:t>}},</a:t>
-            </a:r>
-          </a:p>
-          <a:p>
-            <a:r>
-              <a:rPr lang="en-US" altLang="zh-TW" sz="1200" dirty="0" smtClean="0">
-                <a:solidFill>
-                  <a:schemeClr val="bg1"/>
-                </a:solidFill>
-                <a:latin typeface="Consolas" pitchFamily="49" charset="0"/>
-                <a:ea typeface="Cambria Math" pitchFamily="18" charset="0"/>
-                <a:cs typeface="Consolas" pitchFamily="49" charset="0"/>
-              </a:rPr>
-              <a:t>  </a:t>
-            </a:r>
-            <a:r>
-              <a:rPr lang="en-US" altLang="zh-TW" sz="1200" dirty="0" smtClean="0">
-                <a:solidFill>
-                  <a:schemeClr val="bg1"/>
-                </a:solidFill>
-                <a:latin typeface="Consolas" pitchFamily="49" charset="0"/>
-                <a:ea typeface="Cambria Math" pitchFamily="18" charset="0"/>
-                <a:cs typeface="Consolas" pitchFamily="49" charset="0"/>
-              </a:rPr>
-              <a:t>{id: </a:t>
-            </a:r>
-            <a:r>
-              <a:rPr lang="en-US" altLang="zh-TW" sz="1200" dirty="0" smtClean="0">
-                <a:solidFill>
-                  <a:schemeClr val="bg1"/>
-                </a:solidFill>
-                <a:latin typeface="Consolas" pitchFamily="49" charset="0"/>
-                <a:ea typeface="Cambria Math" pitchFamily="18" charset="0"/>
-                <a:cs typeface="Consolas" pitchFamily="49" charset="0"/>
-              </a:rPr>
-              <a:t>2, </a:t>
+              <a:t>  {id: 2, </a:t>
             </a:r>
             <a:r>
               <a:rPr lang="en-US" altLang="zh-TW" sz="1200" dirty="0" err="1" smtClean="0">
@@ -12242,8 +11111,10 @@
                 <a:ea typeface="Cambria Math" pitchFamily="18" charset="0"/>
                 <a:cs typeface="Consolas" pitchFamily="49" charset="0"/>
               </a:rPr>
-              <a:t>: {attr1: </a:t>
-            </a:r>
+              <a:t>: {attr1: A2, attr2: B2}},</a:t>
+            </a:r>
+          </a:p>
+          <a:p>
             <a:r>
               <a:rPr lang="en-US" altLang="zh-TW" sz="1200" dirty="0" smtClean="0">
                 <a:solidFill>
@@ -12253,64 +11124,7 @@
                 <a:ea typeface="Cambria Math" pitchFamily="18" charset="0"/>
                 <a:cs typeface="Consolas" pitchFamily="49" charset="0"/>
               </a:rPr>
-              <a:t>A2, </a:t>
-            </a:r>
-            <a:r>
-              <a:rPr lang="en-US" altLang="zh-TW" sz="1200" dirty="0" smtClean="0">
-                <a:solidFill>
-                  <a:schemeClr val="bg1"/>
-                </a:solidFill>
-                <a:latin typeface="Consolas" pitchFamily="49" charset="0"/>
-                <a:ea typeface="Cambria Math" pitchFamily="18" charset="0"/>
-                <a:cs typeface="Consolas" pitchFamily="49" charset="0"/>
-              </a:rPr>
-              <a:t>attr2: </a:t>
-            </a:r>
-            <a:r>
-              <a:rPr lang="en-US" altLang="zh-TW" sz="1200" dirty="0" smtClean="0">
-                <a:solidFill>
-                  <a:schemeClr val="bg1"/>
-                </a:solidFill>
-                <a:latin typeface="Consolas" pitchFamily="49" charset="0"/>
-                <a:ea typeface="Cambria Math" pitchFamily="18" charset="0"/>
-                <a:cs typeface="Consolas" pitchFamily="49" charset="0"/>
-              </a:rPr>
-              <a:t>B2}},</a:t>
-            </a:r>
-          </a:p>
-          <a:p>
-            <a:r>
-              <a:rPr lang="en-US" altLang="zh-TW" sz="1200" dirty="0" smtClean="0">
-                <a:solidFill>
-                  <a:schemeClr val="bg1"/>
-                </a:solidFill>
-                <a:latin typeface="Consolas" pitchFamily="49" charset="0"/>
-                <a:ea typeface="Cambria Math" pitchFamily="18" charset="0"/>
-                <a:cs typeface="Consolas" pitchFamily="49" charset="0"/>
-              </a:rPr>
-              <a:t>  </a:t>
-            </a:r>
-            <a:r>
-              <a:rPr lang="en-US" altLang="zh-TW" sz="1200" dirty="0" smtClean="0">
-                <a:solidFill>
-                  <a:schemeClr val="bg1"/>
-                </a:solidFill>
-                <a:latin typeface="Consolas" pitchFamily="49" charset="0"/>
-                <a:ea typeface="Cambria Math" pitchFamily="18" charset="0"/>
-                <a:cs typeface="Consolas" pitchFamily="49" charset="0"/>
-              </a:rPr>
-              <a:t>{id: </a:t>
-            </a:r>
-            <a:r>
-              <a:rPr lang="en-US" altLang="zh-TW" sz="1200" dirty="0" smtClean="0">
-                <a:solidFill>
-                  <a:schemeClr val="bg1"/>
-                </a:solidFill>
-                <a:latin typeface="Consolas" pitchFamily="49" charset="0"/>
-                <a:ea typeface="Cambria Math" pitchFamily="18" charset="0"/>
-                <a:cs typeface="Consolas" pitchFamily="49" charset="0"/>
-              </a:rPr>
-              <a:t>3, </a:t>
+              <a:t>  {id: 3, </a:t>
             </a:r>
             <a:r>
               <a:rPr lang="en-US" altLang="zh-TW" sz="1200" dirty="0" err="1" smtClean="0">
@@ -12391,14 +11205,6 @@
               </a:rPr>
               <a:t>: {attr1: A2, attr2: B2}},</a:t>
             </a:r>
-            <a:endParaRPr lang="en-US" altLang="zh-TW" sz="1200" dirty="0" smtClean="0">
-              <a:solidFill>
-                <a:schemeClr val="bg1"/>
-              </a:solidFill>
-              <a:latin typeface="Consolas" pitchFamily="49" charset="0"/>
-              <a:ea typeface="Cambria Math" pitchFamily="18" charset="0"/>
-              <a:cs typeface="Consolas" pitchFamily="49" charset="0"/>
-            </a:endParaRPr>
           </a:p>
           <a:p>
             <a:r>
@@ -12450,11 +11256,7 @@
             </a:r>
             <a:r>
               <a:rPr lang="zh-TW" altLang="en-US" sz="1400" dirty="0" smtClean="0"/>
-              <a:t>見</a:t>
-            </a:r>
-            <a:r>
-              <a:rPr lang="zh-TW" altLang="en-US" sz="1400" dirty="0" smtClean="0"/>
-              <a:t>後頁</a:t>
+              <a:t>見後頁</a:t>
             </a:r>
             <a:r>
               <a:rPr lang="en-US" altLang="zh-TW" sz="1400" dirty="0" smtClean="0"/>
@@ -12576,14 +11378,12 @@
               <a:rPr lang="en-US" altLang="zh-TW" sz="1200" dirty="0" smtClean="0"/>
               <a:t>Delete</a:t>
             </a:r>
-            <a:endParaRPr lang="en-US" altLang="zh-TW" sz="1200" dirty="0" smtClean="0"/>
           </a:p>
           <a:p>
             <a:r>
               <a:rPr lang="en-US" altLang="zh-TW" sz="1200" dirty="0" smtClean="0"/>
               <a:t>Modify</a:t>
             </a:r>
-            <a:endParaRPr lang="en-US" altLang="zh-TW" sz="1200" dirty="0" smtClean="0"/>
           </a:p>
         </p:txBody>
       </p:sp>
@@ -13078,16 +11878,2690 @@
           <a:p>
             <a:r>
               <a:rPr lang="en-US" altLang="zh-TW" dirty="0" smtClean="0"/>
-              <a:t>Add </a:t>
-            </a:r>
+              <a:t>Add Item</a:t>
+            </a:r>
+            <a:endParaRPr lang="zh-TW" altLang="en-US" dirty="0"/>
+          </a:p>
+        </p:txBody>
+      </p:sp>
+    </p:spTree>
+  </p:cSld>
+  <p:clrMapOvr>
+    <a:masterClrMapping/>
+  </p:clrMapOvr>
+</p:sld>
+</file>
+
+<file path=ppt/slides/slide2.xml><?xml version="1.0" encoding="utf-8"?>
+<p:sld xmlns:a="http://schemas.openxmlformats.org/drawingml/2006/main" xmlns:r="http://schemas.openxmlformats.org/officeDocument/2006/relationships" xmlns:p="http://schemas.openxmlformats.org/presentationml/2006/main">
+  <p:cSld>
+    <p:spTree>
+      <p:nvGrpSpPr>
+        <p:cNvPr id="1" name=""/>
+        <p:cNvGrpSpPr/>
+        <p:nvPr/>
+      </p:nvGrpSpPr>
+      <p:grpSpPr>
+        <a:xfrm>
+          <a:off x="0" y="0"/>
+          <a:ext cx="0" cy="0"/>
+          <a:chOff x="0" y="0"/>
+          <a:chExt cx="0" cy="0"/>
+        </a:xfrm>
+      </p:grpSpPr>
+      <p:sp>
+        <p:nvSpPr>
+          <p:cNvPr id="28" name="文字方塊 27"/>
+          <p:cNvSpPr txBox="1"/>
+          <p:nvPr/>
+        </p:nvSpPr>
+        <p:spPr>
+          <a:xfrm>
+            <a:off x="3428992" y="0"/>
+            <a:ext cx="2996782" cy="492443"/>
+          </a:xfrm>
+          <a:prstGeom prst="rect">
+            <a:avLst/>
+          </a:prstGeom>
+          <a:noFill/>
+        </p:spPr>
+        <p:txBody>
+          <a:bodyPr wrap="none" rtlCol="0">
+            <a:spAutoFit/>
+          </a:bodyPr>
+          <a:lstStyle/>
+          <a:p>
+            <a:r>
+              <a:rPr lang="en-US" altLang="zh-TW" sz="2600" dirty="0" err="1" smtClean="0"/>
+              <a:t>DynamoDB</a:t>
+            </a:r>
+            <a:r>
+              <a:rPr lang="en-US" altLang="zh-TW" sz="2600" dirty="0" smtClean="0"/>
+              <a:t> Manager</a:t>
+            </a:r>
+            <a:endParaRPr lang="zh-TW" altLang="en-US" sz="2600" dirty="0"/>
+          </a:p>
+        </p:txBody>
+      </p:sp>
+      <p:sp>
+        <p:nvSpPr>
+          <p:cNvPr id="19" name="文字方塊 18"/>
+          <p:cNvSpPr txBox="1"/>
+          <p:nvPr/>
+        </p:nvSpPr>
+        <p:spPr>
+          <a:xfrm>
+            <a:off x="428596" y="642918"/>
+            <a:ext cx="1661160" cy="430887"/>
+          </a:xfrm>
+          <a:prstGeom prst="rect">
+            <a:avLst/>
+          </a:prstGeom>
+          <a:solidFill>
+            <a:schemeClr val="bg1">
+              <a:lumMod val="95000"/>
+            </a:schemeClr>
+          </a:solidFill>
+          <a:ln>
+            <a:solidFill>
+              <a:schemeClr val="bg1">
+                <a:lumMod val="65000"/>
+              </a:schemeClr>
+            </a:solidFill>
+          </a:ln>
+        </p:spPr>
+        <p:txBody>
+          <a:bodyPr wrap="none" rtlCol="0">
+            <a:spAutoFit/>
+          </a:bodyPr>
+          <a:lstStyle/>
+          <a:p>
+            <a:r>
+              <a:rPr lang="en-US" altLang="zh-TW" sz="2200" dirty="0" smtClean="0"/>
+              <a:t>DB</a:t>
+            </a:r>
+            <a:r>
+              <a:rPr lang="zh-TW" altLang="en-US" sz="2200" dirty="0" smtClean="0"/>
+              <a:t> </a:t>
+            </a:r>
+            <a:r>
+              <a:rPr lang="en-US" altLang="zh-TW" sz="2200" dirty="0" smtClean="0"/>
+              <a:t>Overview</a:t>
+            </a:r>
+            <a:endParaRPr lang="zh-TW" altLang="en-US" sz="2200" dirty="0"/>
+          </a:p>
+        </p:txBody>
+      </p:sp>
+      <p:sp>
+        <p:nvSpPr>
+          <p:cNvPr id="20" name="文字方塊 19"/>
+          <p:cNvSpPr txBox="1"/>
+          <p:nvPr/>
+        </p:nvSpPr>
+        <p:spPr>
+          <a:xfrm>
+            <a:off x="2087217" y="642918"/>
+            <a:ext cx="1891480" cy="430887"/>
+          </a:xfrm>
+          <a:prstGeom prst="rect">
+            <a:avLst/>
+          </a:prstGeom>
+          <a:noFill/>
+          <a:ln>
+            <a:solidFill>
+              <a:schemeClr val="bg1">
+                <a:lumMod val="65000"/>
+              </a:schemeClr>
+            </a:solidFill>
+          </a:ln>
+        </p:spPr>
+        <p:txBody>
+          <a:bodyPr wrap="none" rtlCol="0">
+            <a:spAutoFit/>
+          </a:bodyPr>
+          <a:lstStyle/>
+          <a:p>
+            <a:r>
+              <a:rPr lang="en-US" altLang="zh-TW" sz="2200" dirty="0" smtClean="0"/>
+              <a:t>Manage Tables</a:t>
+            </a:r>
+            <a:endParaRPr lang="zh-TW" altLang="en-US" sz="2200" dirty="0"/>
+          </a:p>
+        </p:txBody>
+      </p:sp>
+      <p:sp>
+        <p:nvSpPr>
+          <p:cNvPr id="21" name="文字方塊 20"/>
+          <p:cNvSpPr txBox="1"/>
+          <p:nvPr/>
+        </p:nvSpPr>
+        <p:spPr>
+          <a:xfrm>
+            <a:off x="3944605" y="642918"/>
+            <a:ext cx="2484783" cy="430887"/>
+          </a:xfrm>
+          <a:prstGeom prst="rect">
+            <a:avLst/>
+          </a:prstGeom>
+          <a:noFill/>
+          <a:ln>
+            <a:solidFill>
+              <a:schemeClr val="bg1">
+                <a:lumMod val="65000"/>
+              </a:schemeClr>
+            </a:solidFill>
+          </a:ln>
+        </p:spPr>
+        <p:txBody>
+          <a:bodyPr wrap="none" rtlCol="0">
+            <a:spAutoFit/>
+          </a:bodyPr>
+          <a:lstStyle/>
+          <a:p>
+            <a:r>
+              <a:rPr lang="en-US" altLang="zh-TW" sz="2200" dirty="0" smtClean="0"/>
+              <a:t>Manage Table Items</a:t>
+            </a:r>
+            <a:endParaRPr lang="zh-TW" altLang="en-US" sz="2200" dirty="0"/>
+          </a:p>
+        </p:txBody>
+      </p:sp>
+      <p:sp>
+        <p:nvSpPr>
+          <p:cNvPr id="22" name="矩形 21"/>
+          <p:cNvSpPr/>
+          <p:nvPr/>
+        </p:nvSpPr>
+        <p:spPr>
+          <a:xfrm>
+            <a:off x="428596" y="1071546"/>
+            <a:ext cx="8286808" cy="2714644"/>
+          </a:xfrm>
+          <a:prstGeom prst="rect">
+            <a:avLst/>
+          </a:prstGeom>
+          <a:solidFill>
+            <a:schemeClr val="bg1">
+              <a:lumMod val="95000"/>
+            </a:schemeClr>
+          </a:solidFill>
+        </p:spPr>
+        <p:style>
+          <a:lnRef idx="2">
+            <a:schemeClr val="accent1">
+              <a:shade val="50000"/>
+            </a:schemeClr>
+          </a:lnRef>
+          <a:fillRef idx="1">
+            <a:schemeClr val="accent1"/>
+          </a:fillRef>
+          <a:effectRef idx="0">
+            <a:schemeClr val="accent1"/>
+          </a:effectRef>
+          <a:fontRef idx="minor">
+            <a:schemeClr val="lt1"/>
+          </a:fontRef>
+        </p:style>
+        <p:txBody>
+          <a:bodyPr rtlCol="0" anchor="ctr"/>
+          <a:lstStyle/>
+          <a:p>
+            <a:pPr algn="ctr"/>
+            <a:endParaRPr lang="zh-TW" altLang="en-US" dirty="0"/>
+          </a:p>
+        </p:txBody>
+      </p:sp>
+      <p:sp>
+        <p:nvSpPr>
+          <p:cNvPr id="23" name="文字方塊 22"/>
+          <p:cNvSpPr txBox="1"/>
+          <p:nvPr/>
+        </p:nvSpPr>
+        <p:spPr>
+          <a:xfrm>
+            <a:off x="571472" y="1214422"/>
+            <a:ext cx="2679580" cy="430887"/>
+          </a:xfrm>
+          <a:prstGeom prst="rect">
+            <a:avLst/>
+          </a:prstGeom>
+          <a:noFill/>
+        </p:spPr>
+        <p:txBody>
+          <a:bodyPr wrap="none" rtlCol="0">
+            <a:spAutoFit/>
+          </a:bodyPr>
+          <a:lstStyle/>
+          <a:p>
+            <a:r>
+              <a:rPr lang="en-US" altLang="zh-TW" sz="2200" dirty="0" smtClean="0"/>
+              <a:t>DB Name: My Test DB</a:t>
+            </a:r>
+            <a:endParaRPr lang="zh-TW" altLang="en-US" sz="2200" dirty="0"/>
+          </a:p>
+        </p:txBody>
+      </p:sp>
+      <p:sp>
+        <p:nvSpPr>
+          <p:cNvPr id="24" name="文字方塊 23"/>
+          <p:cNvSpPr txBox="1"/>
+          <p:nvPr/>
+        </p:nvSpPr>
+        <p:spPr>
+          <a:xfrm>
+            <a:off x="571472" y="1785926"/>
+            <a:ext cx="2076594" cy="430887"/>
+          </a:xfrm>
+          <a:prstGeom prst="rect">
+            <a:avLst/>
+          </a:prstGeom>
+          <a:noFill/>
+        </p:spPr>
+        <p:txBody>
+          <a:bodyPr wrap="none" rtlCol="0">
+            <a:spAutoFit/>
+          </a:bodyPr>
+          <a:lstStyle/>
+          <a:p>
+            <a:r>
+              <a:rPr lang="en-US" altLang="zh-TW" sz="2200" dirty="0" smtClean="0"/>
+              <a:t>Table Number: 5</a:t>
+            </a:r>
+            <a:endParaRPr lang="zh-TW" altLang="en-US" sz="2200" dirty="0"/>
+          </a:p>
+        </p:txBody>
+      </p:sp>
+      <p:sp>
+        <p:nvSpPr>
+          <p:cNvPr id="25" name="文字方塊 24"/>
+          <p:cNvSpPr txBox="1"/>
+          <p:nvPr/>
+        </p:nvSpPr>
+        <p:spPr>
+          <a:xfrm>
+            <a:off x="571472" y="2357430"/>
+            <a:ext cx="1239506" cy="430887"/>
+          </a:xfrm>
+          <a:prstGeom prst="rect">
+            <a:avLst/>
+          </a:prstGeom>
+          <a:noFill/>
+        </p:spPr>
+        <p:txBody>
+          <a:bodyPr wrap="none" rtlCol="0">
+            <a:spAutoFit/>
+          </a:bodyPr>
+          <a:lstStyle/>
+          <a:p>
+            <a:r>
+              <a:rPr lang="en-US" altLang="zh-TW" sz="2200" dirty="0" smtClean="0"/>
+              <a:t>Size: 1GB</a:t>
+            </a:r>
+            <a:endParaRPr lang="zh-TW" altLang="en-US" sz="2200" dirty="0"/>
+          </a:p>
+        </p:txBody>
+      </p:sp>
+    </p:spTree>
+  </p:cSld>
+  <p:clrMapOvr>
+    <a:masterClrMapping/>
+  </p:clrMapOvr>
+</p:sld>
+</file>
+
+<file path=ppt/slides/slide3.xml><?xml version="1.0" encoding="utf-8"?>
+<p:sld xmlns:a="http://schemas.openxmlformats.org/drawingml/2006/main" xmlns:r="http://schemas.openxmlformats.org/officeDocument/2006/relationships" xmlns:p="http://schemas.openxmlformats.org/presentationml/2006/main">
+  <p:cSld>
+    <p:spTree>
+      <p:nvGrpSpPr>
+        <p:cNvPr id="1" name=""/>
+        <p:cNvGrpSpPr/>
+        <p:nvPr/>
+      </p:nvGrpSpPr>
+      <p:grpSpPr>
+        <a:xfrm>
+          <a:off x="0" y="0"/>
+          <a:ext cx="0" cy="0"/>
+          <a:chOff x="0" y="0"/>
+          <a:chExt cx="0" cy="0"/>
+        </a:xfrm>
+      </p:grpSpPr>
+      <p:sp>
+        <p:nvSpPr>
+          <p:cNvPr id="28" name="文字方塊 27"/>
+          <p:cNvSpPr txBox="1"/>
+          <p:nvPr/>
+        </p:nvSpPr>
+        <p:spPr>
+          <a:xfrm>
+            <a:off x="3428992" y="0"/>
+            <a:ext cx="2996782" cy="492443"/>
+          </a:xfrm>
+          <a:prstGeom prst="rect">
+            <a:avLst/>
+          </a:prstGeom>
+          <a:noFill/>
+        </p:spPr>
+        <p:txBody>
+          <a:bodyPr wrap="none" rtlCol="0">
+            <a:spAutoFit/>
+          </a:bodyPr>
+          <a:lstStyle/>
+          <a:p>
+            <a:r>
+              <a:rPr lang="en-US" altLang="zh-TW" sz="2600" dirty="0" err="1" smtClean="0"/>
+              <a:t>DynamoDB</a:t>
+            </a:r>
+            <a:r>
+              <a:rPr lang="en-US" altLang="zh-TW" sz="2600" dirty="0" smtClean="0"/>
+              <a:t> Manager</a:t>
+            </a:r>
+            <a:endParaRPr lang="zh-TW" altLang="en-US" sz="2600" dirty="0"/>
+          </a:p>
+        </p:txBody>
+      </p:sp>
+      <p:sp>
+        <p:nvSpPr>
+          <p:cNvPr id="33" name="矩形 32"/>
+          <p:cNvSpPr/>
+          <p:nvPr/>
+        </p:nvSpPr>
+        <p:spPr>
+          <a:xfrm>
+            <a:off x="428596" y="1071546"/>
+            <a:ext cx="8286808" cy="2143140"/>
+          </a:xfrm>
+          <a:prstGeom prst="rect">
+            <a:avLst/>
+          </a:prstGeom>
+          <a:solidFill>
+            <a:schemeClr val="bg1">
+              <a:lumMod val="95000"/>
+            </a:schemeClr>
+          </a:solidFill>
+        </p:spPr>
+        <p:style>
+          <a:lnRef idx="2">
+            <a:schemeClr val="accent1">
+              <a:shade val="50000"/>
+            </a:schemeClr>
+          </a:lnRef>
+          <a:fillRef idx="1">
+            <a:schemeClr val="accent1"/>
+          </a:fillRef>
+          <a:effectRef idx="0">
+            <a:schemeClr val="accent1"/>
+          </a:effectRef>
+          <a:fontRef idx="minor">
+            <a:schemeClr val="lt1"/>
+          </a:fontRef>
+        </p:style>
+        <p:txBody>
+          <a:bodyPr rtlCol="0" anchor="ctr"/>
+          <a:lstStyle/>
+          <a:p>
+            <a:pPr algn="ctr"/>
+            <a:endParaRPr lang="zh-TW" altLang="en-US" dirty="0"/>
+          </a:p>
+        </p:txBody>
+      </p:sp>
+      <p:sp>
+        <p:nvSpPr>
+          <p:cNvPr id="12" name="文字方塊 11"/>
+          <p:cNvSpPr txBox="1"/>
+          <p:nvPr/>
+        </p:nvSpPr>
+        <p:spPr>
+          <a:xfrm>
+            <a:off x="500034" y="1702346"/>
+            <a:ext cx="8143932" cy="369332"/>
+          </a:xfrm>
+          <a:prstGeom prst="rect">
+            <a:avLst/>
+          </a:prstGeom>
+          <a:solidFill>
+            <a:schemeClr val="bg1">
+              <a:lumMod val="85000"/>
+            </a:schemeClr>
+          </a:solidFill>
+        </p:spPr>
+        <p:style>
+          <a:lnRef idx="2">
+            <a:schemeClr val="accent1"/>
+          </a:lnRef>
+          <a:fillRef idx="1">
+            <a:schemeClr val="lt1"/>
+          </a:fillRef>
+          <a:effectRef idx="0">
+            <a:schemeClr val="accent1"/>
+          </a:effectRef>
+          <a:fontRef idx="minor">
+            <a:schemeClr val="dk1"/>
+          </a:fontRef>
+        </p:style>
+        <p:txBody>
+          <a:bodyPr wrap="square" rtlCol="0" anchor="ctr">
+            <a:spAutoFit/>
+          </a:bodyPr>
+          <a:lstStyle/>
+          <a:p>
+            <a:endParaRPr lang="zh-TW" altLang="en-US" dirty="0"/>
+          </a:p>
+        </p:txBody>
+      </p:sp>
+      <p:sp>
+        <p:nvSpPr>
+          <p:cNvPr id="14" name="文字方塊 13"/>
+          <p:cNvSpPr txBox="1"/>
+          <p:nvPr/>
+        </p:nvSpPr>
+        <p:spPr>
+          <a:xfrm>
+            <a:off x="500034" y="2631040"/>
+            <a:ext cx="8143932" cy="369332"/>
+          </a:xfrm>
+          <a:prstGeom prst="rect">
+            <a:avLst/>
+          </a:prstGeom>
+          <a:solidFill>
+            <a:schemeClr val="bg1">
+              <a:lumMod val="85000"/>
+            </a:schemeClr>
+          </a:solidFill>
+        </p:spPr>
+        <p:style>
+          <a:lnRef idx="2">
+            <a:schemeClr val="accent1"/>
+          </a:lnRef>
+          <a:fillRef idx="1">
+            <a:schemeClr val="lt1"/>
+          </a:fillRef>
+          <a:effectRef idx="0">
+            <a:schemeClr val="accent1"/>
+          </a:effectRef>
+          <a:fontRef idx="minor">
+            <a:schemeClr val="dk1"/>
+          </a:fontRef>
+        </p:style>
+        <p:txBody>
+          <a:bodyPr wrap="square" rtlCol="0" anchor="ctr">
+            <a:spAutoFit/>
+          </a:bodyPr>
+          <a:lstStyle/>
+          <a:p>
+            <a:endParaRPr lang="zh-TW" altLang="en-US" dirty="0"/>
+          </a:p>
+        </p:txBody>
+      </p:sp>
+      <p:sp>
+        <p:nvSpPr>
+          <p:cNvPr id="19" name="文字方塊 18"/>
+          <p:cNvSpPr txBox="1"/>
+          <p:nvPr/>
+        </p:nvSpPr>
+        <p:spPr>
+          <a:xfrm>
+            <a:off x="428596" y="642918"/>
+            <a:ext cx="1661160" cy="430887"/>
+          </a:xfrm>
+          <a:prstGeom prst="rect">
+            <a:avLst/>
+          </a:prstGeom>
+          <a:noFill/>
+          <a:ln>
+            <a:solidFill>
+              <a:schemeClr val="bg1">
+                <a:lumMod val="65000"/>
+              </a:schemeClr>
+            </a:solidFill>
+          </a:ln>
+        </p:spPr>
+        <p:txBody>
+          <a:bodyPr wrap="none" rtlCol="0">
+            <a:spAutoFit/>
+          </a:bodyPr>
+          <a:lstStyle/>
+          <a:p>
+            <a:r>
+              <a:rPr lang="en-US" altLang="zh-TW" sz="2200" dirty="0" smtClean="0"/>
+              <a:t>DB Overview</a:t>
+            </a:r>
+            <a:endParaRPr lang="zh-TW" altLang="en-US" sz="2200" dirty="0"/>
+          </a:p>
+        </p:txBody>
+      </p:sp>
+      <p:sp>
+        <p:nvSpPr>
+          <p:cNvPr id="20" name="文字方塊 19"/>
+          <p:cNvSpPr txBox="1"/>
+          <p:nvPr/>
+        </p:nvSpPr>
+        <p:spPr>
+          <a:xfrm>
+            <a:off x="2087217" y="642918"/>
+            <a:ext cx="1891480" cy="430887"/>
+          </a:xfrm>
+          <a:prstGeom prst="rect">
+            <a:avLst/>
+          </a:prstGeom>
+          <a:solidFill>
+            <a:schemeClr val="bg1">
+              <a:lumMod val="85000"/>
+            </a:schemeClr>
+          </a:solidFill>
+          <a:ln>
+            <a:solidFill>
+              <a:schemeClr val="bg1">
+                <a:lumMod val="65000"/>
+              </a:schemeClr>
+            </a:solidFill>
+          </a:ln>
+        </p:spPr>
+        <p:txBody>
+          <a:bodyPr wrap="none" rtlCol="0">
+            <a:spAutoFit/>
+          </a:bodyPr>
+          <a:lstStyle/>
+          <a:p>
+            <a:r>
+              <a:rPr lang="en-US" altLang="zh-TW" sz="2200" dirty="0" smtClean="0"/>
+              <a:t>Manage Tables</a:t>
+            </a:r>
+            <a:endParaRPr lang="zh-TW" altLang="en-US" sz="2200" dirty="0"/>
+          </a:p>
+        </p:txBody>
+      </p:sp>
+      <p:sp>
+        <p:nvSpPr>
+          <p:cNvPr id="21" name="文字方塊 20"/>
+          <p:cNvSpPr txBox="1"/>
+          <p:nvPr/>
+        </p:nvSpPr>
+        <p:spPr>
+          <a:xfrm>
+            <a:off x="3944605" y="642918"/>
+            <a:ext cx="2484783" cy="430887"/>
+          </a:xfrm>
+          <a:prstGeom prst="rect">
+            <a:avLst/>
+          </a:prstGeom>
+          <a:noFill/>
+          <a:ln>
+            <a:solidFill>
+              <a:schemeClr val="bg1">
+                <a:lumMod val="65000"/>
+              </a:schemeClr>
+            </a:solidFill>
+          </a:ln>
+        </p:spPr>
+        <p:txBody>
+          <a:bodyPr wrap="none" rtlCol="0">
+            <a:spAutoFit/>
+          </a:bodyPr>
+          <a:lstStyle/>
+          <a:p>
+            <a:r>
+              <a:rPr lang="en-US" altLang="zh-TW" sz="2200" dirty="0" smtClean="0"/>
+              <a:t>Manage Table Items</a:t>
+            </a:r>
+            <a:endParaRPr lang="zh-TW" altLang="en-US" sz="2200" dirty="0"/>
+          </a:p>
+        </p:txBody>
+      </p:sp>
+      <p:sp>
+        <p:nvSpPr>
+          <p:cNvPr id="18" name="流程圖: 合併 17"/>
+          <p:cNvSpPr/>
+          <p:nvPr/>
+        </p:nvSpPr>
+        <p:spPr>
+          <a:xfrm>
+            <a:off x="8286776" y="1845222"/>
+            <a:ext cx="214314" cy="142876"/>
+          </a:xfrm>
+          <a:prstGeom prst="flowChartMerge">
+            <a:avLst/>
+          </a:prstGeom>
+          <a:solidFill>
+            <a:schemeClr val="bg1"/>
+          </a:solidFill>
+        </p:spPr>
+        <p:style>
+          <a:lnRef idx="2">
+            <a:schemeClr val="accent1">
+              <a:shade val="50000"/>
+            </a:schemeClr>
+          </a:lnRef>
+          <a:fillRef idx="1">
+            <a:schemeClr val="accent1"/>
+          </a:fillRef>
+          <a:effectRef idx="0">
+            <a:schemeClr val="accent1"/>
+          </a:effectRef>
+          <a:fontRef idx="minor">
+            <a:schemeClr val="lt1"/>
+          </a:fontRef>
+        </p:style>
+        <p:txBody>
+          <a:bodyPr rtlCol="0" anchor="ctr"/>
+          <a:lstStyle/>
+          <a:p>
+            <a:pPr algn="ctr"/>
+            <a:endParaRPr lang="zh-TW" altLang="en-US"/>
+          </a:p>
+        </p:txBody>
+      </p:sp>
+      <p:sp>
+        <p:nvSpPr>
+          <p:cNvPr id="23" name="流程圖: 合併 22"/>
+          <p:cNvSpPr/>
+          <p:nvPr/>
+        </p:nvSpPr>
+        <p:spPr>
+          <a:xfrm>
+            <a:off x="8286776" y="2714620"/>
+            <a:ext cx="214314" cy="142876"/>
+          </a:xfrm>
+          <a:prstGeom prst="flowChartMerge">
+            <a:avLst/>
+          </a:prstGeom>
+          <a:solidFill>
+            <a:schemeClr val="bg1"/>
+          </a:solidFill>
+        </p:spPr>
+        <p:style>
+          <a:lnRef idx="2">
+            <a:schemeClr val="accent1">
+              <a:shade val="50000"/>
+            </a:schemeClr>
+          </a:lnRef>
+          <a:fillRef idx="1">
+            <a:schemeClr val="accent1"/>
+          </a:fillRef>
+          <a:effectRef idx="0">
+            <a:schemeClr val="accent1"/>
+          </a:effectRef>
+          <a:fontRef idx="minor">
+            <a:schemeClr val="lt1"/>
+          </a:fontRef>
+        </p:style>
+        <p:txBody>
+          <a:bodyPr rtlCol="0" anchor="ctr"/>
+          <a:lstStyle/>
+          <a:p>
+            <a:pPr algn="ctr"/>
+            <a:endParaRPr lang="zh-TW" altLang="en-US"/>
+          </a:p>
+        </p:txBody>
+      </p:sp>
+      <p:sp>
+        <p:nvSpPr>
+          <p:cNvPr id="24" name="文字方塊 23"/>
+          <p:cNvSpPr txBox="1"/>
+          <p:nvPr/>
+        </p:nvSpPr>
+        <p:spPr>
+          <a:xfrm>
+            <a:off x="428596" y="1285860"/>
+            <a:ext cx="1511824" cy="369332"/>
+          </a:xfrm>
+          <a:prstGeom prst="rect">
+            <a:avLst/>
+          </a:prstGeom>
+          <a:noFill/>
+        </p:spPr>
+        <p:txBody>
+          <a:bodyPr wrap="none" rtlCol="0">
+            <a:spAutoFit/>
+          </a:bodyPr>
+          <a:lstStyle/>
+          <a:p>
+            <a:r>
+              <a:rPr lang="en-US" altLang="zh-TW" b="1" dirty="0" smtClean="0"/>
+              <a:t>Create a table</a:t>
+            </a:r>
+            <a:endParaRPr lang="zh-TW" altLang="en-US" b="1" dirty="0"/>
+          </a:p>
+        </p:txBody>
+      </p:sp>
+      <p:sp>
+        <p:nvSpPr>
+          <p:cNvPr id="25" name="文字方塊 24"/>
+          <p:cNvSpPr txBox="1"/>
+          <p:nvPr/>
+        </p:nvSpPr>
+        <p:spPr>
+          <a:xfrm>
+            <a:off x="428596" y="2214554"/>
+            <a:ext cx="1439561" cy="369332"/>
+          </a:xfrm>
+          <a:prstGeom prst="rect">
+            <a:avLst/>
+          </a:prstGeom>
+          <a:noFill/>
+        </p:spPr>
+        <p:txBody>
+          <a:bodyPr wrap="none" rtlCol="0">
+            <a:spAutoFit/>
+          </a:bodyPr>
+          <a:lstStyle/>
+          <a:p>
+            <a:r>
+              <a:rPr lang="en-US" altLang="zh-TW" b="1" dirty="0" smtClean="0"/>
+              <a:t>Delete tables</a:t>
+            </a:r>
+            <a:endParaRPr lang="zh-TW" altLang="en-US" b="1" dirty="0"/>
+          </a:p>
+        </p:txBody>
+      </p:sp>
+    </p:spTree>
+  </p:cSld>
+  <p:clrMapOvr>
+    <a:masterClrMapping/>
+  </p:clrMapOvr>
+</p:sld>
+</file>
+
+<file path=ppt/slides/slide4.xml><?xml version="1.0" encoding="utf-8"?>
+<p:sld xmlns:a="http://schemas.openxmlformats.org/drawingml/2006/main" xmlns:r="http://schemas.openxmlformats.org/officeDocument/2006/relationships" xmlns:p="http://schemas.openxmlformats.org/presentationml/2006/main">
+  <p:cSld>
+    <p:spTree>
+      <p:nvGrpSpPr>
+        <p:cNvPr id="1" name=""/>
+        <p:cNvGrpSpPr/>
+        <p:nvPr/>
+      </p:nvGrpSpPr>
+      <p:grpSpPr>
+        <a:xfrm>
+          <a:off x="0" y="0"/>
+          <a:ext cx="0" cy="0"/>
+          <a:chOff x="0" y="0"/>
+          <a:chExt cx="0" cy="0"/>
+        </a:xfrm>
+      </p:grpSpPr>
+      <p:sp>
+        <p:nvSpPr>
+          <p:cNvPr id="7" name="矩形 6"/>
+          <p:cNvSpPr/>
+          <p:nvPr/>
+        </p:nvSpPr>
+        <p:spPr>
+          <a:xfrm>
+            <a:off x="428596" y="1071546"/>
+            <a:ext cx="8286808" cy="785818"/>
+          </a:xfrm>
+          <a:prstGeom prst="rect">
+            <a:avLst/>
+          </a:prstGeom>
+          <a:solidFill>
+            <a:schemeClr val="bg1">
+              <a:lumMod val="95000"/>
+            </a:schemeClr>
+          </a:solidFill>
+        </p:spPr>
+        <p:style>
+          <a:lnRef idx="2">
+            <a:schemeClr val="accent1">
+              <a:shade val="50000"/>
+            </a:schemeClr>
+          </a:lnRef>
+          <a:fillRef idx="1">
+            <a:schemeClr val="accent1"/>
+          </a:fillRef>
+          <a:effectRef idx="0">
+            <a:schemeClr val="accent1"/>
+          </a:effectRef>
+          <a:fontRef idx="minor">
+            <a:schemeClr val="lt1"/>
+          </a:fontRef>
+        </p:style>
+        <p:txBody>
+          <a:bodyPr rtlCol="0" anchor="ctr"/>
+          <a:lstStyle/>
+          <a:p>
+            <a:pPr algn="ctr"/>
+            <a:endParaRPr lang="zh-TW" altLang="en-US" dirty="0"/>
+          </a:p>
+        </p:txBody>
+      </p:sp>
+      <p:sp>
+        <p:nvSpPr>
+          <p:cNvPr id="6" name="文字方塊 5"/>
+          <p:cNvSpPr txBox="1"/>
+          <p:nvPr/>
+        </p:nvSpPr>
+        <p:spPr>
+          <a:xfrm>
+            <a:off x="500034" y="1214422"/>
+            <a:ext cx="2011724" cy="369332"/>
+          </a:xfrm>
+          <a:prstGeom prst="rect">
+            <a:avLst/>
+          </a:prstGeom>
+          <a:solidFill>
+            <a:schemeClr val="bg1">
+              <a:lumMod val="85000"/>
+            </a:schemeClr>
+          </a:solidFill>
+        </p:spPr>
+        <p:style>
+          <a:lnRef idx="2">
+            <a:schemeClr val="accent1"/>
+          </a:lnRef>
+          <a:fillRef idx="1">
+            <a:schemeClr val="lt1"/>
+          </a:fillRef>
+          <a:effectRef idx="0">
+            <a:schemeClr val="accent1"/>
+          </a:effectRef>
+          <a:fontRef idx="minor">
+            <a:schemeClr val="dk1"/>
+          </a:fontRef>
+        </p:style>
+        <p:txBody>
+          <a:bodyPr wrap="square" rtlCol="0" anchor="ctr">
+            <a:spAutoFit/>
+          </a:bodyPr>
+          <a:lstStyle/>
+          <a:p>
             <a:r>
               <a:rPr lang="en-US" altLang="zh-TW" dirty="0" smtClean="0"/>
-              <a:t>Item</a:t>
+              <a:t>Choose a table…</a:t>
             </a:r>
             <a:endParaRPr lang="zh-TW" altLang="en-US" dirty="0"/>
           </a:p>
         </p:txBody>
       </p:sp>
+      <p:sp>
+        <p:nvSpPr>
+          <p:cNvPr id="28" name="文字方塊 27"/>
+          <p:cNvSpPr txBox="1"/>
+          <p:nvPr/>
+        </p:nvSpPr>
+        <p:spPr>
+          <a:xfrm>
+            <a:off x="3428992" y="0"/>
+            <a:ext cx="2996782" cy="492443"/>
+          </a:xfrm>
+          <a:prstGeom prst="rect">
+            <a:avLst/>
+          </a:prstGeom>
+          <a:noFill/>
+        </p:spPr>
+        <p:txBody>
+          <a:bodyPr wrap="none" rtlCol="0">
+            <a:spAutoFit/>
+          </a:bodyPr>
+          <a:lstStyle/>
+          <a:p>
+            <a:r>
+              <a:rPr lang="en-US" altLang="zh-TW" sz="2600" dirty="0" err="1" smtClean="0"/>
+              <a:t>DynamoDB</a:t>
+            </a:r>
+            <a:r>
+              <a:rPr lang="en-US" altLang="zh-TW" sz="2600" dirty="0" smtClean="0"/>
+              <a:t> Manager</a:t>
+            </a:r>
+            <a:endParaRPr lang="zh-TW" altLang="en-US" sz="2600" dirty="0"/>
+          </a:p>
+        </p:txBody>
+      </p:sp>
+      <p:sp>
+        <p:nvSpPr>
+          <p:cNvPr id="29" name="流程圖: 合併 28"/>
+          <p:cNvSpPr/>
+          <p:nvPr/>
+        </p:nvSpPr>
+        <p:spPr>
+          <a:xfrm>
+            <a:off x="2143108" y="1357298"/>
+            <a:ext cx="214314" cy="142876"/>
+          </a:xfrm>
+          <a:prstGeom prst="flowChartMerge">
+            <a:avLst/>
+          </a:prstGeom>
+          <a:solidFill>
+            <a:schemeClr val="bg1"/>
+          </a:solidFill>
+        </p:spPr>
+        <p:style>
+          <a:lnRef idx="2">
+            <a:schemeClr val="accent1">
+              <a:shade val="50000"/>
+            </a:schemeClr>
+          </a:lnRef>
+          <a:fillRef idx="1">
+            <a:schemeClr val="accent1"/>
+          </a:fillRef>
+          <a:effectRef idx="0">
+            <a:schemeClr val="accent1"/>
+          </a:effectRef>
+          <a:fontRef idx="minor">
+            <a:schemeClr val="lt1"/>
+          </a:fontRef>
+        </p:style>
+        <p:txBody>
+          <a:bodyPr rtlCol="0" anchor="ctr"/>
+          <a:lstStyle/>
+          <a:p>
+            <a:pPr algn="ctr"/>
+            <a:endParaRPr lang="zh-TW" altLang="en-US"/>
+          </a:p>
+        </p:txBody>
+      </p:sp>
+      <p:sp>
+        <p:nvSpPr>
+          <p:cNvPr id="19" name="文字方塊 18"/>
+          <p:cNvSpPr txBox="1"/>
+          <p:nvPr/>
+        </p:nvSpPr>
+        <p:spPr>
+          <a:xfrm>
+            <a:off x="428596" y="642918"/>
+            <a:ext cx="1661160" cy="430887"/>
+          </a:xfrm>
+          <a:prstGeom prst="rect">
+            <a:avLst/>
+          </a:prstGeom>
+          <a:noFill/>
+          <a:ln>
+            <a:solidFill>
+              <a:schemeClr val="bg1">
+                <a:lumMod val="65000"/>
+              </a:schemeClr>
+            </a:solidFill>
+          </a:ln>
+        </p:spPr>
+        <p:txBody>
+          <a:bodyPr wrap="none" rtlCol="0">
+            <a:spAutoFit/>
+          </a:bodyPr>
+          <a:lstStyle/>
+          <a:p>
+            <a:r>
+              <a:rPr lang="en-US" altLang="zh-TW" sz="2200" dirty="0" smtClean="0"/>
+              <a:t>DB Overview</a:t>
+            </a:r>
+            <a:endParaRPr lang="zh-TW" altLang="en-US" sz="2200" dirty="0"/>
+          </a:p>
+        </p:txBody>
+      </p:sp>
+      <p:sp>
+        <p:nvSpPr>
+          <p:cNvPr id="20" name="文字方塊 19"/>
+          <p:cNvSpPr txBox="1"/>
+          <p:nvPr/>
+        </p:nvSpPr>
+        <p:spPr>
+          <a:xfrm>
+            <a:off x="2087217" y="642918"/>
+            <a:ext cx="1891480" cy="430887"/>
+          </a:xfrm>
+          <a:prstGeom prst="rect">
+            <a:avLst/>
+          </a:prstGeom>
+          <a:noFill/>
+          <a:ln>
+            <a:solidFill>
+              <a:schemeClr val="bg1">
+                <a:lumMod val="65000"/>
+              </a:schemeClr>
+            </a:solidFill>
+          </a:ln>
+        </p:spPr>
+        <p:txBody>
+          <a:bodyPr wrap="none" rtlCol="0">
+            <a:spAutoFit/>
+          </a:bodyPr>
+          <a:lstStyle/>
+          <a:p>
+            <a:r>
+              <a:rPr lang="en-US" altLang="zh-TW" sz="2200" dirty="0" smtClean="0"/>
+              <a:t>Manage Tables</a:t>
+            </a:r>
+            <a:endParaRPr lang="zh-TW" altLang="en-US" sz="2200" dirty="0"/>
+          </a:p>
+        </p:txBody>
+      </p:sp>
+      <p:sp>
+        <p:nvSpPr>
+          <p:cNvPr id="21" name="文字方塊 20"/>
+          <p:cNvSpPr txBox="1"/>
+          <p:nvPr/>
+        </p:nvSpPr>
+        <p:spPr>
+          <a:xfrm>
+            <a:off x="3944605" y="642918"/>
+            <a:ext cx="2484783" cy="430887"/>
+          </a:xfrm>
+          <a:prstGeom prst="rect">
+            <a:avLst/>
+          </a:prstGeom>
+          <a:solidFill>
+            <a:schemeClr val="bg1">
+              <a:lumMod val="85000"/>
+            </a:schemeClr>
+          </a:solidFill>
+          <a:ln>
+            <a:solidFill>
+              <a:schemeClr val="bg1">
+                <a:lumMod val="65000"/>
+              </a:schemeClr>
+            </a:solidFill>
+          </a:ln>
+        </p:spPr>
+        <p:txBody>
+          <a:bodyPr wrap="none" rtlCol="0">
+            <a:spAutoFit/>
+          </a:bodyPr>
+          <a:lstStyle/>
+          <a:p>
+            <a:r>
+              <a:rPr lang="en-US" altLang="zh-TW" sz="2200" dirty="0" smtClean="0"/>
+              <a:t>Manage Table Items</a:t>
+            </a:r>
+            <a:endParaRPr lang="zh-TW" altLang="en-US" sz="2200" dirty="0"/>
+          </a:p>
+        </p:txBody>
+      </p:sp>
+    </p:spTree>
+  </p:cSld>
+  <p:clrMapOvr>
+    <a:masterClrMapping/>
+  </p:clrMapOvr>
+</p:sld>
+</file>
+
+<file path=ppt/slides/slide5.xml><?xml version="1.0" encoding="utf-8"?>
+<p:sld xmlns:a="http://schemas.openxmlformats.org/drawingml/2006/main" xmlns:r="http://schemas.openxmlformats.org/officeDocument/2006/relationships" xmlns:p="http://schemas.openxmlformats.org/presentationml/2006/main">
+  <p:cSld>
+    <p:spTree>
+      <p:nvGrpSpPr>
+        <p:cNvPr id="1" name=""/>
+        <p:cNvGrpSpPr/>
+        <p:nvPr/>
+      </p:nvGrpSpPr>
+      <p:grpSpPr>
+        <a:xfrm>
+          <a:off x="0" y="0"/>
+          <a:ext cx="0" cy="0"/>
+          <a:chOff x="0" y="0"/>
+          <a:chExt cx="0" cy="0"/>
+        </a:xfrm>
+      </p:grpSpPr>
+      <p:sp>
+        <p:nvSpPr>
+          <p:cNvPr id="4" name="文字方塊 3"/>
+          <p:cNvSpPr txBox="1"/>
+          <p:nvPr/>
+        </p:nvSpPr>
+        <p:spPr>
+          <a:xfrm>
+            <a:off x="0" y="0"/>
+            <a:ext cx="2535694" cy="430887"/>
+          </a:xfrm>
+          <a:prstGeom prst="rect">
+            <a:avLst/>
+          </a:prstGeom>
+        </p:spPr>
+        <p:style>
+          <a:lnRef idx="2">
+            <a:schemeClr val="accent2"/>
+          </a:lnRef>
+          <a:fillRef idx="1">
+            <a:schemeClr val="lt1"/>
+          </a:fillRef>
+          <a:effectRef idx="0">
+            <a:schemeClr val="accent2"/>
+          </a:effectRef>
+          <a:fontRef idx="minor">
+            <a:schemeClr val="dk1"/>
+          </a:fontRef>
+        </p:style>
+        <p:txBody>
+          <a:bodyPr wrap="none" rtlCol="0">
+            <a:spAutoFit/>
+          </a:bodyPr>
+          <a:lstStyle/>
+          <a:p>
+            <a:r>
+              <a:rPr lang="en-US" altLang="zh-TW" sz="2200" b="1" dirty="0" smtClean="0"/>
+              <a:t>Manage Table Items</a:t>
+            </a:r>
+            <a:endParaRPr lang="zh-TW" altLang="en-US" sz="2200" b="1" dirty="0"/>
+          </a:p>
+        </p:txBody>
+      </p:sp>
+      <p:sp>
+        <p:nvSpPr>
+          <p:cNvPr id="5" name="文字方塊 4"/>
+          <p:cNvSpPr txBox="1"/>
+          <p:nvPr/>
+        </p:nvSpPr>
+        <p:spPr>
+          <a:xfrm>
+            <a:off x="357158" y="928670"/>
+            <a:ext cx="2500330" cy="369332"/>
+          </a:xfrm>
+          <a:prstGeom prst="rect">
+            <a:avLst/>
+          </a:prstGeom>
+          <a:solidFill>
+            <a:schemeClr val="bg1">
+              <a:lumMod val="85000"/>
+            </a:schemeClr>
+          </a:solidFill>
+        </p:spPr>
+        <p:style>
+          <a:lnRef idx="2">
+            <a:schemeClr val="accent1"/>
+          </a:lnRef>
+          <a:fillRef idx="1">
+            <a:schemeClr val="lt1"/>
+          </a:fillRef>
+          <a:effectRef idx="0">
+            <a:schemeClr val="accent1"/>
+          </a:effectRef>
+          <a:fontRef idx="minor">
+            <a:schemeClr val="dk1"/>
+          </a:fontRef>
+        </p:style>
+        <p:txBody>
+          <a:bodyPr wrap="square" rtlCol="0" anchor="ctr">
+            <a:spAutoFit/>
+          </a:bodyPr>
+          <a:lstStyle/>
+          <a:p>
+            <a:r>
+              <a:rPr lang="en-US" altLang="zh-TW" dirty="0" smtClean="0"/>
+              <a:t>Choose a table…</a:t>
+            </a:r>
+            <a:endParaRPr lang="zh-TW" altLang="en-US" dirty="0"/>
+          </a:p>
+        </p:txBody>
+      </p:sp>
+      <p:sp>
+        <p:nvSpPr>
+          <p:cNvPr id="6" name="流程圖: 合併 5"/>
+          <p:cNvSpPr/>
+          <p:nvPr/>
+        </p:nvSpPr>
+        <p:spPr>
+          <a:xfrm>
+            <a:off x="2500298" y="1071546"/>
+            <a:ext cx="214314" cy="142876"/>
+          </a:xfrm>
+          <a:prstGeom prst="flowChartMerge">
+            <a:avLst/>
+          </a:prstGeom>
+          <a:solidFill>
+            <a:schemeClr val="bg1"/>
+          </a:solidFill>
+        </p:spPr>
+        <p:style>
+          <a:lnRef idx="2">
+            <a:schemeClr val="accent1">
+              <a:shade val="50000"/>
+            </a:schemeClr>
+          </a:lnRef>
+          <a:fillRef idx="1">
+            <a:schemeClr val="accent1"/>
+          </a:fillRef>
+          <a:effectRef idx="0">
+            <a:schemeClr val="accent1"/>
+          </a:effectRef>
+          <a:fontRef idx="minor">
+            <a:schemeClr val="lt1"/>
+          </a:fontRef>
+        </p:style>
+        <p:txBody>
+          <a:bodyPr rtlCol="0" anchor="ctr"/>
+          <a:lstStyle/>
+          <a:p>
+            <a:pPr algn="ctr"/>
+            <a:endParaRPr lang="zh-TW" altLang="en-US"/>
+          </a:p>
+        </p:txBody>
+      </p:sp>
+      <p:sp>
+        <p:nvSpPr>
+          <p:cNvPr id="7" name="文字方塊 6"/>
+          <p:cNvSpPr txBox="1"/>
+          <p:nvPr/>
+        </p:nvSpPr>
+        <p:spPr>
+          <a:xfrm>
+            <a:off x="285720" y="500042"/>
+            <a:ext cx="1414939" cy="400110"/>
+          </a:xfrm>
+          <a:prstGeom prst="rect">
+            <a:avLst/>
+          </a:prstGeom>
+          <a:noFill/>
+        </p:spPr>
+        <p:txBody>
+          <a:bodyPr wrap="none" rtlCol="0">
+            <a:spAutoFit/>
+          </a:bodyPr>
+          <a:lstStyle/>
+          <a:p>
+            <a:r>
+              <a:rPr lang="en-US" altLang="zh-TW" sz="2000" dirty="0" smtClean="0">
+                <a:solidFill>
+                  <a:schemeClr val="tx2">
+                    <a:lumMod val="60000"/>
+                    <a:lumOff val="40000"/>
+                  </a:schemeClr>
+                </a:solidFill>
+              </a:rPr>
+              <a:t>Table Name</a:t>
+            </a:r>
+            <a:endParaRPr lang="zh-TW" altLang="en-US" sz="2000" dirty="0">
+              <a:solidFill>
+                <a:schemeClr val="tx2">
+                  <a:lumMod val="60000"/>
+                  <a:lumOff val="40000"/>
+                </a:schemeClr>
+              </a:solidFill>
+            </a:endParaRPr>
+          </a:p>
+        </p:txBody>
+      </p:sp>
+      <p:sp>
+        <p:nvSpPr>
+          <p:cNvPr id="8" name="文字方塊 7"/>
+          <p:cNvSpPr txBox="1"/>
+          <p:nvPr/>
+        </p:nvSpPr>
+        <p:spPr>
+          <a:xfrm>
+            <a:off x="285720" y="1547328"/>
+            <a:ext cx="1592231" cy="400110"/>
+          </a:xfrm>
+          <a:prstGeom prst="rect">
+            <a:avLst/>
+          </a:prstGeom>
+          <a:noFill/>
+        </p:spPr>
+        <p:txBody>
+          <a:bodyPr wrap="none" rtlCol="0">
+            <a:spAutoFit/>
+          </a:bodyPr>
+          <a:lstStyle/>
+          <a:p>
+            <a:r>
+              <a:rPr lang="en-US" altLang="zh-TW" sz="2000" dirty="0" smtClean="0">
+                <a:solidFill>
+                  <a:schemeClr val="tx2">
+                    <a:lumMod val="60000"/>
+                    <a:lumOff val="40000"/>
+                  </a:schemeClr>
+                </a:solidFill>
+              </a:rPr>
+              <a:t>Update </a:t>
+            </a:r>
+            <a:r>
+              <a:rPr lang="en-US" altLang="zh-TW" sz="2000" dirty="0" smtClean="0">
+                <a:solidFill>
+                  <a:schemeClr val="tx2">
+                    <a:lumMod val="60000"/>
+                    <a:lumOff val="40000"/>
+                  </a:schemeClr>
+                </a:solidFill>
+              </a:rPr>
+              <a:t>Items</a:t>
+            </a:r>
+            <a:endParaRPr lang="zh-TW" altLang="en-US" sz="2000" dirty="0">
+              <a:solidFill>
+                <a:schemeClr val="tx2">
+                  <a:lumMod val="60000"/>
+                  <a:lumOff val="40000"/>
+                </a:schemeClr>
+              </a:solidFill>
+            </a:endParaRPr>
+          </a:p>
+        </p:txBody>
+      </p:sp>
+      <p:sp>
+        <p:nvSpPr>
+          <p:cNvPr id="50" name="文字方塊 49"/>
+          <p:cNvSpPr txBox="1"/>
+          <p:nvPr/>
+        </p:nvSpPr>
+        <p:spPr>
+          <a:xfrm>
+            <a:off x="7929586" y="4429132"/>
+            <a:ext cx="874150" cy="369332"/>
+          </a:xfrm>
+          <a:prstGeom prst="rect">
+            <a:avLst/>
+          </a:prstGeom>
+          <a:solidFill>
+            <a:schemeClr val="bg1">
+              <a:lumMod val="85000"/>
+            </a:schemeClr>
+          </a:solidFill>
+        </p:spPr>
+        <p:style>
+          <a:lnRef idx="2">
+            <a:schemeClr val="accent1"/>
+          </a:lnRef>
+          <a:fillRef idx="1">
+            <a:schemeClr val="lt1"/>
+          </a:fillRef>
+          <a:effectRef idx="0">
+            <a:schemeClr val="accent1"/>
+          </a:effectRef>
+          <a:fontRef idx="minor">
+            <a:schemeClr val="dk1"/>
+          </a:fontRef>
+        </p:style>
+        <p:txBody>
+          <a:bodyPr wrap="none" rtlCol="0" anchor="ctr">
+            <a:spAutoFit/>
+          </a:bodyPr>
+          <a:lstStyle/>
+          <a:p>
+            <a:r>
+              <a:rPr lang="en-US" altLang="zh-TW" dirty="0" smtClean="0"/>
+              <a:t>Update</a:t>
+            </a:r>
+            <a:endParaRPr lang="zh-TW" altLang="en-US" dirty="0"/>
+          </a:p>
+        </p:txBody>
+      </p:sp>
+      <p:sp>
+        <p:nvSpPr>
+          <p:cNvPr id="27" name="文字方塊 26"/>
+          <p:cNvSpPr txBox="1"/>
+          <p:nvPr/>
+        </p:nvSpPr>
+        <p:spPr>
+          <a:xfrm>
+            <a:off x="1857356" y="571480"/>
+            <a:ext cx="949299" cy="276999"/>
+          </a:xfrm>
+          <a:prstGeom prst="rect">
+            <a:avLst/>
+          </a:prstGeom>
+          <a:solidFill>
+            <a:schemeClr val="accent5"/>
+          </a:solidFill>
+        </p:spPr>
+        <p:txBody>
+          <a:bodyPr wrap="square" rtlCol="0">
+            <a:spAutoFit/>
+          </a:bodyPr>
+          <a:lstStyle/>
+          <a:p>
+            <a:r>
+              <a:rPr lang="en-US" altLang="zh-TW" sz="1200" dirty="0" err="1" smtClean="0">
+                <a:solidFill>
+                  <a:schemeClr val="bg1"/>
+                </a:solidFill>
+                <a:latin typeface="Consolas" pitchFamily="49" charset="0"/>
+                <a:ea typeface="Cambria Math" pitchFamily="18" charset="0"/>
+                <a:cs typeface="Consolas" pitchFamily="49" charset="0"/>
+              </a:rPr>
+              <a:t>tableName</a:t>
+            </a:r>
+            <a:endParaRPr lang="zh-TW" altLang="en-US" sz="1200" dirty="0" smtClean="0">
+              <a:solidFill>
+                <a:schemeClr val="bg1"/>
+              </a:solidFill>
+              <a:latin typeface="Consolas" pitchFamily="49" charset="0"/>
+              <a:ea typeface="Cambria Math" pitchFamily="18" charset="0"/>
+              <a:cs typeface="Consolas" pitchFamily="49" charset="0"/>
+            </a:endParaRPr>
+          </a:p>
+        </p:txBody>
+      </p:sp>
+      <p:sp>
+        <p:nvSpPr>
+          <p:cNvPr id="28" name="文字方塊 27"/>
+          <p:cNvSpPr txBox="1"/>
+          <p:nvPr/>
+        </p:nvSpPr>
+        <p:spPr>
+          <a:xfrm>
+            <a:off x="1857356" y="4786322"/>
+            <a:ext cx="5857916" cy="1384995"/>
+          </a:xfrm>
+          <a:prstGeom prst="rect">
+            <a:avLst/>
+          </a:prstGeom>
+          <a:solidFill>
+            <a:schemeClr val="accent5"/>
+          </a:solidFill>
+        </p:spPr>
+        <p:txBody>
+          <a:bodyPr wrap="square" rtlCol="0">
+            <a:spAutoFit/>
+          </a:bodyPr>
+          <a:lstStyle/>
+          <a:p>
+            <a:r>
+              <a:rPr lang="en-US" altLang="zh-TW" sz="1200" dirty="0" smtClean="0">
+                <a:solidFill>
+                  <a:schemeClr val="bg1"/>
+                </a:solidFill>
+                <a:latin typeface="Consolas" pitchFamily="49" charset="0"/>
+                <a:ea typeface="Cambria Math" pitchFamily="18" charset="0"/>
+                <a:cs typeface="Consolas" pitchFamily="49" charset="0"/>
+              </a:rPr>
+              <a:t>items:</a:t>
+            </a:r>
+          </a:p>
+          <a:p>
+            <a:r>
+              <a:rPr lang="en-US" altLang="zh-TW" sz="1200" dirty="0" smtClean="0">
+                <a:solidFill>
+                  <a:schemeClr val="bg1"/>
+                </a:solidFill>
+                <a:latin typeface="Consolas" pitchFamily="49" charset="0"/>
+                <a:ea typeface="Cambria Math" pitchFamily="18" charset="0"/>
+                <a:cs typeface="Consolas" pitchFamily="49" charset="0"/>
+              </a:rPr>
+              <a:t>[</a:t>
+            </a:r>
+          </a:p>
+          <a:p>
+            <a:r>
+              <a:rPr lang="en-US" altLang="zh-TW" sz="1200" dirty="0" smtClean="0">
+                <a:solidFill>
+                  <a:schemeClr val="bg1"/>
+                </a:solidFill>
+                <a:latin typeface="Consolas" pitchFamily="49" charset="0"/>
+                <a:ea typeface="Cambria Math" pitchFamily="18" charset="0"/>
+                <a:cs typeface="Consolas" pitchFamily="49" charset="0"/>
+              </a:rPr>
+              <a:t>  {id: 0, </a:t>
+            </a:r>
+            <a:r>
+              <a:rPr lang="en-US" altLang="zh-TW" sz="1200" dirty="0" err="1" smtClean="0">
+                <a:solidFill>
+                  <a:schemeClr val="bg1"/>
+                </a:solidFill>
+                <a:latin typeface="Consolas" pitchFamily="49" charset="0"/>
+                <a:ea typeface="Cambria Math" pitchFamily="18" charset="0"/>
+                <a:cs typeface="Consolas" pitchFamily="49" charset="0"/>
+              </a:rPr>
+              <a:t>updateMethod</a:t>
+            </a:r>
+            <a:r>
+              <a:rPr lang="en-US" altLang="zh-TW" sz="1200" dirty="0" smtClean="0">
+                <a:solidFill>
+                  <a:schemeClr val="bg1"/>
+                </a:solidFill>
+                <a:latin typeface="Consolas" pitchFamily="49" charset="0"/>
+                <a:ea typeface="Cambria Math" pitchFamily="18" charset="0"/>
+                <a:cs typeface="Consolas" pitchFamily="49" charset="0"/>
+              </a:rPr>
+              <a:t>: delete, </a:t>
+            </a:r>
+            <a:r>
+              <a:rPr lang="en-US" altLang="zh-TW" sz="1200" dirty="0" err="1" smtClean="0">
+                <a:solidFill>
+                  <a:schemeClr val="bg1"/>
+                </a:solidFill>
+                <a:latin typeface="Consolas" pitchFamily="49" charset="0"/>
+                <a:ea typeface="Cambria Math" pitchFamily="18" charset="0"/>
+                <a:cs typeface="Consolas" pitchFamily="49" charset="0"/>
+              </a:rPr>
+              <a:t>attrs</a:t>
+            </a:r>
+            <a:r>
+              <a:rPr lang="en-US" altLang="zh-TW" sz="1200" dirty="0" smtClean="0">
+                <a:solidFill>
+                  <a:schemeClr val="bg1"/>
+                </a:solidFill>
+                <a:latin typeface="Consolas" pitchFamily="49" charset="0"/>
+                <a:ea typeface="Cambria Math" pitchFamily="18" charset="0"/>
+                <a:cs typeface="Consolas" pitchFamily="49" charset="0"/>
+              </a:rPr>
+              <a:t>: {attr1: A0, attr2: B0}},</a:t>
+            </a:r>
+          </a:p>
+          <a:p>
+            <a:r>
+              <a:rPr lang="en-US" altLang="zh-TW" sz="1200" dirty="0" smtClean="0">
+                <a:solidFill>
+                  <a:schemeClr val="bg1"/>
+                </a:solidFill>
+                <a:latin typeface="Consolas" pitchFamily="49" charset="0"/>
+                <a:ea typeface="Cambria Math" pitchFamily="18" charset="0"/>
+                <a:cs typeface="Consolas" pitchFamily="49" charset="0"/>
+              </a:rPr>
+              <a:t>  {id: 1, </a:t>
+            </a:r>
+            <a:r>
+              <a:rPr lang="en-US" altLang="zh-TW" sz="1200" dirty="0" err="1" smtClean="0">
+                <a:solidFill>
+                  <a:schemeClr val="bg1"/>
+                </a:solidFill>
+                <a:latin typeface="Consolas" pitchFamily="49" charset="0"/>
+                <a:ea typeface="Cambria Math" pitchFamily="18" charset="0"/>
+                <a:cs typeface="Consolas" pitchFamily="49" charset="0"/>
+              </a:rPr>
+              <a:t>updateMethod</a:t>
+            </a:r>
+            <a:r>
+              <a:rPr lang="en-US" altLang="zh-TW" sz="1200" dirty="0" smtClean="0">
+                <a:solidFill>
+                  <a:schemeClr val="bg1"/>
+                </a:solidFill>
+                <a:latin typeface="Consolas" pitchFamily="49" charset="0"/>
+                <a:ea typeface="Cambria Math" pitchFamily="18" charset="0"/>
+                <a:cs typeface="Consolas" pitchFamily="49" charset="0"/>
+              </a:rPr>
+              <a:t>: modify, </a:t>
+            </a:r>
+            <a:r>
+              <a:rPr lang="en-US" altLang="zh-TW" sz="1200" dirty="0" err="1" smtClean="0">
+                <a:solidFill>
+                  <a:schemeClr val="bg1"/>
+                </a:solidFill>
+                <a:latin typeface="Consolas" pitchFamily="49" charset="0"/>
+                <a:ea typeface="Cambria Math" pitchFamily="18" charset="0"/>
+                <a:cs typeface="Consolas" pitchFamily="49" charset="0"/>
+              </a:rPr>
+              <a:t>attrs</a:t>
+            </a:r>
+            <a:r>
+              <a:rPr lang="en-US" altLang="zh-TW" sz="1200" dirty="0" smtClean="0">
+                <a:solidFill>
+                  <a:schemeClr val="bg1"/>
+                </a:solidFill>
+                <a:latin typeface="Consolas" pitchFamily="49" charset="0"/>
+                <a:ea typeface="Cambria Math" pitchFamily="18" charset="0"/>
+                <a:cs typeface="Consolas" pitchFamily="49" charset="0"/>
+              </a:rPr>
+              <a:t>: {attr1: A1, attr2: B1}},</a:t>
+            </a:r>
+          </a:p>
+          <a:p>
+            <a:r>
+              <a:rPr lang="en-US" altLang="zh-TW" sz="1200" dirty="0" smtClean="0">
+                <a:solidFill>
+                  <a:schemeClr val="bg1"/>
+                </a:solidFill>
+                <a:latin typeface="Consolas" pitchFamily="49" charset="0"/>
+                <a:ea typeface="Cambria Math" pitchFamily="18" charset="0"/>
+                <a:cs typeface="Consolas" pitchFamily="49" charset="0"/>
+              </a:rPr>
+              <a:t>  {id: 2, </a:t>
+            </a:r>
+            <a:r>
+              <a:rPr lang="en-US" altLang="zh-TW" sz="1200" dirty="0" err="1" smtClean="0">
+                <a:solidFill>
+                  <a:schemeClr val="bg1"/>
+                </a:solidFill>
+                <a:latin typeface="Consolas" pitchFamily="49" charset="0"/>
+                <a:ea typeface="Cambria Math" pitchFamily="18" charset="0"/>
+                <a:cs typeface="Consolas" pitchFamily="49" charset="0"/>
+              </a:rPr>
+              <a:t>updateMethod</a:t>
+            </a:r>
+            <a:r>
+              <a:rPr lang="en-US" altLang="zh-TW" sz="1200" dirty="0" smtClean="0">
+                <a:solidFill>
+                  <a:schemeClr val="bg1"/>
+                </a:solidFill>
+                <a:latin typeface="Consolas" pitchFamily="49" charset="0"/>
+                <a:ea typeface="Cambria Math" pitchFamily="18" charset="0"/>
+                <a:cs typeface="Consolas" pitchFamily="49" charset="0"/>
+              </a:rPr>
+              <a:t>: add, </a:t>
+            </a:r>
+            <a:r>
+              <a:rPr lang="en-US" altLang="zh-TW" sz="1200" dirty="0" err="1" smtClean="0">
+                <a:solidFill>
+                  <a:schemeClr val="bg1"/>
+                </a:solidFill>
+                <a:latin typeface="Consolas" pitchFamily="49" charset="0"/>
+                <a:ea typeface="Cambria Math" pitchFamily="18" charset="0"/>
+                <a:cs typeface="Consolas" pitchFamily="49" charset="0"/>
+              </a:rPr>
+              <a:t>attrs</a:t>
+            </a:r>
+            <a:r>
+              <a:rPr lang="en-US" altLang="zh-TW" sz="1200" dirty="0" smtClean="0">
+                <a:solidFill>
+                  <a:schemeClr val="bg1"/>
+                </a:solidFill>
+                <a:latin typeface="Consolas" pitchFamily="49" charset="0"/>
+                <a:ea typeface="Cambria Math" pitchFamily="18" charset="0"/>
+                <a:cs typeface="Consolas" pitchFamily="49" charset="0"/>
+              </a:rPr>
+              <a:t>: {attr1: A2, attr2: B2}},</a:t>
+            </a:r>
+          </a:p>
+          <a:p>
+            <a:r>
+              <a:rPr lang="en-US" altLang="zh-TW" sz="1200" dirty="0" smtClean="0">
+                <a:solidFill>
+                  <a:schemeClr val="bg1"/>
+                </a:solidFill>
+                <a:latin typeface="Consolas" pitchFamily="49" charset="0"/>
+                <a:ea typeface="Cambria Math" pitchFamily="18" charset="0"/>
+                <a:cs typeface="Consolas" pitchFamily="49" charset="0"/>
+              </a:rPr>
+              <a:t>  {id: 3, </a:t>
+            </a:r>
+            <a:r>
+              <a:rPr lang="en-US" altLang="zh-TW" sz="1200" dirty="0" err="1" smtClean="0">
+                <a:solidFill>
+                  <a:schemeClr val="bg1"/>
+                </a:solidFill>
+                <a:latin typeface="Consolas" pitchFamily="49" charset="0"/>
+                <a:ea typeface="Cambria Math" pitchFamily="18" charset="0"/>
+                <a:cs typeface="Consolas" pitchFamily="49" charset="0"/>
+              </a:rPr>
+              <a:t>updateMethod</a:t>
+            </a:r>
+            <a:r>
+              <a:rPr lang="en-US" altLang="zh-TW" sz="1200" smtClean="0">
+                <a:solidFill>
+                  <a:schemeClr val="bg1"/>
+                </a:solidFill>
+                <a:latin typeface="Consolas" pitchFamily="49" charset="0"/>
+                <a:ea typeface="Cambria Math" pitchFamily="18" charset="0"/>
+                <a:cs typeface="Consolas" pitchFamily="49" charset="0"/>
+              </a:rPr>
+              <a:t>: (</a:t>
+            </a:r>
+            <a:r>
+              <a:rPr lang="en-US" altLang="zh-TW" sz="1200" smtClean="0">
+                <a:solidFill>
+                  <a:schemeClr val="bg1"/>
+                </a:solidFill>
+                <a:latin typeface="Consolas" pitchFamily="49" charset="0"/>
+                <a:ea typeface="Cambria Math" pitchFamily="18" charset="0"/>
+                <a:cs typeface="Consolas" pitchFamily="49" charset="0"/>
+                <a:sym typeface="Wingdings" pitchFamily="2" charset="2"/>
+              </a:rPr>
+              <a:t>empty</a:t>
+            </a:r>
+            <a:r>
+              <a:rPr lang="en-US" altLang="zh-TW" sz="1200" dirty="0" smtClean="0">
+                <a:solidFill>
+                  <a:schemeClr val="bg1"/>
+                </a:solidFill>
+                <a:latin typeface="Consolas" pitchFamily="49" charset="0"/>
+                <a:ea typeface="Cambria Math" pitchFamily="18" charset="0"/>
+                <a:cs typeface="Consolas" pitchFamily="49" charset="0"/>
+                <a:sym typeface="Wingdings" pitchFamily="2" charset="2"/>
+              </a:rPr>
+              <a:t>)</a:t>
+            </a:r>
+            <a:r>
+              <a:rPr lang="en-US" altLang="zh-TW" sz="1200" dirty="0" smtClean="0">
+                <a:solidFill>
+                  <a:schemeClr val="bg1"/>
+                </a:solidFill>
+                <a:latin typeface="Consolas" pitchFamily="49" charset="0"/>
+                <a:ea typeface="Cambria Math" pitchFamily="18" charset="0"/>
+                <a:cs typeface="Consolas" pitchFamily="49" charset="0"/>
+              </a:rPr>
+              <a:t>, </a:t>
+            </a:r>
+            <a:r>
+              <a:rPr lang="en-US" altLang="zh-TW" sz="1200" dirty="0" err="1" smtClean="0">
+                <a:solidFill>
+                  <a:schemeClr val="bg1"/>
+                </a:solidFill>
+                <a:latin typeface="Consolas" pitchFamily="49" charset="0"/>
+                <a:ea typeface="Cambria Math" pitchFamily="18" charset="0"/>
+                <a:cs typeface="Consolas" pitchFamily="49" charset="0"/>
+              </a:rPr>
+              <a:t>attrs</a:t>
+            </a:r>
+            <a:r>
+              <a:rPr lang="en-US" altLang="zh-TW" sz="1200" dirty="0" smtClean="0">
+                <a:solidFill>
+                  <a:schemeClr val="bg1"/>
+                </a:solidFill>
+                <a:latin typeface="Consolas" pitchFamily="49" charset="0"/>
+                <a:ea typeface="Cambria Math" pitchFamily="18" charset="0"/>
+                <a:cs typeface="Consolas" pitchFamily="49" charset="0"/>
+              </a:rPr>
+              <a:t>: {attr1: A2, attr2: B2}},</a:t>
+            </a:r>
+          </a:p>
+          <a:p>
+            <a:r>
+              <a:rPr lang="en-US" altLang="zh-TW" sz="1200" dirty="0" smtClean="0">
+                <a:solidFill>
+                  <a:schemeClr val="bg1"/>
+                </a:solidFill>
+                <a:latin typeface="Consolas" pitchFamily="49" charset="0"/>
+                <a:ea typeface="Cambria Math" pitchFamily="18" charset="0"/>
+                <a:cs typeface="Consolas" pitchFamily="49" charset="0"/>
+              </a:rPr>
+              <a:t>]</a:t>
+            </a:r>
+            <a:endParaRPr lang="zh-TW" altLang="en-US" sz="1200" dirty="0">
+              <a:solidFill>
+                <a:schemeClr val="bg1"/>
+              </a:solidFill>
+              <a:latin typeface="Consolas" pitchFamily="49" charset="0"/>
+              <a:cs typeface="Consolas" pitchFamily="49" charset="0"/>
+            </a:endParaRPr>
+          </a:p>
+        </p:txBody>
+      </p:sp>
+      <p:sp>
+        <p:nvSpPr>
+          <p:cNvPr id="64" name="文字方塊 63"/>
+          <p:cNvSpPr txBox="1"/>
+          <p:nvPr/>
+        </p:nvSpPr>
+        <p:spPr>
+          <a:xfrm>
+            <a:off x="3000364" y="1500174"/>
+            <a:ext cx="1458669" cy="369332"/>
+          </a:xfrm>
+          <a:prstGeom prst="rect">
+            <a:avLst/>
+          </a:prstGeom>
+          <a:solidFill>
+            <a:schemeClr val="bg1">
+              <a:lumMod val="85000"/>
+            </a:schemeClr>
+          </a:solidFill>
+        </p:spPr>
+        <p:style>
+          <a:lnRef idx="2">
+            <a:schemeClr val="accent1"/>
+          </a:lnRef>
+          <a:fillRef idx="1">
+            <a:schemeClr val="lt1"/>
+          </a:fillRef>
+          <a:effectRef idx="0">
+            <a:schemeClr val="accent1"/>
+          </a:effectRef>
+          <a:fontRef idx="minor">
+            <a:schemeClr val="dk1"/>
+          </a:fontRef>
+        </p:style>
+        <p:txBody>
+          <a:bodyPr wrap="none" rtlCol="0" anchor="ctr">
+            <a:spAutoFit/>
+          </a:bodyPr>
+          <a:lstStyle/>
+          <a:p>
+            <a:r>
+              <a:rPr lang="en-US" altLang="zh-TW" dirty="0" smtClean="0"/>
+              <a:t>Add Attribute</a:t>
+            </a:r>
+            <a:endParaRPr lang="zh-TW" altLang="en-US" dirty="0"/>
+          </a:p>
+        </p:txBody>
+      </p:sp>
+      <p:graphicFrame>
+        <p:nvGraphicFramePr>
+          <p:cNvPr id="98" name="表格 97"/>
+          <p:cNvGraphicFramePr>
+            <a:graphicFrameLocks noGrp="1"/>
+          </p:cNvGraphicFramePr>
+          <p:nvPr/>
+        </p:nvGraphicFramePr>
+        <p:xfrm>
+          <a:off x="6858016" y="2000240"/>
+          <a:ext cx="2000264" cy="2357455"/>
+        </p:xfrm>
+        <a:graphic>
+          <a:graphicData uri="http://schemas.openxmlformats.org/drawingml/2006/table">
+            <a:tbl>
+              <a:tblPr firstRow="1" bandRow="1">
+                <a:tableStyleId>{93296810-A885-4BE3-A3E7-6D5BEEA58F35}</a:tableStyleId>
+              </a:tblPr>
+              <a:tblGrid>
+                <a:gridCol w="928694"/>
+                <a:gridCol w="1071570"/>
+              </a:tblGrid>
+              <a:tr h="471491">
+                <a:tc>
+                  <a:txBody>
+                    <a:bodyPr/>
+                    <a:lstStyle/>
+                    <a:p>
+                      <a:pPr marL="0" marR="0" indent="0" algn="l" defTabSz="914400" rtl="0" eaLnBrk="1" fontAlgn="auto" latinLnBrk="0" hangingPunct="1">
+                        <a:lnSpc>
+                          <a:spcPct val="100000"/>
+                        </a:lnSpc>
+                        <a:spcBef>
+                          <a:spcPts val="0"/>
+                        </a:spcBef>
+                        <a:spcAft>
+                          <a:spcPts val="0"/>
+                        </a:spcAft>
+                        <a:buClrTx/>
+                        <a:buSzTx/>
+                        <a:buFontTx/>
+                        <a:buNone/>
+                        <a:tabLst/>
+                        <a:defRPr/>
+                      </a:pPr>
+                      <a:r>
+                        <a:rPr lang="en-US" altLang="zh-TW" dirty="0" smtClean="0"/>
+                        <a:t>attr</a:t>
+                      </a:r>
+                      <a:r>
+                        <a:rPr lang="en-US" altLang="zh-TW" baseline="0" dirty="0" smtClean="0"/>
+                        <a:t>3</a:t>
+                      </a:r>
+                      <a:endParaRPr lang="zh-TW" altLang="en-US" dirty="0" smtClean="0"/>
+                    </a:p>
+                  </a:txBody>
+                  <a:tcPr/>
+                </a:tc>
+                <a:tc>
+                  <a:txBody>
+                    <a:bodyPr/>
+                    <a:lstStyle/>
+                    <a:p>
+                      <a:pPr marL="0" marR="0" indent="0" algn="l" defTabSz="914400" rtl="0" eaLnBrk="1" fontAlgn="auto" latinLnBrk="0" hangingPunct="1">
+                        <a:lnSpc>
+                          <a:spcPct val="100000"/>
+                        </a:lnSpc>
+                        <a:spcBef>
+                          <a:spcPts val="0"/>
+                        </a:spcBef>
+                        <a:spcAft>
+                          <a:spcPts val="0"/>
+                        </a:spcAft>
+                        <a:buClrTx/>
+                        <a:buSzTx/>
+                        <a:buFontTx/>
+                        <a:buNone/>
+                        <a:tabLst/>
+                        <a:defRPr/>
+                      </a:pPr>
+                      <a:r>
+                        <a:rPr lang="en-US" altLang="zh-TW" dirty="0" smtClean="0"/>
+                        <a:t>attr4</a:t>
+                      </a:r>
+                      <a:endParaRPr lang="zh-TW" altLang="en-US" dirty="0" smtClean="0"/>
+                    </a:p>
+                  </a:txBody>
+                  <a:tcPr/>
+                </a:tc>
+              </a:tr>
+              <a:tr h="471491">
+                <a:tc>
+                  <a:txBody>
+                    <a:bodyPr/>
+                    <a:lstStyle/>
+                    <a:p>
+                      <a:r>
+                        <a:rPr lang="en-US" altLang="zh-TW" dirty="0" smtClean="0"/>
+                        <a:t>C0</a:t>
+                      </a:r>
+                      <a:endParaRPr lang="zh-TW" altLang="en-US" dirty="0"/>
+                    </a:p>
+                  </a:txBody>
+                  <a:tcPr anchor="ctr"/>
+                </a:tc>
+                <a:tc>
+                  <a:txBody>
+                    <a:bodyPr/>
+                    <a:lstStyle/>
+                    <a:p>
+                      <a:endParaRPr lang="zh-TW" altLang="en-US" dirty="0"/>
+                    </a:p>
+                  </a:txBody>
+                  <a:tcPr anchor="ctr"/>
+                </a:tc>
+              </a:tr>
+              <a:tr h="471491">
+                <a:tc>
+                  <a:txBody>
+                    <a:bodyPr/>
+                    <a:lstStyle/>
+                    <a:p>
+                      <a:endParaRPr lang="zh-TW" altLang="en-US" dirty="0"/>
+                    </a:p>
+                  </a:txBody>
+                  <a:tcPr anchor="ctr"/>
+                </a:tc>
+                <a:tc>
+                  <a:txBody>
+                    <a:bodyPr/>
+                    <a:lstStyle/>
+                    <a:p>
+                      <a:r>
+                        <a:rPr lang="en-US" altLang="zh-TW" dirty="0" smtClean="0"/>
+                        <a:t>D0</a:t>
+                      </a:r>
+                      <a:endParaRPr lang="zh-TW" altLang="en-US" dirty="0"/>
+                    </a:p>
+                  </a:txBody>
+                  <a:tcPr anchor="ctr"/>
+                </a:tc>
+              </a:tr>
+              <a:tr h="471491">
+                <a:tc>
+                  <a:txBody>
+                    <a:bodyPr/>
+                    <a:lstStyle/>
+                    <a:p>
+                      <a:endParaRPr lang="zh-TW" altLang="en-US" dirty="0"/>
+                    </a:p>
+                  </a:txBody>
+                  <a:tcPr anchor="ctr"/>
+                </a:tc>
+                <a:tc>
+                  <a:txBody>
+                    <a:bodyPr/>
+                    <a:lstStyle/>
+                    <a:p>
+                      <a:endParaRPr lang="zh-TW" altLang="en-US" dirty="0"/>
+                    </a:p>
+                  </a:txBody>
+                  <a:tcPr anchor="ctr"/>
+                </a:tc>
+              </a:tr>
+              <a:tr h="471491">
+                <a:tc>
+                  <a:txBody>
+                    <a:bodyPr/>
+                    <a:lstStyle/>
+                    <a:p>
+                      <a:endParaRPr lang="zh-TW" altLang="en-US" dirty="0"/>
+                    </a:p>
+                  </a:txBody>
+                  <a:tcPr anchor="ctr"/>
+                </a:tc>
+                <a:tc>
+                  <a:txBody>
+                    <a:bodyPr/>
+                    <a:lstStyle/>
+                    <a:p>
+                      <a:endParaRPr lang="zh-TW" altLang="en-US" dirty="0"/>
+                    </a:p>
+                  </a:txBody>
+                  <a:tcPr anchor="ctr"/>
+                </a:tc>
+              </a:tr>
+            </a:tbl>
+          </a:graphicData>
+        </a:graphic>
+      </p:graphicFrame>
+      <p:pic>
+        <p:nvPicPr>
+          <p:cNvPr id="99" name="Picture 2" descr="C:\Users\Joyce\Downloads\iconfinder_f-cross_256_282471.png"/>
+          <p:cNvPicPr>
+            <a:picLocks noChangeAspect="1" noChangeArrowheads="1"/>
+          </p:cNvPicPr>
+          <p:nvPr/>
+        </p:nvPicPr>
+        <p:blipFill>
+          <a:blip r:embed="rId2" cstate="print"/>
+          <a:srcRect/>
+          <a:stretch>
+            <a:fillRect/>
+          </a:stretch>
+        </p:blipFill>
+        <p:spPr bwMode="auto">
+          <a:xfrm>
+            <a:off x="7572396" y="2071678"/>
+            <a:ext cx="177779" cy="177779"/>
+          </a:xfrm>
+          <a:prstGeom prst="rect">
+            <a:avLst/>
+          </a:prstGeom>
+          <a:noFill/>
+        </p:spPr>
+      </p:pic>
+      <p:pic>
+        <p:nvPicPr>
+          <p:cNvPr id="100" name="Picture 2" descr="C:\Users\Joyce\Downloads\iconfinder_f-cross_256_282471.png"/>
+          <p:cNvPicPr>
+            <a:picLocks noChangeAspect="1" noChangeArrowheads="1"/>
+          </p:cNvPicPr>
+          <p:nvPr/>
+        </p:nvPicPr>
+        <p:blipFill>
+          <a:blip r:embed="rId2" cstate="print"/>
+          <a:srcRect/>
+          <a:stretch>
+            <a:fillRect/>
+          </a:stretch>
+        </p:blipFill>
+        <p:spPr bwMode="auto">
+          <a:xfrm>
+            <a:off x="8643966" y="2071678"/>
+            <a:ext cx="177779" cy="177779"/>
+          </a:xfrm>
+          <a:prstGeom prst="rect">
+            <a:avLst/>
+          </a:prstGeom>
+          <a:noFill/>
+        </p:spPr>
+      </p:pic>
+      <p:sp>
+        <p:nvSpPr>
+          <p:cNvPr id="40" name="文字方塊 39"/>
+          <p:cNvSpPr txBox="1"/>
+          <p:nvPr/>
+        </p:nvSpPr>
+        <p:spPr>
+          <a:xfrm>
+            <a:off x="1857356" y="1500174"/>
+            <a:ext cx="1046184" cy="369332"/>
+          </a:xfrm>
+          <a:prstGeom prst="rect">
+            <a:avLst/>
+          </a:prstGeom>
+          <a:solidFill>
+            <a:schemeClr val="bg1">
+              <a:lumMod val="85000"/>
+            </a:schemeClr>
+          </a:solidFill>
+        </p:spPr>
+        <p:style>
+          <a:lnRef idx="2">
+            <a:schemeClr val="accent1"/>
+          </a:lnRef>
+          <a:fillRef idx="1">
+            <a:schemeClr val="lt1"/>
+          </a:fillRef>
+          <a:effectRef idx="0">
+            <a:schemeClr val="accent1"/>
+          </a:effectRef>
+          <a:fontRef idx="minor">
+            <a:schemeClr val="dk1"/>
+          </a:fontRef>
+        </p:style>
+        <p:txBody>
+          <a:bodyPr wrap="none" rtlCol="0" anchor="ctr">
+            <a:spAutoFit/>
+          </a:bodyPr>
+          <a:lstStyle/>
+          <a:p>
+            <a:r>
+              <a:rPr lang="en-US" altLang="zh-TW" dirty="0" smtClean="0"/>
+              <a:t>Add Item</a:t>
+            </a:r>
+            <a:endParaRPr lang="zh-TW" altLang="en-US" dirty="0"/>
+          </a:p>
+        </p:txBody>
+      </p:sp>
+      <p:graphicFrame>
+        <p:nvGraphicFramePr>
+          <p:cNvPr id="31" name="表格 30"/>
+          <p:cNvGraphicFramePr>
+            <a:graphicFrameLocks noGrp="1"/>
+          </p:cNvGraphicFramePr>
+          <p:nvPr/>
+        </p:nvGraphicFramePr>
+        <p:xfrm>
+          <a:off x="357158" y="2000240"/>
+          <a:ext cx="6096000" cy="1854200"/>
+        </p:xfrm>
+        <a:graphic>
+          <a:graphicData uri="http://schemas.openxmlformats.org/drawingml/2006/table">
+            <a:tbl>
+              <a:tblPr firstRow="1" bandRow="1">
+                <a:tableStyleId>{5940675A-B579-460E-94D1-54222C63F5DA}</a:tableStyleId>
+              </a:tblPr>
+              <a:tblGrid>
+                <a:gridCol w="1524000"/>
+                <a:gridCol w="1524000"/>
+                <a:gridCol w="1524000"/>
+                <a:gridCol w="1524000"/>
+              </a:tblGrid>
+              <a:tr h="370840">
+                <a:tc>
+                  <a:txBody>
+                    <a:bodyPr/>
+                    <a:lstStyle/>
+                    <a:p>
+                      <a:r>
+                        <a:rPr lang="en-US" altLang="zh-TW" b="1" dirty="0" smtClean="0"/>
+                        <a:t>Name</a:t>
+                      </a:r>
+                      <a:endParaRPr lang="zh-TW" altLang="en-US" b="1" dirty="0"/>
+                    </a:p>
+                  </a:txBody>
+                  <a:tcPr/>
+                </a:tc>
+                <a:tc>
+                  <a:txBody>
+                    <a:bodyPr/>
+                    <a:lstStyle/>
+                    <a:p>
+                      <a:r>
+                        <a:rPr lang="en-US" altLang="zh-TW" dirty="0" smtClean="0"/>
+                        <a:t>attr1</a:t>
+                      </a:r>
+                      <a:endParaRPr lang="zh-TW" altLang="en-US" dirty="0"/>
+                    </a:p>
+                  </a:txBody>
+                  <a:tcPr/>
+                </a:tc>
+                <a:tc>
+                  <a:txBody>
+                    <a:bodyPr/>
+                    <a:lstStyle/>
+                    <a:p>
+                      <a:r>
+                        <a:rPr lang="en-US" altLang="zh-TW" dirty="0" smtClean="0"/>
+                        <a:t>attr2</a:t>
+                      </a:r>
+                      <a:endParaRPr lang="zh-TW" altLang="en-US" dirty="0"/>
+                    </a:p>
+                  </a:txBody>
+                  <a:tcPr/>
+                </a:tc>
+                <a:tc>
+                  <a:txBody>
+                    <a:bodyPr/>
+                    <a:lstStyle/>
+                    <a:p>
+                      <a:r>
+                        <a:rPr lang="en-US" altLang="zh-TW" dirty="0" smtClean="0"/>
+                        <a:t>attr3</a:t>
+                      </a:r>
+                      <a:endParaRPr lang="zh-TW" altLang="en-US" dirty="0"/>
+                    </a:p>
+                  </a:txBody>
+                  <a:tcPr/>
+                </a:tc>
+              </a:tr>
+              <a:tr h="370840">
+                <a:tc>
+                  <a:txBody>
+                    <a:bodyPr/>
+                    <a:lstStyle/>
+                    <a:p>
+                      <a:pPr marL="0" marR="0" indent="0" algn="l" defTabSz="914400" rtl="0" eaLnBrk="1" fontAlgn="auto" latinLnBrk="0" hangingPunct="1">
+                        <a:lnSpc>
+                          <a:spcPct val="100000"/>
+                        </a:lnSpc>
+                        <a:spcBef>
+                          <a:spcPts val="0"/>
+                        </a:spcBef>
+                        <a:spcAft>
+                          <a:spcPts val="0"/>
+                        </a:spcAft>
+                        <a:buClrTx/>
+                        <a:buSzTx/>
+                        <a:buFontTx/>
+                        <a:buNone/>
+                        <a:tabLst/>
+                        <a:defRPr/>
+                      </a:pPr>
+                      <a:r>
+                        <a:rPr lang="en-US" altLang="zh-TW" b="1" dirty="0" smtClean="0"/>
+                        <a:t>Type</a:t>
+                      </a:r>
+                      <a:endParaRPr lang="zh-TW" altLang="en-US" b="1" dirty="0" smtClean="0"/>
+                    </a:p>
+                  </a:txBody>
+                  <a:tcPr/>
+                </a:tc>
+                <a:tc>
+                  <a:txBody>
+                    <a:bodyPr/>
+                    <a:lstStyle/>
+                    <a:p>
+                      <a:r>
+                        <a:rPr lang="en-US" altLang="zh-TW" dirty="0" smtClean="0"/>
+                        <a:t>string</a:t>
+                      </a:r>
+                      <a:endParaRPr lang="zh-TW" altLang="en-US" dirty="0"/>
+                    </a:p>
+                  </a:txBody>
+                  <a:tcPr/>
+                </a:tc>
+                <a:tc>
+                  <a:txBody>
+                    <a:bodyPr/>
+                    <a:lstStyle/>
+                    <a:p>
+                      <a:r>
+                        <a:rPr lang="en-US" altLang="zh-TW" dirty="0" smtClean="0"/>
+                        <a:t>number</a:t>
+                      </a:r>
+                      <a:endParaRPr lang="zh-TW" altLang="en-US" dirty="0"/>
+                    </a:p>
+                  </a:txBody>
+                  <a:tcPr/>
+                </a:tc>
+                <a:tc>
+                  <a:txBody>
+                    <a:bodyPr/>
+                    <a:lstStyle/>
+                    <a:p>
+                      <a:r>
+                        <a:rPr lang="en-US" altLang="zh-TW" dirty="0" smtClean="0"/>
+                        <a:t>binary</a:t>
+                      </a:r>
+                      <a:endParaRPr lang="zh-TW" altLang="en-US" dirty="0"/>
+                    </a:p>
+                  </a:txBody>
+                  <a:tcPr/>
+                </a:tc>
+              </a:tr>
+              <a:tr h="370840">
+                <a:tc>
+                  <a:txBody>
+                    <a:bodyPr/>
+                    <a:lstStyle/>
+                    <a:p>
+                      <a:r>
+                        <a:rPr lang="en-US" altLang="zh-TW" b="1" dirty="0" smtClean="0"/>
+                        <a:t>Key Type</a:t>
+                      </a:r>
+                      <a:endParaRPr lang="zh-TW" altLang="en-US" b="1" dirty="0"/>
+                    </a:p>
+                  </a:txBody>
+                  <a:tcPr>
+                    <a:lnB w="38100" cap="flat" cmpd="sng" algn="ctr">
+                      <a:solidFill>
+                        <a:schemeClr val="accent2"/>
+                      </a:solidFill>
+                      <a:prstDash val="solid"/>
+                      <a:round/>
+                      <a:headEnd type="none" w="med" len="med"/>
+                      <a:tailEnd type="none" w="med" len="med"/>
+                    </a:lnB>
+                  </a:tcPr>
+                </a:tc>
+                <a:tc>
+                  <a:txBody>
+                    <a:bodyPr/>
+                    <a:lstStyle/>
+                    <a:p>
+                      <a:r>
+                        <a:rPr lang="en-US" altLang="zh-TW" dirty="0" smtClean="0"/>
+                        <a:t>HASH</a:t>
+                      </a:r>
+                      <a:endParaRPr lang="zh-TW" altLang="en-US" dirty="0"/>
+                    </a:p>
+                  </a:txBody>
+                  <a:tcPr>
+                    <a:lnB w="38100" cap="flat" cmpd="sng" algn="ctr">
+                      <a:solidFill>
+                        <a:schemeClr val="accent2"/>
+                      </a:solidFill>
+                      <a:prstDash val="solid"/>
+                      <a:round/>
+                      <a:headEnd type="none" w="med" len="med"/>
+                      <a:tailEnd type="none" w="med" len="med"/>
+                    </a:lnB>
+                  </a:tcPr>
+                </a:tc>
+                <a:tc>
+                  <a:txBody>
+                    <a:bodyPr/>
+                    <a:lstStyle/>
+                    <a:p>
+                      <a:r>
+                        <a:rPr lang="en-US" altLang="zh-TW" dirty="0" smtClean="0"/>
+                        <a:t>RANGE</a:t>
+                      </a:r>
+                      <a:endParaRPr lang="zh-TW" altLang="en-US" dirty="0"/>
+                    </a:p>
+                  </a:txBody>
+                  <a:tcPr>
+                    <a:lnB w="38100" cap="flat" cmpd="sng" algn="ctr">
+                      <a:solidFill>
+                        <a:schemeClr val="accent2"/>
+                      </a:solidFill>
+                      <a:prstDash val="solid"/>
+                      <a:round/>
+                      <a:headEnd type="none" w="med" len="med"/>
+                      <a:tailEnd type="none" w="med" len="med"/>
+                    </a:lnB>
+                  </a:tcPr>
+                </a:tc>
+                <a:tc>
+                  <a:txBody>
+                    <a:bodyPr/>
+                    <a:lstStyle/>
+                    <a:p>
+                      <a:r>
+                        <a:rPr lang="en-US" altLang="zh-TW" dirty="0" smtClean="0"/>
+                        <a:t>NON-KEY</a:t>
+                      </a:r>
+                      <a:endParaRPr lang="zh-TW" altLang="en-US" dirty="0"/>
+                    </a:p>
+                  </a:txBody>
+                  <a:tcPr>
+                    <a:lnB w="38100" cap="flat" cmpd="sng" algn="ctr">
+                      <a:solidFill>
+                        <a:schemeClr val="accent2"/>
+                      </a:solidFill>
+                      <a:prstDash val="solid"/>
+                      <a:round/>
+                      <a:headEnd type="none" w="med" len="med"/>
+                      <a:tailEnd type="none" w="med" len="med"/>
+                    </a:lnB>
+                  </a:tcPr>
+                </a:tc>
+              </a:tr>
+              <a:tr h="370840">
+                <a:tc>
+                  <a:txBody>
+                    <a:bodyPr/>
+                    <a:lstStyle/>
+                    <a:p>
+                      <a:endParaRPr lang="zh-TW" altLang="en-US" dirty="0"/>
+                    </a:p>
+                  </a:txBody>
+                  <a:tcPr>
+                    <a:lnT w="38100" cap="flat" cmpd="sng" algn="ctr">
+                      <a:solidFill>
+                        <a:schemeClr val="accent2"/>
+                      </a:solidFill>
+                      <a:prstDash val="solid"/>
+                      <a:round/>
+                      <a:headEnd type="none" w="med" len="med"/>
+                      <a:tailEnd type="none" w="med" len="med"/>
+                    </a:lnT>
+                  </a:tcPr>
+                </a:tc>
+                <a:tc>
+                  <a:txBody>
+                    <a:bodyPr/>
+                    <a:lstStyle/>
+                    <a:p>
+                      <a:r>
+                        <a:rPr lang="en-US" altLang="zh-TW" strike="sngStrike" dirty="0" smtClean="0"/>
+                        <a:t>A1</a:t>
+                      </a:r>
+                      <a:r>
+                        <a:rPr lang="en-US" altLang="zh-TW" dirty="0" smtClean="0"/>
+                        <a:t> A11</a:t>
+                      </a:r>
+                      <a:endParaRPr lang="zh-TW" altLang="en-US" dirty="0"/>
+                    </a:p>
+                  </a:txBody>
+                  <a:tcPr>
+                    <a:lnT w="38100" cap="flat" cmpd="sng" algn="ctr">
+                      <a:solidFill>
+                        <a:schemeClr val="accent2"/>
+                      </a:solidFill>
+                      <a:prstDash val="solid"/>
+                      <a:round/>
+                      <a:headEnd type="none" w="med" len="med"/>
+                      <a:tailEnd type="none" w="med" len="med"/>
+                    </a:lnT>
+                  </a:tcPr>
+                </a:tc>
+                <a:tc>
+                  <a:txBody>
+                    <a:bodyPr/>
+                    <a:lstStyle/>
+                    <a:p>
+                      <a:r>
+                        <a:rPr lang="en-US" altLang="zh-TW" dirty="0" smtClean="0"/>
+                        <a:t>A2</a:t>
+                      </a:r>
+                      <a:endParaRPr lang="zh-TW" altLang="en-US" dirty="0"/>
+                    </a:p>
+                  </a:txBody>
+                  <a:tcPr>
+                    <a:lnT w="38100" cap="flat" cmpd="sng" algn="ctr">
+                      <a:solidFill>
+                        <a:schemeClr val="accent2"/>
+                      </a:solidFill>
+                      <a:prstDash val="solid"/>
+                      <a:round/>
+                      <a:headEnd type="none" w="med" len="med"/>
+                      <a:tailEnd type="none" w="med" len="med"/>
+                    </a:lnT>
+                  </a:tcPr>
+                </a:tc>
+                <a:tc>
+                  <a:txBody>
+                    <a:bodyPr/>
+                    <a:lstStyle/>
+                    <a:p>
+                      <a:r>
+                        <a:rPr lang="en-US" altLang="zh-TW" dirty="0" smtClean="0"/>
+                        <a:t>A3</a:t>
+                      </a:r>
+                      <a:endParaRPr lang="zh-TW" altLang="en-US" dirty="0"/>
+                    </a:p>
+                  </a:txBody>
+                  <a:tcPr>
+                    <a:lnT w="38100" cap="flat" cmpd="sng" algn="ctr">
+                      <a:solidFill>
+                        <a:schemeClr val="accent2"/>
+                      </a:solidFill>
+                      <a:prstDash val="solid"/>
+                      <a:round/>
+                      <a:headEnd type="none" w="med" len="med"/>
+                      <a:tailEnd type="none" w="med" len="med"/>
+                    </a:lnT>
+                  </a:tcPr>
+                </a:tc>
+              </a:tr>
+              <a:tr h="370840">
+                <a:tc>
+                  <a:txBody>
+                    <a:bodyPr/>
+                    <a:lstStyle/>
+                    <a:p>
+                      <a:r>
+                        <a:rPr lang="en-US" altLang="zh-TW" dirty="0" smtClean="0"/>
+                        <a:t>Add</a:t>
+                      </a:r>
+                      <a:endParaRPr lang="zh-TW" altLang="en-US" dirty="0"/>
+                    </a:p>
+                  </a:txBody>
+                  <a:tcPr/>
+                </a:tc>
+                <a:tc>
+                  <a:txBody>
+                    <a:bodyPr/>
+                    <a:lstStyle/>
+                    <a:p>
+                      <a:endParaRPr lang="zh-TW" altLang="en-US" dirty="0"/>
+                    </a:p>
+                  </a:txBody>
+                  <a:tcPr/>
+                </a:tc>
+                <a:tc>
+                  <a:txBody>
+                    <a:bodyPr/>
+                    <a:lstStyle/>
+                    <a:p>
+                      <a:endParaRPr lang="zh-TW" altLang="en-US" dirty="0"/>
+                    </a:p>
+                  </a:txBody>
+                  <a:tcPr/>
+                </a:tc>
+                <a:tc>
+                  <a:txBody>
+                    <a:bodyPr/>
+                    <a:lstStyle/>
+                    <a:p>
+                      <a:endParaRPr lang="zh-TW" altLang="en-US" dirty="0"/>
+                    </a:p>
+                  </a:txBody>
+                  <a:tcPr/>
+                </a:tc>
+              </a:tr>
+            </a:tbl>
+          </a:graphicData>
+        </a:graphic>
+      </p:graphicFrame>
+      <p:sp>
+        <p:nvSpPr>
+          <p:cNvPr id="32" name="文字方塊 31"/>
+          <p:cNvSpPr txBox="1"/>
+          <p:nvPr/>
+        </p:nvSpPr>
+        <p:spPr>
+          <a:xfrm>
+            <a:off x="428596" y="3152001"/>
+            <a:ext cx="1357322" cy="276999"/>
+          </a:xfrm>
+          <a:prstGeom prst="rect">
+            <a:avLst/>
+          </a:prstGeom>
+          <a:solidFill>
+            <a:schemeClr val="bg1">
+              <a:lumMod val="85000"/>
+            </a:schemeClr>
+          </a:solidFill>
+        </p:spPr>
+        <p:style>
+          <a:lnRef idx="2">
+            <a:schemeClr val="accent1"/>
+          </a:lnRef>
+          <a:fillRef idx="1">
+            <a:schemeClr val="lt1"/>
+          </a:fillRef>
+          <a:effectRef idx="0">
+            <a:schemeClr val="accent1"/>
+          </a:effectRef>
+          <a:fontRef idx="minor">
+            <a:schemeClr val="dk1"/>
+          </a:fontRef>
+        </p:style>
+        <p:txBody>
+          <a:bodyPr wrap="square" rtlCol="0" anchor="ctr">
+            <a:spAutoFit/>
+          </a:bodyPr>
+          <a:lstStyle/>
+          <a:p>
+            <a:r>
+              <a:rPr lang="en-US" altLang="zh-TW" sz="1200" dirty="0" smtClean="0"/>
+              <a:t>(Update…) Modify</a:t>
+            </a:r>
+            <a:endParaRPr lang="zh-TW" altLang="en-US" sz="1200" dirty="0"/>
+          </a:p>
+        </p:txBody>
+      </p:sp>
+      <p:sp>
+        <p:nvSpPr>
+          <p:cNvPr id="33" name="流程圖: 合併 32"/>
+          <p:cNvSpPr/>
+          <p:nvPr/>
+        </p:nvSpPr>
+        <p:spPr>
+          <a:xfrm>
+            <a:off x="1571604" y="3223439"/>
+            <a:ext cx="142876" cy="71438"/>
+          </a:xfrm>
+          <a:prstGeom prst="flowChartMerge">
+            <a:avLst/>
+          </a:prstGeom>
+          <a:solidFill>
+            <a:schemeClr val="bg1"/>
+          </a:solidFill>
+        </p:spPr>
+        <p:style>
+          <a:lnRef idx="2">
+            <a:schemeClr val="accent1">
+              <a:shade val="50000"/>
+            </a:schemeClr>
+          </a:lnRef>
+          <a:fillRef idx="1">
+            <a:schemeClr val="accent1"/>
+          </a:fillRef>
+          <a:effectRef idx="0">
+            <a:schemeClr val="accent1"/>
+          </a:effectRef>
+          <a:fontRef idx="minor">
+            <a:schemeClr val="lt1"/>
+          </a:fontRef>
+        </p:style>
+        <p:txBody>
+          <a:bodyPr rtlCol="0" anchor="ctr"/>
+          <a:lstStyle/>
+          <a:p>
+            <a:pPr algn="ctr"/>
+            <a:endParaRPr lang="zh-TW" altLang="en-US"/>
+          </a:p>
+        </p:txBody>
+      </p:sp>
+      <p:sp>
+        <p:nvSpPr>
+          <p:cNvPr id="34" name="文字方塊 33"/>
+          <p:cNvSpPr txBox="1"/>
+          <p:nvPr/>
+        </p:nvSpPr>
+        <p:spPr>
+          <a:xfrm>
+            <a:off x="214282" y="4000504"/>
+            <a:ext cx="1671740" cy="923330"/>
+          </a:xfrm>
+          <a:prstGeom prst="rect">
+            <a:avLst/>
+          </a:prstGeom>
+          <a:solidFill>
+            <a:schemeClr val="bg1"/>
+          </a:solidFill>
+        </p:spPr>
+        <p:txBody>
+          <a:bodyPr wrap="none" rtlCol="0">
+            <a:spAutoFit/>
+          </a:bodyPr>
+          <a:lstStyle/>
+          <a:p>
+            <a:r>
+              <a:rPr lang="en-US" altLang="zh-TW" dirty="0" smtClean="0"/>
+              <a:t>Delete</a:t>
+            </a:r>
+          </a:p>
+          <a:p>
+            <a:r>
+              <a:rPr lang="en-US" altLang="zh-TW" dirty="0" smtClean="0"/>
+              <a:t>Modify</a:t>
+            </a:r>
+          </a:p>
+          <a:p>
+            <a:r>
+              <a:rPr lang="en-US" altLang="zh-TW" dirty="0" smtClean="0"/>
+              <a:t>Reverse Change</a:t>
+            </a:r>
+            <a:endParaRPr lang="zh-TW" altLang="en-US" dirty="0"/>
+          </a:p>
+        </p:txBody>
+      </p:sp>
+      <p:cxnSp>
+        <p:nvCxnSpPr>
+          <p:cNvPr id="37" name="直線單箭頭接點 36"/>
+          <p:cNvCxnSpPr>
+            <a:stCxn id="33" idx="2"/>
+            <a:endCxn id="34" idx="0"/>
+          </p:cNvCxnSpPr>
+          <p:nvPr/>
+        </p:nvCxnSpPr>
+        <p:spPr>
+          <a:xfrm rot="5400000">
+            <a:off x="993784" y="3351245"/>
+            <a:ext cx="705627" cy="592890"/>
+          </a:xfrm>
+          <a:prstGeom prst="straightConnector1">
+            <a:avLst/>
+          </a:prstGeom>
+          <a:ln>
+            <a:tailEnd type="arrow"/>
+          </a:ln>
+        </p:spPr>
+        <p:style>
+          <a:lnRef idx="1">
+            <a:schemeClr val="accent6"/>
+          </a:lnRef>
+          <a:fillRef idx="0">
+            <a:schemeClr val="accent6"/>
+          </a:fillRef>
+          <a:effectRef idx="0">
+            <a:schemeClr val="accent6"/>
+          </a:effectRef>
+          <a:fontRef idx="minor">
+            <a:schemeClr val="tx1"/>
+          </a:fontRef>
+        </p:style>
+      </p:cxnSp>
     </p:spTree>
   </p:cSld>
   <p:clrMapOvr>

</xml_diff>

<commit_message>
1) BOOL attribute dropdown 2) 'Add Attribute' function
</commit_message>
<xml_diff>
--- a/design/DynamoDB Manager.pptx
+++ b/design/DynamoDB Manager.pptx
@@ -209,7 +209,7 @@
             <a:fld id="{3EFBCEC4-59EF-4924-85C6-6463810B52A1}" type="datetimeFigureOut">
               <a:rPr lang="zh-TW" altLang="en-US" smtClean="0"/>
               <a:pPr/>
-              <a:t>2020/6/18</a:t>
+              <a:t>2020/6/22</a:t>
             </a:fld>
             <a:endParaRPr lang="zh-TW" altLang="en-US"/>
           </a:p>
@@ -1319,7 +1319,7 @@
             <a:fld id="{06EDFE59-1DA3-406F-94B4-33B1A2438A5C}" type="datetimeFigureOut">
               <a:rPr lang="zh-TW" altLang="en-US" smtClean="0"/>
               <a:pPr/>
-              <a:t>2020/6/18</a:t>
+              <a:t>2020/6/22</a:t>
             </a:fld>
             <a:endParaRPr lang="zh-TW" altLang="en-US"/>
           </a:p>
@@ -1486,7 +1486,7 @@
             <a:fld id="{06EDFE59-1DA3-406F-94B4-33B1A2438A5C}" type="datetimeFigureOut">
               <a:rPr lang="zh-TW" altLang="en-US" smtClean="0"/>
               <a:pPr/>
-              <a:t>2020/6/18</a:t>
+              <a:t>2020/6/22</a:t>
             </a:fld>
             <a:endParaRPr lang="zh-TW" altLang="en-US"/>
           </a:p>
@@ -1663,7 +1663,7 @@
             <a:fld id="{06EDFE59-1DA3-406F-94B4-33B1A2438A5C}" type="datetimeFigureOut">
               <a:rPr lang="zh-TW" altLang="en-US" smtClean="0"/>
               <a:pPr/>
-              <a:t>2020/6/18</a:t>
+              <a:t>2020/6/22</a:t>
             </a:fld>
             <a:endParaRPr lang="zh-TW" altLang="en-US"/>
           </a:p>
@@ -1830,7 +1830,7 @@
             <a:fld id="{06EDFE59-1DA3-406F-94B4-33B1A2438A5C}" type="datetimeFigureOut">
               <a:rPr lang="zh-TW" altLang="en-US" smtClean="0"/>
               <a:pPr/>
-              <a:t>2020/6/18</a:t>
+              <a:t>2020/6/22</a:t>
             </a:fld>
             <a:endParaRPr lang="zh-TW" altLang="en-US"/>
           </a:p>
@@ -2073,7 +2073,7 @@
             <a:fld id="{06EDFE59-1DA3-406F-94B4-33B1A2438A5C}" type="datetimeFigureOut">
               <a:rPr lang="zh-TW" altLang="en-US" smtClean="0"/>
               <a:pPr/>
-              <a:t>2020/6/18</a:t>
+              <a:t>2020/6/22</a:t>
             </a:fld>
             <a:endParaRPr lang="zh-TW" altLang="en-US"/>
           </a:p>
@@ -2358,7 +2358,7 @@
             <a:fld id="{06EDFE59-1DA3-406F-94B4-33B1A2438A5C}" type="datetimeFigureOut">
               <a:rPr lang="zh-TW" altLang="en-US" smtClean="0"/>
               <a:pPr/>
-              <a:t>2020/6/18</a:t>
+              <a:t>2020/6/22</a:t>
             </a:fld>
             <a:endParaRPr lang="zh-TW" altLang="en-US"/>
           </a:p>
@@ -2777,7 +2777,7 @@
             <a:fld id="{06EDFE59-1DA3-406F-94B4-33B1A2438A5C}" type="datetimeFigureOut">
               <a:rPr lang="zh-TW" altLang="en-US" smtClean="0"/>
               <a:pPr/>
-              <a:t>2020/6/18</a:t>
+              <a:t>2020/6/22</a:t>
             </a:fld>
             <a:endParaRPr lang="zh-TW" altLang="en-US"/>
           </a:p>
@@ -2892,7 +2892,7 @@
             <a:fld id="{06EDFE59-1DA3-406F-94B4-33B1A2438A5C}" type="datetimeFigureOut">
               <a:rPr lang="zh-TW" altLang="en-US" smtClean="0"/>
               <a:pPr/>
-              <a:t>2020/6/18</a:t>
+              <a:t>2020/6/22</a:t>
             </a:fld>
             <a:endParaRPr lang="zh-TW" altLang="en-US"/>
           </a:p>
@@ -2984,7 +2984,7 @@
             <a:fld id="{06EDFE59-1DA3-406F-94B4-33B1A2438A5C}" type="datetimeFigureOut">
               <a:rPr lang="zh-TW" altLang="en-US" smtClean="0"/>
               <a:pPr/>
-              <a:t>2020/6/18</a:t>
+              <a:t>2020/6/22</a:t>
             </a:fld>
             <a:endParaRPr lang="zh-TW" altLang="en-US"/>
           </a:p>
@@ -3258,7 +3258,7 @@
             <a:fld id="{06EDFE59-1DA3-406F-94B4-33B1A2438A5C}" type="datetimeFigureOut">
               <a:rPr lang="zh-TW" altLang="en-US" smtClean="0"/>
               <a:pPr/>
-              <a:t>2020/6/18</a:t>
+              <a:t>2020/6/22</a:t>
             </a:fld>
             <a:endParaRPr lang="zh-TW" altLang="en-US"/>
           </a:p>
@@ -3508,7 +3508,7 @@
             <a:fld id="{06EDFE59-1DA3-406F-94B4-33B1A2438A5C}" type="datetimeFigureOut">
               <a:rPr lang="zh-TW" altLang="en-US" smtClean="0"/>
               <a:pPr/>
-              <a:t>2020/6/18</a:t>
+              <a:t>2020/6/22</a:t>
             </a:fld>
             <a:endParaRPr lang="zh-TW" altLang="en-US"/>
           </a:p>
@@ -3723,7 +3723,7 @@
             <a:fld id="{06EDFE59-1DA3-406F-94B4-33B1A2438A5C}" type="datetimeFigureOut">
               <a:rPr lang="zh-TW" altLang="en-US" smtClean="0"/>
               <a:pPr/>
-              <a:t>2020/6/18</a:t>
+              <a:t>2020/6/22</a:t>
             </a:fld>
             <a:endParaRPr lang="zh-TW" altLang="en-US"/>
           </a:p>
@@ -4177,7 +4177,7 @@
         </p:nvSpPr>
         <p:spPr>
           <a:xfrm>
-            <a:off x="3357554" y="3714752"/>
+            <a:off x="3428992" y="2714620"/>
             <a:ext cx="2444772" cy="1015663"/>
           </a:xfrm>
           <a:prstGeom prst="rect">
@@ -13198,18 +13198,7 @@
                   </a:schemeClr>
                 </a:solidFill>
               </a:rPr>
-              <a:t>Update </a:t>
-            </a:r>
-            <a:r>
-              <a:rPr lang="en-US" altLang="zh-TW" sz="2000" dirty="0" smtClean="0">
-                <a:solidFill>
-                  <a:schemeClr val="tx2">
-                    <a:lumMod val="60000"/>
-                    <a:lumOff val="40000"/>
-                  </a:schemeClr>
-                </a:solidFill>
-              </a:rPr>
-              <a:t>Items</a:t>
+              <a:t>Update Items</a:t>
             </a:r>
             <a:endParaRPr lang="zh-TW" altLang="en-US" sz="2000" dirty="0">
               <a:solidFill>

</xml_diff>

<commit_message>
Confirm page: Add Attribute (on-going)
</commit_message>
<xml_diff>
--- a/design/DynamoDB Manager.pptx
+++ b/design/DynamoDB Manager.pptx
@@ -5,7 +5,7 @@
     <p:sldMasterId id="2147483648" r:id="rId1"/>
   </p:sldMasterIdLst>
   <p:notesMasterIdLst>
-    <p:notesMasterId r:id="rId19"/>
+    <p:notesMasterId r:id="rId20"/>
   </p:notesMasterIdLst>
   <p:sldIdLst>
     <p:sldId id="256" r:id="rId2"/>
@@ -13,18 +13,19 @@
     <p:sldId id="271" r:id="rId4"/>
     <p:sldId id="272" r:id="rId5"/>
     <p:sldId id="278" r:id="rId6"/>
-    <p:sldId id="281" r:id="rId7"/>
-    <p:sldId id="259" r:id="rId8"/>
-    <p:sldId id="260" r:id="rId9"/>
-    <p:sldId id="270" r:id="rId10"/>
-    <p:sldId id="262" r:id="rId11"/>
-    <p:sldId id="273" r:id="rId12"/>
-    <p:sldId id="263" r:id="rId13"/>
-    <p:sldId id="267" r:id="rId14"/>
-    <p:sldId id="274" r:id="rId15"/>
-    <p:sldId id="279" r:id="rId16"/>
-    <p:sldId id="282" r:id="rId17"/>
-    <p:sldId id="283" r:id="rId18"/>
+    <p:sldId id="284" r:id="rId7"/>
+    <p:sldId id="281" r:id="rId8"/>
+    <p:sldId id="259" r:id="rId9"/>
+    <p:sldId id="260" r:id="rId10"/>
+    <p:sldId id="270" r:id="rId11"/>
+    <p:sldId id="262" r:id="rId12"/>
+    <p:sldId id="273" r:id="rId13"/>
+    <p:sldId id="263" r:id="rId14"/>
+    <p:sldId id="267" r:id="rId15"/>
+    <p:sldId id="274" r:id="rId16"/>
+    <p:sldId id="279" r:id="rId17"/>
+    <p:sldId id="282" r:id="rId18"/>
+    <p:sldId id="283" r:id="rId19"/>
   </p:sldIdLst>
   <p:sldSz cx="9144000" cy="6858000" type="screen4x3"/>
   <p:notesSz cx="6858000" cy="9144000"/>
@@ -209,7 +210,7 @@
             <a:fld id="{3EFBCEC4-59EF-4924-85C6-6463810B52A1}" type="datetimeFigureOut">
               <a:rPr lang="zh-TW" altLang="en-US" smtClean="0"/>
               <a:pPr/>
-              <a:t>2020/6/22</a:t>
+              <a:t>2020/6/26</a:t>
             </a:fld>
             <a:endParaRPr lang="zh-TW" altLang="en-US"/>
           </a:p>
@@ -819,7 +820,7 @@
             <a:fld id="{312C130E-9B79-40FD-85E9-1CC0B98505C9}" type="slidenum">
               <a:rPr lang="zh-TW" altLang="en-US" smtClean="0"/>
               <a:pPr/>
-              <a:t>7</a:t>
+              <a:t>8</a:t>
             </a:fld>
             <a:endParaRPr lang="zh-TW" altLang="en-US"/>
           </a:p>
@@ -931,7 +932,7 @@
             <a:fld id="{312C130E-9B79-40FD-85E9-1CC0B98505C9}" type="slidenum">
               <a:rPr lang="zh-TW" altLang="en-US" smtClean="0"/>
               <a:pPr/>
-              <a:t>8</a:t>
+              <a:t>9</a:t>
             </a:fld>
             <a:endParaRPr lang="zh-TW" altLang="en-US"/>
           </a:p>
@@ -1123,7 +1124,7 @@
             <a:fld id="{312C130E-9B79-40FD-85E9-1CC0B98505C9}" type="slidenum">
               <a:rPr lang="zh-TW" altLang="en-US" smtClean="0"/>
               <a:pPr/>
-              <a:t>15</a:t>
+              <a:t>16</a:t>
             </a:fld>
             <a:endParaRPr lang="zh-TW" altLang="en-US"/>
           </a:p>
@@ -1319,7 +1320,7 @@
             <a:fld id="{06EDFE59-1DA3-406F-94B4-33B1A2438A5C}" type="datetimeFigureOut">
               <a:rPr lang="zh-TW" altLang="en-US" smtClean="0"/>
               <a:pPr/>
-              <a:t>2020/6/22</a:t>
+              <a:t>2020/6/26</a:t>
             </a:fld>
             <a:endParaRPr lang="zh-TW" altLang="en-US"/>
           </a:p>
@@ -1486,7 +1487,7 @@
             <a:fld id="{06EDFE59-1DA3-406F-94B4-33B1A2438A5C}" type="datetimeFigureOut">
               <a:rPr lang="zh-TW" altLang="en-US" smtClean="0"/>
               <a:pPr/>
-              <a:t>2020/6/22</a:t>
+              <a:t>2020/6/26</a:t>
             </a:fld>
             <a:endParaRPr lang="zh-TW" altLang="en-US"/>
           </a:p>
@@ -1663,7 +1664,7 @@
             <a:fld id="{06EDFE59-1DA3-406F-94B4-33B1A2438A5C}" type="datetimeFigureOut">
               <a:rPr lang="zh-TW" altLang="en-US" smtClean="0"/>
               <a:pPr/>
-              <a:t>2020/6/22</a:t>
+              <a:t>2020/6/26</a:t>
             </a:fld>
             <a:endParaRPr lang="zh-TW" altLang="en-US"/>
           </a:p>
@@ -1830,7 +1831,7 @@
             <a:fld id="{06EDFE59-1DA3-406F-94B4-33B1A2438A5C}" type="datetimeFigureOut">
               <a:rPr lang="zh-TW" altLang="en-US" smtClean="0"/>
               <a:pPr/>
-              <a:t>2020/6/22</a:t>
+              <a:t>2020/6/26</a:t>
             </a:fld>
             <a:endParaRPr lang="zh-TW" altLang="en-US"/>
           </a:p>
@@ -2073,7 +2074,7 @@
             <a:fld id="{06EDFE59-1DA3-406F-94B4-33B1A2438A5C}" type="datetimeFigureOut">
               <a:rPr lang="zh-TW" altLang="en-US" smtClean="0"/>
               <a:pPr/>
-              <a:t>2020/6/22</a:t>
+              <a:t>2020/6/26</a:t>
             </a:fld>
             <a:endParaRPr lang="zh-TW" altLang="en-US"/>
           </a:p>
@@ -2358,7 +2359,7 @@
             <a:fld id="{06EDFE59-1DA3-406F-94B4-33B1A2438A5C}" type="datetimeFigureOut">
               <a:rPr lang="zh-TW" altLang="en-US" smtClean="0"/>
               <a:pPr/>
-              <a:t>2020/6/22</a:t>
+              <a:t>2020/6/26</a:t>
             </a:fld>
             <a:endParaRPr lang="zh-TW" altLang="en-US"/>
           </a:p>
@@ -2777,7 +2778,7 @@
             <a:fld id="{06EDFE59-1DA3-406F-94B4-33B1A2438A5C}" type="datetimeFigureOut">
               <a:rPr lang="zh-TW" altLang="en-US" smtClean="0"/>
               <a:pPr/>
-              <a:t>2020/6/22</a:t>
+              <a:t>2020/6/26</a:t>
             </a:fld>
             <a:endParaRPr lang="zh-TW" altLang="en-US"/>
           </a:p>
@@ -2892,7 +2893,7 @@
             <a:fld id="{06EDFE59-1DA3-406F-94B4-33B1A2438A5C}" type="datetimeFigureOut">
               <a:rPr lang="zh-TW" altLang="en-US" smtClean="0"/>
               <a:pPr/>
-              <a:t>2020/6/22</a:t>
+              <a:t>2020/6/26</a:t>
             </a:fld>
             <a:endParaRPr lang="zh-TW" altLang="en-US"/>
           </a:p>
@@ -2984,7 +2985,7 @@
             <a:fld id="{06EDFE59-1DA3-406F-94B4-33B1A2438A5C}" type="datetimeFigureOut">
               <a:rPr lang="zh-TW" altLang="en-US" smtClean="0"/>
               <a:pPr/>
-              <a:t>2020/6/22</a:t>
+              <a:t>2020/6/26</a:t>
             </a:fld>
             <a:endParaRPr lang="zh-TW" altLang="en-US"/>
           </a:p>
@@ -3258,7 +3259,7 @@
             <a:fld id="{06EDFE59-1DA3-406F-94B4-33B1A2438A5C}" type="datetimeFigureOut">
               <a:rPr lang="zh-TW" altLang="en-US" smtClean="0"/>
               <a:pPr/>
-              <a:t>2020/6/22</a:t>
+              <a:t>2020/6/26</a:t>
             </a:fld>
             <a:endParaRPr lang="zh-TW" altLang="en-US"/>
           </a:p>
@@ -3508,7 +3509,7 @@
             <a:fld id="{06EDFE59-1DA3-406F-94B4-33B1A2438A5C}" type="datetimeFigureOut">
               <a:rPr lang="zh-TW" altLang="en-US" smtClean="0"/>
               <a:pPr/>
-              <a:t>2020/6/22</a:t>
+              <a:t>2020/6/26</a:t>
             </a:fld>
             <a:endParaRPr lang="zh-TW" altLang="en-US"/>
           </a:p>
@@ -3723,7 +3724,7 @@
             <a:fld id="{06EDFE59-1DA3-406F-94B4-33B1A2438A5C}" type="datetimeFigureOut">
               <a:rPr lang="zh-TW" altLang="en-US" smtClean="0"/>
               <a:pPr/>
-              <a:t>2020/6/22</a:t>
+              <a:t>2020/6/26</a:t>
             </a:fld>
             <a:endParaRPr lang="zh-TW" altLang="en-US"/>
           </a:p>
@@ -4171,14 +4172,491 @@
       </p:grpSpPr>
       <p:sp>
         <p:nvSpPr>
-          <p:cNvPr id="4" name="文字方塊 3"/>
+          <p:cNvPr id="7" name="標題 6"/>
+          <p:cNvSpPr>
+            <a:spLocks noGrp="1"/>
+          </p:cNvSpPr>
+          <p:nvPr>
+            <p:ph type="title"/>
+          </p:nvPr>
+        </p:nvSpPr>
+        <p:spPr>
+          <a:xfrm>
+            <a:off x="457200" y="-24"/>
+            <a:ext cx="8229600" cy="1143000"/>
+          </a:xfrm>
+        </p:spPr>
+        <p:txBody>
+          <a:bodyPr/>
+          <a:lstStyle/>
+          <a:p>
+            <a:r>
+              <a:rPr lang="zh-TW" altLang="en-US" dirty="0" smtClean="0"/>
+              <a:t>確認訊息 </a:t>
+            </a:r>
+            <a:r>
+              <a:rPr lang="en-US" altLang="zh-TW" dirty="0" smtClean="0"/>
+              <a:t>(</a:t>
+            </a:r>
+            <a:r>
+              <a:rPr lang="zh-TW" altLang="en-US" dirty="0" smtClean="0"/>
+              <a:t>覆蓋整版</a:t>
+            </a:r>
+            <a:r>
+              <a:rPr lang="en-US" altLang="zh-TW" dirty="0" smtClean="0"/>
+              <a:t>)</a:t>
+            </a:r>
+            <a:endParaRPr lang="zh-TW" altLang="en-US" dirty="0"/>
+          </a:p>
+        </p:txBody>
+      </p:sp>
+      <p:sp>
+        <p:nvSpPr>
+          <p:cNvPr id="8" name="文字版面配置區 7"/>
+          <p:cNvSpPr>
+            <a:spLocks noGrp="1"/>
+          </p:cNvSpPr>
+          <p:nvPr>
+            <p:ph type="body" idx="1"/>
+          </p:nvPr>
+        </p:nvSpPr>
+        <p:spPr/>
+        <p:txBody>
+          <a:bodyPr>
+            <a:noAutofit/>
+          </a:bodyPr>
+          <a:lstStyle/>
+          <a:p>
+            <a:pPr marL="342900" indent="-342900"/>
+            <a:r>
+              <a:rPr lang="en-US" altLang="zh-TW" sz="2800" dirty="0" smtClean="0"/>
+              <a:t>Confirmation</a:t>
+            </a:r>
+          </a:p>
+        </p:txBody>
+      </p:sp>
+      <p:sp>
+        <p:nvSpPr>
+          <p:cNvPr id="10" name="文字版面配置區 9"/>
+          <p:cNvSpPr>
+            <a:spLocks noGrp="1"/>
+          </p:cNvSpPr>
+          <p:nvPr>
+            <p:ph type="body" sz="quarter" idx="3"/>
+          </p:nvPr>
+        </p:nvSpPr>
+        <p:spPr/>
+        <p:txBody>
+          <a:bodyPr>
+            <a:noAutofit/>
+          </a:bodyPr>
+          <a:lstStyle/>
+          <a:p>
+            <a:r>
+              <a:rPr lang="en-US" altLang="zh-TW" sz="2800" dirty="0" smtClean="0"/>
+              <a:t>Action Result</a:t>
+            </a:r>
+            <a:endParaRPr lang="zh-TW" altLang="en-US" sz="2800" dirty="0" smtClean="0"/>
+          </a:p>
+        </p:txBody>
+      </p:sp>
+      <p:sp>
+        <p:nvSpPr>
+          <p:cNvPr id="13" name="矩形 12"/>
+          <p:cNvSpPr/>
+          <p:nvPr/>
+        </p:nvSpPr>
+        <p:spPr>
+          <a:xfrm>
+            <a:off x="500034" y="2214554"/>
+            <a:ext cx="3714776" cy="1643074"/>
+          </a:xfrm>
+          <a:prstGeom prst="rect">
+            <a:avLst/>
+          </a:prstGeom>
+          <a:solidFill>
+            <a:schemeClr val="accent2">
+              <a:lumMod val="20000"/>
+              <a:lumOff val="80000"/>
+            </a:schemeClr>
+          </a:solidFill>
+        </p:spPr>
+        <p:style>
+          <a:lnRef idx="2">
+            <a:schemeClr val="accent2"/>
+          </a:lnRef>
+          <a:fillRef idx="1">
+            <a:schemeClr val="lt1"/>
+          </a:fillRef>
+          <a:effectRef idx="0">
+            <a:schemeClr val="accent2"/>
+          </a:effectRef>
+          <a:fontRef idx="minor">
+            <a:schemeClr val="dk1"/>
+          </a:fontRef>
+        </p:style>
+        <p:txBody>
+          <a:bodyPr rtlCol="0" anchor="t"/>
+          <a:lstStyle/>
+          <a:p>
+            <a:pPr algn="ctr"/>
+            <a:r>
+              <a:rPr lang="en-US" altLang="zh-TW" dirty="0" smtClean="0"/>
+              <a:t>Are you sure you want to </a:t>
+            </a:r>
+            <a:r>
+              <a:rPr lang="en-US" altLang="zh-TW" b="1" dirty="0" smtClean="0"/>
+              <a:t>XXX</a:t>
+            </a:r>
+            <a:r>
+              <a:rPr lang="en-US" altLang="zh-TW" dirty="0" smtClean="0"/>
+              <a:t>?</a:t>
+            </a:r>
+            <a:endParaRPr lang="zh-TW" altLang="en-US" dirty="0">
+              <a:solidFill>
+                <a:srgbClr val="FF0000"/>
+              </a:solidFill>
+            </a:endParaRPr>
+          </a:p>
+        </p:txBody>
+      </p:sp>
+      <p:sp>
+        <p:nvSpPr>
+          <p:cNvPr id="15" name="圓角矩形 14"/>
+          <p:cNvSpPr/>
+          <p:nvPr/>
+        </p:nvSpPr>
+        <p:spPr>
+          <a:xfrm>
+            <a:off x="857224" y="3143248"/>
+            <a:ext cx="1357322" cy="571504"/>
+          </a:xfrm>
+          <a:prstGeom prst="roundRect">
+            <a:avLst/>
+          </a:prstGeom>
+          <a:solidFill>
+            <a:schemeClr val="accent2">
+              <a:lumMod val="40000"/>
+              <a:lumOff val="60000"/>
+            </a:schemeClr>
+          </a:solidFill>
+        </p:spPr>
+        <p:style>
+          <a:lnRef idx="2">
+            <a:schemeClr val="accent2">
+              <a:shade val="50000"/>
+            </a:schemeClr>
+          </a:lnRef>
+          <a:fillRef idx="1">
+            <a:schemeClr val="accent2"/>
+          </a:fillRef>
+          <a:effectRef idx="0">
+            <a:schemeClr val="accent2"/>
+          </a:effectRef>
+          <a:fontRef idx="minor">
+            <a:schemeClr val="lt1"/>
+          </a:fontRef>
+        </p:style>
+        <p:txBody>
+          <a:bodyPr rtlCol="0" anchor="ctr"/>
+          <a:lstStyle/>
+          <a:p>
+            <a:pPr algn="ctr"/>
+            <a:r>
+              <a:rPr lang="en-US" altLang="zh-TW" dirty="0" smtClean="0"/>
+              <a:t>Cancel</a:t>
+            </a:r>
+            <a:endParaRPr lang="zh-TW" altLang="en-US" dirty="0"/>
+          </a:p>
+        </p:txBody>
+      </p:sp>
+      <p:sp>
+        <p:nvSpPr>
+          <p:cNvPr id="16" name="圓角矩形 15"/>
+          <p:cNvSpPr/>
+          <p:nvPr/>
+        </p:nvSpPr>
+        <p:spPr>
+          <a:xfrm>
+            <a:off x="2428860" y="3143248"/>
+            <a:ext cx="1357322" cy="571504"/>
+          </a:xfrm>
+          <a:prstGeom prst="roundRect">
+            <a:avLst/>
+          </a:prstGeom>
+        </p:spPr>
+        <p:style>
+          <a:lnRef idx="2">
+            <a:schemeClr val="accent2">
+              <a:shade val="50000"/>
+            </a:schemeClr>
+          </a:lnRef>
+          <a:fillRef idx="1">
+            <a:schemeClr val="accent2"/>
+          </a:fillRef>
+          <a:effectRef idx="0">
+            <a:schemeClr val="accent2"/>
+          </a:effectRef>
+          <a:fontRef idx="minor">
+            <a:schemeClr val="lt1"/>
+          </a:fontRef>
+        </p:style>
+        <p:txBody>
+          <a:bodyPr rtlCol="0" anchor="ctr"/>
+          <a:lstStyle/>
+          <a:p>
+            <a:pPr algn="ctr"/>
+            <a:r>
+              <a:rPr lang="en-US" altLang="zh-TW" dirty="0" smtClean="0"/>
+              <a:t>Confirm</a:t>
+            </a:r>
+            <a:endParaRPr lang="zh-TW" altLang="en-US" dirty="0"/>
+          </a:p>
+        </p:txBody>
+      </p:sp>
+      <p:sp>
+        <p:nvSpPr>
+          <p:cNvPr id="17" name="矩形 16"/>
+          <p:cNvSpPr/>
+          <p:nvPr/>
+        </p:nvSpPr>
+        <p:spPr>
+          <a:xfrm>
+            <a:off x="4714876" y="3714752"/>
+            <a:ext cx="3143272" cy="1928826"/>
+          </a:xfrm>
+          <a:prstGeom prst="rect">
+            <a:avLst/>
+          </a:prstGeom>
+          <a:solidFill>
+            <a:schemeClr val="accent2">
+              <a:lumMod val="20000"/>
+              <a:lumOff val="80000"/>
+            </a:schemeClr>
+          </a:solidFill>
+        </p:spPr>
+        <p:style>
+          <a:lnRef idx="2">
+            <a:schemeClr val="accent2"/>
+          </a:lnRef>
+          <a:fillRef idx="1">
+            <a:schemeClr val="lt1"/>
+          </a:fillRef>
+          <a:effectRef idx="0">
+            <a:schemeClr val="accent2"/>
+          </a:effectRef>
+          <a:fontRef idx="minor">
+            <a:schemeClr val="dk1"/>
+          </a:fontRef>
+        </p:style>
+        <p:txBody>
+          <a:bodyPr rtlCol="0" anchor="t"/>
+          <a:lstStyle/>
+          <a:p>
+            <a:pPr algn="ctr"/>
+            <a:r>
+              <a:rPr lang="en-US" altLang="zh-TW" b="1" dirty="0" smtClean="0">
+                <a:solidFill>
+                  <a:schemeClr val="tx1"/>
+                </a:solidFill>
+              </a:rPr>
+              <a:t>Error</a:t>
+            </a:r>
+          </a:p>
+        </p:txBody>
+      </p:sp>
+      <p:sp>
+        <p:nvSpPr>
+          <p:cNvPr id="18" name="矩形 17"/>
+          <p:cNvSpPr/>
+          <p:nvPr/>
+        </p:nvSpPr>
+        <p:spPr>
+          <a:xfrm>
+            <a:off x="4714876" y="2214554"/>
+            <a:ext cx="3143272" cy="1285884"/>
+          </a:xfrm>
+          <a:prstGeom prst="rect">
+            <a:avLst/>
+          </a:prstGeom>
+          <a:solidFill>
+            <a:schemeClr val="accent3">
+              <a:lumMod val="20000"/>
+              <a:lumOff val="80000"/>
+            </a:schemeClr>
+          </a:solidFill>
+        </p:spPr>
+        <p:style>
+          <a:lnRef idx="2">
+            <a:schemeClr val="accent3"/>
+          </a:lnRef>
+          <a:fillRef idx="1">
+            <a:schemeClr val="lt1"/>
+          </a:fillRef>
+          <a:effectRef idx="0">
+            <a:schemeClr val="accent3"/>
+          </a:effectRef>
+          <a:fontRef idx="minor">
+            <a:schemeClr val="dk1"/>
+          </a:fontRef>
+        </p:style>
+        <p:txBody>
+          <a:bodyPr rtlCol="0" anchor="t"/>
+          <a:lstStyle/>
+          <a:p>
+            <a:pPr algn="ctr"/>
+            <a:r>
+              <a:rPr lang="en-US" altLang="zh-TW" b="1" dirty="0" smtClean="0"/>
+              <a:t>Success</a:t>
+            </a:r>
+            <a:endParaRPr lang="zh-TW" altLang="en-US" b="1" dirty="0"/>
+          </a:p>
+        </p:txBody>
+      </p:sp>
+      <p:sp>
+        <p:nvSpPr>
+          <p:cNvPr id="19" name="圓角矩形 18"/>
+          <p:cNvSpPr/>
+          <p:nvPr/>
+        </p:nvSpPr>
+        <p:spPr>
+          <a:xfrm>
+            <a:off x="5786446" y="2714620"/>
+            <a:ext cx="1000132" cy="571504"/>
+          </a:xfrm>
+          <a:prstGeom prst="roundRect">
+            <a:avLst/>
+          </a:prstGeom>
+        </p:spPr>
+        <p:style>
+          <a:lnRef idx="2">
+            <a:schemeClr val="accent3">
+              <a:shade val="50000"/>
+            </a:schemeClr>
+          </a:lnRef>
+          <a:fillRef idx="1">
+            <a:schemeClr val="accent3"/>
+          </a:fillRef>
+          <a:effectRef idx="0">
+            <a:schemeClr val="accent3"/>
+          </a:effectRef>
+          <a:fontRef idx="minor">
+            <a:schemeClr val="lt1"/>
+          </a:fontRef>
+        </p:style>
+        <p:txBody>
+          <a:bodyPr rtlCol="0" anchor="ctr"/>
+          <a:lstStyle/>
+          <a:p>
+            <a:pPr algn="ctr"/>
+            <a:r>
+              <a:rPr lang="en-US" altLang="zh-TW" dirty="0" smtClean="0"/>
+              <a:t>OK</a:t>
+            </a:r>
+            <a:endParaRPr lang="zh-TW" altLang="en-US" dirty="0"/>
+          </a:p>
+        </p:txBody>
+      </p:sp>
+      <p:sp>
+        <p:nvSpPr>
+          <p:cNvPr id="23" name="圓角矩形 22"/>
+          <p:cNvSpPr/>
+          <p:nvPr/>
+        </p:nvSpPr>
+        <p:spPr>
+          <a:xfrm>
+            <a:off x="5143504" y="4143380"/>
+            <a:ext cx="2286016" cy="1357322"/>
+          </a:xfrm>
+          <a:prstGeom prst="roundRect">
+            <a:avLst/>
+          </a:prstGeom>
+          <a:solidFill>
+            <a:schemeClr val="bg1"/>
+          </a:solidFill>
+          <a:ln>
+            <a:noFill/>
+          </a:ln>
+        </p:spPr>
+        <p:style>
+          <a:lnRef idx="2">
+            <a:schemeClr val="accent1">
+              <a:shade val="50000"/>
+            </a:schemeClr>
+          </a:lnRef>
+          <a:fillRef idx="1">
+            <a:schemeClr val="accent1"/>
+          </a:fillRef>
+          <a:effectRef idx="0">
+            <a:schemeClr val="accent1"/>
+          </a:effectRef>
+          <a:fontRef idx="minor">
+            <a:schemeClr val="lt1"/>
+          </a:fontRef>
+        </p:style>
+        <p:txBody>
+          <a:bodyPr rtlCol="0" anchor="ctr"/>
+          <a:lstStyle/>
+          <a:p>
+            <a:pPr algn="ctr"/>
+            <a:r>
+              <a:rPr lang="en-US" altLang="zh-TW" dirty="0" smtClean="0">
+                <a:solidFill>
+                  <a:schemeClr val="tx1"/>
+                </a:solidFill>
+              </a:rPr>
+              <a:t>There’s</a:t>
+            </a:r>
+            <a:r>
+              <a:rPr lang="zh-TW" altLang="en-US" dirty="0" smtClean="0">
+                <a:solidFill>
+                  <a:schemeClr val="tx1"/>
+                </a:solidFill>
+              </a:rPr>
+              <a:t> </a:t>
+            </a:r>
+            <a:r>
+              <a:rPr lang="en-US" altLang="zh-TW" dirty="0" smtClean="0">
+                <a:solidFill>
+                  <a:schemeClr val="tx1"/>
+                </a:solidFill>
+              </a:rPr>
+              <a:t>something</a:t>
+            </a:r>
+            <a:r>
+              <a:rPr lang="zh-TW" altLang="en-US" dirty="0" smtClean="0">
+                <a:solidFill>
+                  <a:schemeClr val="tx1"/>
+                </a:solidFill>
+              </a:rPr>
+              <a:t> </a:t>
+            </a:r>
+            <a:r>
+              <a:rPr lang="en-US" altLang="zh-TW" dirty="0" smtClean="0">
+                <a:solidFill>
+                  <a:schemeClr val="tx1"/>
+                </a:solidFill>
+              </a:rPr>
+              <a:t>wrong!</a:t>
+            </a:r>
+            <a:endParaRPr lang="zh-TW" altLang="en-US" dirty="0">
+              <a:solidFill>
+                <a:schemeClr val="tx1"/>
+              </a:solidFill>
+            </a:endParaRPr>
+          </a:p>
+        </p:txBody>
+      </p:sp>
+      <p:sp>
+        <p:nvSpPr>
+          <p:cNvPr id="14" name="文字方塊 13"/>
           <p:cNvSpPr txBox="1"/>
           <p:nvPr/>
         </p:nvSpPr>
         <p:spPr>
           <a:xfrm>
-            <a:off x="3428992" y="2714620"/>
-            <a:ext cx="2444772" cy="1015663"/>
+            <a:off x="7500958" y="3714752"/>
+            <a:ext cx="304892" cy="369332"/>
           </a:xfrm>
           <a:prstGeom prst="rect">
             <a:avLst/>
@@ -4192,10 +4670,10 @@
           <a:lstStyle/>
           <a:p>
             <a:r>
-              <a:rPr lang="en-US" altLang="zh-TW" sz="6000" dirty="0" smtClean="0"/>
-              <a:t>Backup</a:t>
-            </a:r>
-            <a:endParaRPr lang="zh-TW" altLang="en-US" sz="6000" dirty="0"/>
+              <a:rPr lang="en-US" altLang="zh-TW" dirty="0" smtClean="0"/>
+              <a:t>X</a:t>
+            </a:r>
+            <a:endParaRPr lang="zh-TW" altLang="en-US" dirty="0"/>
           </a:p>
         </p:txBody>
       </p:sp>
@@ -4224,39 +4702,36 @@
           <a:chExt cx="0" cy="0"/>
         </a:xfrm>
       </p:grpSpPr>
-      <p:pic>
-        <p:nvPicPr>
-          <p:cNvPr id="2051" name="Picture 3"/>
-          <p:cNvPicPr>
-            <a:picLocks noChangeAspect="1" noChangeArrowheads="1"/>
-          </p:cNvPicPr>
-          <p:nvPr/>
-        </p:nvPicPr>
-        <p:blipFill>
-          <a:blip r:embed="rId2"/>
-          <a:srcRect/>
-          <a:stretch>
-            <a:fillRect/>
-          </a:stretch>
-        </p:blipFill>
-        <p:spPr bwMode="auto">
-          <a:xfrm>
-            <a:off x="1500166" y="132226"/>
-            <a:ext cx="6266872" cy="6725774"/>
+      <p:sp>
+        <p:nvSpPr>
+          <p:cNvPr id="4" name="文字方塊 3"/>
+          <p:cNvSpPr txBox="1"/>
+          <p:nvPr/>
+        </p:nvSpPr>
+        <p:spPr>
+          <a:xfrm>
+            <a:off x="3428992" y="2714620"/>
+            <a:ext cx="2444772" cy="1015663"/>
           </a:xfrm>
           <a:prstGeom prst="rect">
             <a:avLst/>
           </a:prstGeom>
           <a:noFill/>
-          <a:ln w="9525">
-            <a:noFill/>
-            <a:miter lim="800000"/>
-            <a:headEnd/>
-            <a:tailEnd/>
-          </a:ln>
-          <a:effectLst/>
-        </p:spPr>
-      </p:pic>
+        </p:spPr>
+        <p:txBody>
+          <a:bodyPr wrap="none" rtlCol="0">
+            <a:spAutoFit/>
+          </a:bodyPr>
+          <a:lstStyle/>
+          <a:p>
+            <a:r>
+              <a:rPr lang="en-US" altLang="zh-TW" sz="6000" dirty="0" smtClean="0"/>
+              <a:t>Backup</a:t>
+            </a:r>
+            <a:endParaRPr lang="zh-TW" altLang="en-US" sz="6000" dirty="0"/>
+          </a:p>
+        </p:txBody>
+      </p:sp>
     </p:spTree>
   </p:cSld>
   <p:clrMapOvr>
@@ -4282,227 +4757,39 @@
           <a:chExt cx="0" cy="0"/>
         </a:xfrm>
       </p:grpSpPr>
-      <p:sp>
-        <p:nvSpPr>
-          <p:cNvPr id="4" name="矩形 3"/>
-          <p:cNvSpPr/>
-          <p:nvPr/>
-        </p:nvSpPr>
-        <p:spPr>
-          <a:xfrm>
-            <a:off x="428596" y="1000108"/>
-            <a:ext cx="8358246" cy="4857784"/>
-          </a:xfrm>
-          <a:prstGeom prst="rect">
-            <a:avLst/>
-          </a:prstGeom>
-          <a:solidFill>
-            <a:schemeClr val="bg1">
-              <a:lumMod val="95000"/>
-            </a:schemeClr>
-          </a:solidFill>
-        </p:spPr>
-        <p:style>
-          <a:lnRef idx="2">
-            <a:schemeClr val="accent1">
-              <a:shade val="50000"/>
-            </a:schemeClr>
-          </a:lnRef>
-          <a:fillRef idx="1">
-            <a:schemeClr val="accent1"/>
-          </a:fillRef>
-          <a:effectRef idx="0">
-            <a:schemeClr val="accent1"/>
-          </a:effectRef>
-          <a:fontRef idx="minor">
-            <a:schemeClr val="lt1"/>
-          </a:fontRef>
-        </p:style>
-        <p:txBody>
-          <a:bodyPr rtlCol="0" anchor="ctr"/>
-          <a:lstStyle/>
-          <a:p>
-            <a:pPr algn="ctr"/>
-            <a:endParaRPr lang="zh-TW" altLang="en-US"/>
-          </a:p>
-        </p:txBody>
-      </p:sp>
-      <p:sp>
-        <p:nvSpPr>
-          <p:cNvPr id="5" name="矩形 4"/>
-          <p:cNvSpPr/>
-          <p:nvPr/>
-        </p:nvSpPr>
-        <p:spPr>
-          <a:xfrm>
-            <a:off x="500034" y="1071546"/>
-            <a:ext cx="1857388" cy="714380"/>
-          </a:xfrm>
-          <a:prstGeom prst="rect">
-            <a:avLst/>
-          </a:prstGeom>
-        </p:spPr>
-        <p:style>
-          <a:lnRef idx="2">
-            <a:schemeClr val="accent1">
-              <a:shade val="50000"/>
-            </a:schemeClr>
-          </a:lnRef>
-          <a:fillRef idx="1">
-            <a:schemeClr val="accent1"/>
-          </a:fillRef>
-          <a:effectRef idx="0">
-            <a:schemeClr val="accent1"/>
-          </a:effectRef>
-          <a:fontRef idx="minor">
-            <a:schemeClr val="lt1"/>
-          </a:fontRef>
-        </p:style>
-        <p:txBody>
-          <a:bodyPr rtlCol="0" anchor="ctr"/>
-          <a:lstStyle/>
-          <a:p>
-            <a:pPr algn="ctr"/>
-            <a:r>
-              <a:rPr lang="en-US" altLang="zh-TW" dirty="0" smtClean="0"/>
-              <a:t>Create</a:t>
-            </a:r>
-            <a:endParaRPr lang="zh-TW" altLang="en-US" dirty="0"/>
-          </a:p>
-        </p:txBody>
-      </p:sp>
-      <p:sp>
-        <p:nvSpPr>
-          <p:cNvPr id="6" name="矩形 5"/>
-          <p:cNvSpPr/>
-          <p:nvPr/>
-        </p:nvSpPr>
-        <p:spPr>
-          <a:xfrm>
-            <a:off x="2428860" y="1071546"/>
-            <a:ext cx="1857388" cy="714380"/>
-          </a:xfrm>
-          <a:prstGeom prst="rect">
-            <a:avLst/>
-          </a:prstGeom>
-        </p:spPr>
-        <p:style>
-          <a:lnRef idx="2">
-            <a:schemeClr val="accent1">
-              <a:shade val="50000"/>
-            </a:schemeClr>
-          </a:lnRef>
-          <a:fillRef idx="1">
-            <a:schemeClr val="accent1"/>
-          </a:fillRef>
-          <a:effectRef idx="0">
-            <a:schemeClr val="accent1"/>
-          </a:effectRef>
-          <a:fontRef idx="minor">
-            <a:schemeClr val="lt1"/>
-          </a:fontRef>
-        </p:style>
-        <p:txBody>
-          <a:bodyPr rtlCol="0" anchor="ctr"/>
-          <a:lstStyle/>
-          <a:p>
-            <a:pPr algn="ctr"/>
-            <a:r>
-              <a:rPr lang="en-US" altLang="zh-TW" dirty="0" smtClean="0"/>
-              <a:t>Read</a:t>
-            </a:r>
-            <a:endParaRPr lang="zh-TW" altLang="en-US" dirty="0"/>
-          </a:p>
-        </p:txBody>
-      </p:sp>
-      <p:sp>
-        <p:nvSpPr>
-          <p:cNvPr id="7" name="矩形 6"/>
-          <p:cNvSpPr/>
-          <p:nvPr/>
-        </p:nvSpPr>
-        <p:spPr>
-          <a:xfrm>
-            <a:off x="4357686" y="1071546"/>
-            <a:ext cx="1857388" cy="714380"/>
-          </a:xfrm>
-          <a:prstGeom prst="rect">
-            <a:avLst/>
-          </a:prstGeom>
-        </p:spPr>
-        <p:style>
-          <a:lnRef idx="2">
-            <a:schemeClr val="accent1">
-              <a:shade val="50000"/>
-            </a:schemeClr>
-          </a:lnRef>
-          <a:fillRef idx="1">
-            <a:schemeClr val="accent1"/>
-          </a:fillRef>
-          <a:effectRef idx="0">
-            <a:schemeClr val="accent1"/>
-          </a:effectRef>
-          <a:fontRef idx="minor">
-            <a:schemeClr val="lt1"/>
-          </a:fontRef>
-        </p:style>
-        <p:txBody>
-          <a:bodyPr rtlCol="0" anchor="ctr"/>
-          <a:lstStyle/>
-          <a:p>
-            <a:pPr algn="ctr"/>
-            <a:r>
-              <a:rPr lang="en-US" altLang="zh-TW" dirty="0" smtClean="0"/>
-              <a:t>Update</a:t>
-            </a:r>
-            <a:endParaRPr lang="zh-TW" altLang="en-US" dirty="0"/>
-          </a:p>
-        </p:txBody>
-      </p:sp>
-      <p:sp>
-        <p:nvSpPr>
-          <p:cNvPr id="8" name="矩形 7"/>
-          <p:cNvSpPr/>
-          <p:nvPr/>
-        </p:nvSpPr>
-        <p:spPr>
-          <a:xfrm>
-            <a:off x="6286512" y="1071546"/>
-            <a:ext cx="1857388" cy="714380"/>
-          </a:xfrm>
-          <a:prstGeom prst="rect">
-            <a:avLst/>
-          </a:prstGeom>
-        </p:spPr>
-        <p:style>
-          <a:lnRef idx="2">
-            <a:schemeClr val="accent1">
-              <a:shade val="50000"/>
-            </a:schemeClr>
-          </a:lnRef>
-          <a:fillRef idx="1">
-            <a:schemeClr val="accent1"/>
-          </a:fillRef>
-          <a:effectRef idx="0">
-            <a:schemeClr val="accent1"/>
-          </a:effectRef>
-          <a:fontRef idx="minor">
-            <a:schemeClr val="lt1"/>
-          </a:fontRef>
-        </p:style>
-        <p:txBody>
-          <a:bodyPr rtlCol="0" anchor="ctr"/>
-          <a:lstStyle/>
-          <a:p>
-            <a:pPr algn="ctr"/>
-            <a:r>
-              <a:rPr lang="en-US" altLang="zh-TW" dirty="0" smtClean="0"/>
-              <a:t>Delete</a:t>
-            </a:r>
-            <a:endParaRPr lang="zh-TW" altLang="en-US" dirty="0"/>
-          </a:p>
-        </p:txBody>
-      </p:sp>
+      <p:pic>
+        <p:nvPicPr>
+          <p:cNvPr id="2051" name="Picture 3"/>
+          <p:cNvPicPr>
+            <a:picLocks noChangeAspect="1" noChangeArrowheads="1"/>
+          </p:cNvPicPr>
+          <p:nvPr/>
+        </p:nvPicPr>
+        <p:blipFill>
+          <a:blip r:embed="rId2"/>
+          <a:srcRect/>
+          <a:stretch>
+            <a:fillRect/>
+          </a:stretch>
+        </p:blipFill>
+        <p:spPr bwMode="auto">
+          <a:xfrm>
+            <a:off x="1500166" y="132226"/>
+            <a:ext cx="6266872" cy="6725774"/>
+          </a:xfrm>
+          <a:prstGeom prst="rect">
+            <a:avLst/>
+          </a:prstGeom>
+          <a:noFill/>
+          <a:ln w="9525">
+            <a:noFill/>
+            <a:miter lim="800000"/>
+            <a:headEnd/>
+            <a:tailEnd/>
+          </a:ln>
+          <a:effectLst/>
+        </p:spPr>
+      </p:pic>
     </p:spTree>
   </p:cSld>
   <p:clrMapOvr>
@@ -4530,6 +4817,252 @@
       </p:grpSpPr>
       <p:sp>
         <p:nvSpPr>
+          <p:cNvPr id="4" name="矩形 3"/>
+          <p:cNvSpPr/>
+          <p:nvPr/>
+        </p:nvSpPr>
+        <p:spPr>
+          <a:xfrm>
+            <a:off x="428596" y="1000108"/>
+            <a:ext cx="8358246" cy="4857784"/>
+          </a:xfrm>
+          <a:prstGeom prst="rect">
+            <a:avLst/>
+          </a:prstGeom>
+          <a:solidFill>
+            <a:schemeClr val="bg1">
+              <a:lumMod val="95000"/>
+            </a:schemeClr>
+          </a:solidFill>
+        </p:spPr>
+        <p:style>
+          <a:lnRef idx="2">
+            <a:schemeClr val="accent1">
+              <a:shade val="50000"/>
+            </a:schemeClr>
+          </a:lnRef>
+          <a:fillRef idx="1">
+            <a:schemeClr val="accent1"/>
+          </a:fillRef>
+          <a:effectRef idx="0">
+            <a:schemeClr val="accent1"/>
+          </a:effectRef>
+          <a:fontRef idx="minor">
+            <a:schemeClr val="lt1"/>
+          </a:fontRef>
+        </p:style>
+        <p:txBody>
+          <a:bodyPr rtlCol="0" anchor="ctr"/>
+          <a:lstStyle/>
+          <a:p>
+            <a:pPr algn="ctr"/>
+            <a:endParaRPr lang="zh-TW" altLang="en-US"/>
+          </a:p>
+        </p:txBody>
+      </p:sp>
+      <p:sp>
+        <p:nvSpPr>
+          <p:cNvPr id="5" name="矩形 4"/>
+          <p:cNvSpPr/>
+          <p:nvPr/>
+        </p:nvSpPr>
+        <p:spPr>
+          <a:xfrm>
+            <a:off x="500034" y="1071546"/>
+            <a:ext cx="1857388" cy="714380"/>
+          </a:xfrm>
+          <a:prstGeom prst="rect">
+            <a:avLst/>
+          </a:prstGeom>
+        </p:spPr>
+        <p:style>
+          <a:lnRef idx="2">
+            <a:schemeClr val="accent1">
+              <a:shade val="50000"/>
+            </a:schemeClr>
+          </a:lnRef>
+          <a:fillRef idx="1">
+            <a:schemeClr val="accent1"/>
+          </a:fillRef>
+          <a:effectRef idx="0">
+            <a:schemeClr val="accent1"/>
+          </a:effectRef>
+          <a:fontRef idx="minor">
+            <a:schemeClr val="lt1"/>
+          </a:fontRef>
+        </p:style>
+        <p:txBody>
+          <a:bodyPr rtlCol="0" anchor="ctr"/>
+          <a:lstStyle/>
+          <a:p>
+            <a:pPr algn="ctr"/>
+            <a:r>
+              <a:rPr lang="en-US" altLang="zh-TW" dirty="0" smtClean="0"/>
+              <a:t>Create</a:t>
+            </a:r>
+            <a:endParaRPr lang="zh-TW" altLang="en-US" dirty="0"/>
+          </a:p>
+        </p:txBody>
+      </p:sp>
+      <p:sp>
+        <p:nvSpPr>
+          <p:cNvPr id="6" name="矩形 5"/>
+          <p:cNvSpPr/>
+          <p:nvPr/>
+        </p:nvSpPr>
+        <p:spPr>
+          <a:xfrm>
+            <a:off x="2428860" y="1071546"/>
+            <a:ext cx="1857388" cy="714380"/>
+          </a:xfrm>
+          <a:prstGeom prst="rect">
+            <a:avLst/>
+          </a:prstGeom>
+        </p:spPr>
+        <p:style>
+          <a:lnRef idx="2">
+            <a:schemeClr val="accent1">
+              <a:shade val="50000"/>
+            </a:schemeClr>
+          </a:lnRef>
+          <a:fillRef idx="1">
+            <a:schemeClr val="accent1"/>
+          </a:fillRef>
+          <a:effectRef idx="0">
+            <a:schemeClr val="accent1"/>
+          </a:effectRef>
+          <a:fontRef idx="minor">
+            <a:schemeClr val="lt1"/>
+          </a:fontRef>
+        </p:style>
+        <p:txBody>
+          <a:bodyPr rtlCol="0" anchor="ctr"/>
+          <a:lstStyle/>
+          <a:p>
+            <a:pPr algn="ctr"/>
+            <a:r>
+              <a:rPr lang="en-US" altLang="zh-TW" dirty="0" smtClean="0"/>
+              <a:t>Read</a:t>
+            </a:r>
+            <a:endParaRPr lang="zh-TW" altLang="en-US" dirty="0"/>
+          </a:p>
+        </p:txBody>
+      </p:sp>
+      <p:sp>
+        <p:nvSpPr>
+          <p:cNvPr id="7" name="矩形 6"/>
+          <p:cNvSpPr/>
+          <p:nvPr/>
+        </p:nvSpPr>
+        <p:spPr>
+          <a:xfrm>
+            <a:off x="4357686" y="1071546"/>
+            <a:ext cx="1857388" cy="714380"/>
+          </a:xfrm>
+          <a:prstGeom prst="rect">
+            <a:avLst/>
+          </a:prstGeom>
+        </p:spPr>
+        <p:style>
+          <a:lnRef idx="2">
+            <a:schemeClr val="accent1">
+              <a:shade val="50000"/>
+            </a:schemeClr>
+          </a:lnRef>
+          <a:fillRef idx="1">
+            <a:schemeClr val="accent1"/>
+          </a:fillRef>
+          <a:effectRef idx="0">
+            <a:schemeClr val="accent1"/>
+          </a:effectRef>
+          <a:fontRef idx="minor">
+            <a:schemeClr val="lt1"/>
+          </a:fontRef>
+        </p:style>
+        <p:txBody>
+          <a:bodyPr rtlCol="0" anchor="ctr"/>
+          <a:lstStyle/>
+          <a:p>
+            <a:pPr algn="ctr"/>
+            <a:r>
+              <a:rPr lang="en-US" altLang="zh-TW" dirty="0" smtClean="0"/>
+              <a:t>Update</a:t>
+            </a:r>
+            <a:endParaRPr lang="zh-TW" altLang="en-US" dirty="0"/>
+          </a:p>
+        </p:txBody>
+      </p:sp>
+      <p:sp>
+        <p:nvSpPr>
+          <p:cNvPr id="8" name="矩形 7"/>
+          <p:cNvSpPr/>
+          <p:nvPr/>
+        </p:nvSpPr>
+        <p:spPr>
+          <a:xfrm>
+            <a:off x="6286512" y="1071546"/>
+            <a:ext cx="1857388" cy="714380"/>
+          </a:xfrm>
+          <a:prstGeom prst="rect">
+            <a:avLst/>
+          </a:prstGeom>
+        </p:spPr>
+        <p:style>
+          <a:lnRef idx="2">
+            <a:schemeClr val="accent1">
+              <a:shade val="50000"/>
+            </a:schemeClr>
+          </a:lnRef>
+          <a:fillRef idx="1">
+            <a:schemeClr val="accent1"/>
+          </a:fillRef>
+          <a:effectRef idx="0">
+            <a:schemeClr val="accent1"/>
+          </a:effectRef>
+          <a:fontRef idx="minor">
+            <a:schemeClr val="lt1"/>
+          </a:fontRef>
+        </p:style>
+        <p:txBody>
+          <a:bodyPr rtlCol="0" anchor="ctr"/>
+          <a:lstStyle/>
+          <a:p>
+            <a:pPr algn="ctr"/>
+            <a:r>
+              <a:rPr lang="en-US" altLang="zh-TW" dirty="0" smtClean="0"/>
+              <a:t>Delete</a:t>
+            </a:r>
+            <a:endParaRPr lang="zh-TW" altLang="en-US" dirty="0"/>
+          </a:p>
+        </p:txBody>
+      </p:sp>
+    </p:spTree>
+  </p:cSld>
+  <p:clrMapOvr>
+    <a:masterClrMapping/>
+  </p:clrMapOvr>
+</p:sld>
+</file>
+
+<file path=ppt/slides/slide14.xml><?xml version="1.0" encoding="utf-8"?>
+<p:sld xmlns:a="http://schemas.openxmlformats.org/drawingml/2006/main" xmlns:r="http://schemas.openxmlformats.org/officeDocument/2006/relationships" xmlns:p="http://schemas.openxmlformats.org/presentationml/2006/main">
+  <p:cSld>
+    <p:spTree>
+      <p:nvGrpSpPr>
+        <p:cNvPr id="1" name=""/>
+        <p:cNvGrpSpPr/>
+        <p:nvPr/>
+      </p:nvGrpSpPr>
+      <p:grpSpPr>
+        <a:xfrm>
+          <a:off x="0" y="0"/>
+          <a:ext cx="0" cy="0"/>
+          <a:chOff x="0" y="0"/>
+          <a:chExt cx="0" cy="0"/>
+        </a:xfrm>
+      </p:grpSpPr>
+      <p:sp>
+        <p:nvSpPr>
           <p:cNvPr id="8" name="矩形 7"/>
           <p:cNvSpPr/>
           <p:nvPr/>
@@ -5670,7 +6203,7 @@
 </p:sld>
 </file>
 
-<file path=ppt/slides/slide14.xml><?xml version="1.0" encoding="utf-8"?>
+<file path=ppt/slides/slide15.xml><?xml version="1.0" encoding="utf-8"?>
 <p:sld xmlns:a="http://schemas.openxmlformats.org/drawingml/2006/main" xmlns:r="http://schemas.openxmlformats.org/officeDocument/2006/relationships" xmlns:p="http://schemas.openxmlformats.org/presentationml/2006/main">
   <p:cSld>
     <p:spTree>
@@ -7249,7 +7782,7 @@
 </p:sld>
 </file>
 
-<file path=ppt/slides/slide15.xml><?xml version="1.0" encoding="utf-8"?>
+<file path=ppt/slides/slide16.xml><?xml version="1.0" encoding="utf-8"?>
 <p:sld xmlns:a="http://schemas.openxmlformats.org/drawingml/2006/main" xmlns:r="http://schemas.openxmlformats.org/officeDocument/2006/relationships" xmlns:p="http://schemas.openxmlformats.org/presentationml/2006/main">
   <p:cSld>
     <p:spTree>
@@ -8722,7 +9255,7 @@
 </p:sld>
 </file>
 
-<file path=ppt/slides/slide16.xml><?xml version="1.0" encoding="utf-8"?>
+<file path=ppt/slides/slide17.xml><?xml version="1.0" encoding="utf-8"?>
 <p:sld xmlns:a="http://schemas.openxmlformats.org/drawingml/2006/main" xmlns:r="http://schemas.openxmlformats.org/officeDocument/2006/relationships" xmlns:p="http://schemas.openxmlformats.org/presentationml/2006/main">
   <p:cSld>
     <p:spTree>
@@ -9843,7 +10376,7 @@
 </p:sld>
 </file>
 
-<file path=ppt/slides/slide17.xml><?xml version="1.0" encoding="utf-8"?>
+<file path=ppt/slides/slide18.xml><?xml version="1.0" encoding="utf-8"?>
 <p:sld xmlns:a="http://schemas.openxmlformats.org/drawingml/2006/main" xmlns:r="http://schemas.openxmlformats.org/officeDocument/2006/relationships" xmlns:p="http://schemas.openxmlformats.org/presentationml/2006/main">
   <p:cSld>
     <p:spTree>
@@ -14585,6 +15118,446 @@
         <p:spPr>
           <a:xfrm>
             <a:off x="0" y="0"/>
+            <a:ext cx="1785040" cy="430887"/>
+          </a:xfrm>
+          <a:prstGeom prst="rect">
+            <a:avLst/>
+          </a:prstGeom>
+        </p:spPr>
+        <p:style>
+          <a:lnRef idx="2">
+            <a:schemeClr val="accent2"/>
+          </a:lnRef>
+          <a:fillRef idx="1">
+            <a:schemeClr val="lt1"/>
+          </a:fillRef>
+          <a:effectRef idx="0">
+            <a:schemeClr val="accent2"/>
+          </a:effectRef>
+          <a:fontRef idx="minor">
+            <a:schemeClr val="dk1"/>
+          </a:fontRef>
+        </p:style>
+        <p:txBody>
+          <a:bodyPr wrap="none" rtlCol="0">
+            <a:spAutoFit/>
+          </a:bodyPr>
+          <a:lstStyle/>
+          <a:p>
+            <a:r>
+              <a:rPr lang="en-US" altLang="zh-TW" sz="2200" b="1" dirty="0" smtClean="0"/>
+              <a:t>Add Attribute</a:t>
+            </a:r>
+            <a:endParaRPr lang="zh-TW" altLang="en-US" sz="2200" b="1" dirty="0"/>
+          </a:p>
+        </p:txBody>
+      </p:sp>
+      <p:sp>
+        <p:nvSpPr>
+          <p:cNvPr id="5" name="圓角矩形 4"/>
+          <p:cNvSpPr/>
+          <p:nvPr/>
+        </p:nvSpPr>
+        <p:spPr>
+          <a:xfrm>
+            <a:off x="1928794" y="1785926"/>
+            <a:ext cx="4643470" cy="2214578"/>
+          </a:xfrm>
+          <a:prstGeom prst="roundRect">
+            <a:avLst/>
+          </a:prstGeom>
+          <a:noFill/>
+        </p:spPr>
+        <p:style>
+          <a:lnRef idx="2">
+            <a:schemeClr val="accent1">
+              <a:shade val="50000"/>
+            </a:schemeClr>
+          </a:lnRef>
+          <a:fillRef idx="1">
+            <a:schemeClr val="accent1"/>
+          </a:fillRef>
+          <a:effectRef idx="0">
+            <a:schemeClr val="accent1"/>
+          </a:effectRef>
+          <a:fontRef idx="minor">
+            <a:schemeClr val="lt1"/>
+          </a:fontRef>
+        </p:style>
+        <p:txBody>
+          <a:bodyPr rtlCol="0" anchor="ctr"/>
+          <a:lstStyle/>
+          <a:p>
+            <a:pPr algn="ctr"/>
+            <a:endParaRPr lang="zh-TW" altLang="en-US"/>
+          </a:p>
+        </p:txBody>
+      </p:sp>
+      <p:sp>
+        <p:nvSpPr>
+          <p:cNvPr id="6" name="文字方塊 5"/>
+          <p:cNvSpPr txBox="1"/>
+          <p:nvPr/>
+        </p:nvSpPr>
+        <p:spPr>
+          <a:xfrm>
+            <a:off x="3500430" y="1857364"/>
+            <a:ext cx="1603196" cy="400110"/>
+          </a:xfrm>
+          <a:prstGeom prst="rect">
+            <a:avLst/>
+          </a:prstGeom>
+          <a:noFill/>
+        </p:spPr>
+        <p:txBody>
+          <a:bodyPr wrap="none" rtlCol="0">
+            <a:spAutoFit/>
+          </a:bodyPr>
+          <a:lstStyle/>
+          <a:p>
+            <a:r>
+              <a:rPr lang="en-US" altLang="zh-TW" sz="2000" dirty="0" smtClean="0"/>
+              <a:t>Add Attribute</a:t>
+            </a:r>
+            <a:endParaRPr lang="zh-TW" altLang="en-US" sz="2000" dirty="0"/>
+          </a:p>
+        </p:txBody>
+      </p:sp>
+      <p:sp>
+        <p:nvSpPr>
+          <p:cNvPr id="7" name="文字方塊 6"/>
+          <p:cNvSpPr txBox="1"/>
+          <p:nvPr/>
+        </p:nvSpPr>
+        <p:spPr>
+          <a:xfrm>
+            <a:off x="2285984" y="2357430"/>
+            <a:ext cx="736099" cy="338554"/>
+          </a:xfrm>
+          <a:prstGeom prst="rect">
+            <a:avLst/>
+          </a:prstGeom>
+          <a:noFill/>
+        </p:spPr>
+        <p:txBody>
+          <a:bodyPr wrap="none" rtlCol="0">
+            <a:spAutoFit/>
+          </a:bodyPr>
+          <a:lstStyle/>
+          <a:p>
+            <a:r>
+              <a:rPr lang="en-US" altLang="zh-TW" sz="1600" dirty="0" smtClean="0"/>
+              <a:t>Name:</a:t>
+            </a:r>
+            <a:endParaRPr lang="zh-TW" altLang="en-US" sz="1600" dirty="0"/>
+          </a:p>
+        </p:txBody>
+      </p:sp>
+      <p:sp>
+        <p:nvSpPr>
+          <p:cNvPr id="8" name="文字方塊 7"/>
+          <p:cNvSpPr txBox="1"/>
+          <p:nvPr/>
+        </p:nvSpPr>
+        <p:spPr>
+          <a:xfrm>
+            <a:off x="2285984" y="2773916"/>
+            <a:ext cx="632224" cy="338554"/>
+          </a:xfrm>
+          <a:prstGeom prst="rect">
+            <a:avLst/>
+          </a:prstGeom>
+          <a:noFill/>
+        </p:spPr>
+        <p:txBody>
+          <a:bodyPr wrap="none" rtlCol="0">
+            <a:spAutoFit/>
+          </a:bodyPr>
+          <a:lstStyle/>
+          <a:p>
+            <a:r>
+              <a:rPr lang="en-US" altLang="zh-TW" sz="1600" dirty="0" smtClean="0"/>
+              <a:t>Type:</a:t>
+            </a:r>
+            <a:endParaRPr lang="zh-TW" altLang="en-US" sz="1600" dirty="0"/>
+          </a:p>
+        </p:txBody>
+      </p:sp>
+      <p:grpSp>
+        <p:nvGrpSpPr>
+          <p:cNvPr id="11" name="群組 10"/>
+          <p:cNvGrpSpPr/>
+          <p:nvPr/>
+        </p:nvGrpSpPr>
+        <p:grpSpPr>
+          <a:xfrm>
+            <a:off x="3071802" y="2773916"/>
+            <a:ext cx="1214446" cy="369332"/>
+            <a:chOff x="500034" y="1214422"/>
+            <a:chExt cx="1214446" cy="369332"/>
+          </a:xfrm>
+        </p:grpSpPr>
+        <p:sp>
+          <p:nvSpPr>
+            <p:cNvPr id="9" name="文字方塊 8"/>
+            <p:cNvSpPr txBox="1"/>
+            <p:nvPr/>
+          </p:nvSpPr>
+          <p:spPr>
+            <a:xfrm>
+              <a:off x="500034" y="1214422"/>
+              <a:ext cx="1214446" cy="369332"/>
+            </a:xfrm>
+            <a:prstGeom prst="rect">
+              <a:avLst/>
+            </a:prstGeom>
+            <a:solidFill>
+              <a:schemeClr val="bg1">
+                <a:lumMod val="85000"/>
+              </a:schemeClr>
+            </a:solidFill>
+          </p:spPr>
+          <p:style>
+            <a:lnRef idx="2">
+              <a:schemeClr val="accent1"/>
+            </a:lnRef>
+            <a:fillRef idx="1">
+              <a:schemeClr val="lt1"/>
+            </a:fillRef>
+            <a:effectRef idx="0">
+              <a:schemeClr val="accent1"/>
+            </a:effectRef>
+            <a:fontRef idx="minor">
+              <a:schemeClr val="dk1"/>
+            </a:fontRef>
+          </p:style>
+          <p:txBody>
+            <a:bodyPr wrap="square" rtlCol="0" anchor="ctr">
+              <a:spAutoFit/>
+            </a:bodyPr>
+            <a:lstStyle/>
+            <a:p>
+              <a:endParaRPr lang="zh-TW" altLang="en-US" dirty="0"/>
+            </a:p>
+          </p:txBody>
+        </p:sp>
+        <p:sp>
+          <p:nvSpPr>
+            <p:cNvPr id="10" name="流程圖: 合併 9"/>
+            <p:cNvSpPr/>
+            <p:nvPr/>
+          </p:nvSpPr>
+          <p:spPr>
+            <a:xfrm>
+              <a:off x="1428728" y="1357298"/>
+              <a:ext cx="142876" cy="71438"/>
+            </a:xfrm>
+            <a:prstGeom prst="flowChartMerge">
+              <a:avLst/>
+            </a:prstGeom>
+            <a:solidFill>
+              <a:schemeClr val="bg1"/>
+            </a:solidFill>
+          </p:spPr>
+          <p:style>
+            <a:lnRef idx="2">
+              <a:schemeClr val="accent1">
+                <a:shade val="50000"/>
+              </a:schemeClr>
+            </a:lnRef>
+            <a:fillRef idx="1">
+              <a:schemeClr val="accent1"/>
+            </a:fillRef>
+            <a:effectRef idx="0">
+              <a:schemeClr val="accent1"/>
+            </a:effectRef>
+            <a:fontRef idx="minor">
+              <a:schemeClr val="lt1"/>
+            </a:fontRef>
+          </p:style>
+          <p:txBody>
+            <a:bodyPr rtlCol="0" anchor="ctr"/>
+            <a:lstStyle/>
+            <a:p>
+              <a:pPr algn="ctr"/>
+              <a:endParaRPr lang="zh-TW" altLang="en-US"/>
+            </a:p>
+          </p:txBody>
+        </p:sp>
+      </p:grpSp>
+      <p:sp>
+        <p:nvSpPr>
+          <p:cNvPr id="12" name="矩形 11"/>
+          <p:cNvSpPr/>
+          <p:nvPr/>
+        </p:nvSpPr>
+        <p:spPr>
+          <a:xfrm>
+            <a:off x="3071802" y="2357430"/>
+            <a:ext cx="1214446" cy="357190"/>
+          </a:xfrm>
+          <a:prstGeom prst="rect">
+            <a:avLst/>
+          </a:prstGeom>
+          <a:solidFill>
+            <a:schemeClr val="bg1"/>
+          </a:solidFill>
+        </p:spPr>
+        <p:style>
+          <a:lnRef idx="2">
+            <a:schemeClr val="accent1">
+              <a:shade val="50000"/>
+            </a:schemeClr>
+          </a:lnRef>
+          <a:fillRef idx="1">
+            <a:schemeClr val="accent1"/>
+          </a:fillRef>
+          <a:effectRef idx="0">
+            <a:schemeClr val="accent1"/>
+          </a:effectRef>
+          <a:fontRef idx="minor">
+            <a:schemeClr val="lt1"/>
+          </a:fontRef>
+        </p:style>
+        <p:txBody>
+          <a:bodyPr rtlCol="0" anchor="ctr"/>
+          <a:lstStyle/>
+          <a:p>
+            <a:pPr algn="ctr"/>
+            <a:endParaRPr lang="zh-TW" altLang="en-US"/>
+          </a:p>
+        </p:txBody>
+      </p:sp>
+      <p:sp>
+        <p:nvSpPr>
+          <p:cNvPr id="13" name="文字方塊 12"/>
+          <p:cNvSpPr txBox="1"/>
+          <p:nvPr/>
+        </p:nvSpPr>
+        <p:spPr>
+          <a:xfrm>
+            <a:off x="5786446" y="3500438"/>
+            <a:ext cx="457176" cy="369332"/>
+          </a:xfrm>
+          <a:prstGeom prst="rect">
+            <a:avLst/>
+          </a:prstGeom>
+          <a:solidFill>
+            <a:schemeClr val="bg1">
+              <a:lumMod val="85000"/>
+            </a:schemeClr>
+          </a:solidFill>
+        </p:spPr>
+        <p:style>
+          <a:lnRef idx="2">
+            <a:schemeClr val="accent1"/>
+          </a:lnRef>
+          <a:fillRef idx="1">
+            <a:schemeClr val="lt1"/>
+          </a:fillRef>
+          <a:effectRef idx="0">
+            <a:schemeClr val="accent1"/>
+          </a:effectRef>
+          <a:fontRef idx="minor">
+            <a:schemeClr val="dk1"/>
+          </a:fontRef>
+        </p:style>
+        <p:txBody>
+          <a:bodyPr wrap="none" rtlCol="0" anchor="ctr">
+            <a:spAutoFit/>
+          </a:bodyPr>
+          <a:lstStyle/>
+          <a:p>
+            <a:r>
+              <a:rPr lang="en-US" altLang="zh-TW" dirty="0" smtClean="0"/>
+              <a:t>OK</a:t>
+            </a:r>
+            <a:endParaRPr lang="zh-TW" altLang="en-US" dirty="0"/>
+          </a:p>
+        </p:txBody>
+      </p:sp>
+      <p:sp>
+        <p:nvSpPr>
+          <p:cNvPr id="14" name="文字方塊 13"/>
+          <p:cNvSpPr txBox="1"/>
+          <p:nvPr/>
+        </p:nvSpPr>
+        <p:spPr>
+          <a:xfrm>
+            <a:off x="4857752" y="3500438"/>
+            <a:ext cx="806631" cy="369332"/>
+          </a:xfrm>
+          <a:prstGeom prst="rect">
+            <a:avLst/>
+          </a:prstGeom>
+          <a:solidFill>
+            <a:schemeClr val="bg1">
+              <a:lumMod val="85000"/>
+            </a:schemeClr>
+          </a:solidFill>
+        </p:spPr>
+        <p:style>
+          <a:lnRef idx="2">
+            <a:schemeClr val="accent1"/>
+          </a:lnRef>
+          <a:fillRef idx="1">
+            <a:schemeClr val="lt1"/>
+          </a:fillRef>
+          <a:effectRef idx="0">
+            <a:schemeClr val="accent1"/>
+          </a:effectRef>
+          <a:fontRef idx="minor">
+            <a:schemeClr val="dk1"/>
+          </a:fontRef>
+        </p:style>
+        <p:txBody>
+          <a:bodyPr wrap="none" rtlCol="0" anchor="ctr">
+            <a:spAutoFit/>
+          </a:bodyPr>
+          <a:lstStyle/>
+          <a:p>
+            <a:r>
+              <a:rPr lang="en-US" altLang="zh-TW" dirty="0" smtClean="0"/>
+              <a:t>Cancel</a:t>
+            </a:r>
+            <a:endParaRPr lang="zh-TW" altLang="en-US" dirty="0"/>
+          </a:p>
+        </p:txBody>
+      </p:sp>
+    </p:spTree>
+  </p:cSld>
+  <p:clrMapOvr>
+    <a:masterClrMapping/>
+  </p:clrMapOvr>
+</p:sld>
+</file>
+
+<file path=ppt/slides/slide7.xml><?xml version="1.0" encoding="utf-8"?>
+<p:sld xmlns:a="http://schemas.openxmlformats.org/drawingml/2006/main" xmlns:r="http://schemas.openxmlformats.org/officeDocument/2006/relationships" xmlns:p="http://schemas.openxmlformats.org/presentationml/2006/main">
+  <p:cSld>
+    <p:spTree>
+      <p:nvGrpSpPr>
+        <p:cNvPr id="1" name=""/>
+        <p:cNvGrpSpPr/>
+        <p:nvPr/>
+      </p:nvGrpSpPr>
+      <p:grpSpPr>
+        <a:xfrm>
+          <a:off x="0" y="0"/>
+          <a:ext cx="0" cy="0"/>
+          <a:chOff x="0" y="0"/>
+          <a:chExt cx="0" cy="0"/>
+        </a:xfrm>
+      </p:grpSpPr>
+      <p:sp>
+        <p:nvSpPr>
+          <p:cNvPr id="4" name="文字方塊 3"/>
+          <p:cNvSpPr txBox="1"/>
+          <p:nvPr/>
+        </p:nvSpPr>
+        <p:spPr>
+          <a:xfrm>
+            <a:off x="0" y="0"/>
             <a:ext cx="1508233" cy="430887"/>
           </a:xfrm>
           <a:prstGeom prst="rect">
@@ -16222,7 +17195,7 @@
 </p:sld>
 </file>
 
-<file path=ppt/slides/slide7.xml><?xml version="1.0" encoding="utf-8"?>
+<file path=ppt/slides/slide8.xml><?xml version="1.0" encoding="utf-8"?>
 <p:sld xmlns:a="http://schemas.openxmlformats.org/drawingml/2006/main" xmlns:r="http://schemas.openxmlformats.org/officeDocument/2006/relationships" xmlns:p="http://schemas.openxmlformats.org/presentationml/2006/main">
   <p:cSld>
     <p:spTree>
@@ -17650,7 +18623,7 @@
 </p:sld>
 </file>
 
-<file path=ppt/slides/slide8.xml><?xml version="1.0" encoding="utf-8"?>
+<file path=ppt/slides/slide9.xml><?xml version="1.0" encoding="utf-8"?>
 <p:sld xmlns:a="http://schemas.openxmlformats.org/drawingml/2006/main" xmlns:r="http://schemas.openxmlformats.org/officeDocument/2006/relationships" xmlns:p="http://schemas.openxmlformats.org/presentationml/2006/main">
   <p:cSld>
     <p:spTree>
@@ -18204,538 +19177,6 @@
             <a:r>
               <a:rPr lang="en-US" altLang="zh-TW" dirty="0" smtClean="0"/>
               <a:t>Refresh</a:t>
-            </a:r>
-            <a:endParaRPr lang="zh-TW" altLang="en-US" dirty="0"/>
-          </a:p>
-        </p:txBody>
-      </p:sp>
-    </p:spTree>
-  </p:cSld>
-  <p:clrMapOvr>
-    <a:masterClrMapping/>
-  </p:clrMapOvr>
-</p:sld>
-</file>
-
-<file path=ppt/slides/slide9.xml><?xml version="1.0" encoding="utf-8"?>
-<p:sld xmlns:a="http://schemas.openxmlformats.org/drawingml/2006/main" xmlns:r="http://schemas.openxmlformats.org/officeDocument/2006/relationships" xmlns:p="http://schemas.openxmlformats.org/presentationml/2006/main">
-  <p:cSld>
-    <p:spTree>
-      <p:nvGrpSpPr>
-        <p:cNvPr id="1" name=""/>
-        <p:cNvGrpSpPr/>
-        <p:nvPr/>
-      </p:nvGrpSpPr>
-      <p:grpSpPr>
-        <a:xfrm>
-          <a:off x="0" y="0"/>
-          <a:ext cx="0" cy="0"/>
-          <a:chOff x="0" y="0"/>
-          <a:chExt cx="0" cy="0"/>
-        </a:xfrm>
-      </p:grpSpPr>
-      <p:sp>
-        <p:nvSpPr>
-          <p:cNvPr id="7" name="標題 6"/>
-          <p:cNvSpPr>
-            <a:spLocks noGrp="1"/>
-          </p:cNvSpPr>
-          <p:nvPr>
-            <p:ph type="title"/>
-          </p:nvPr>
-        </p:nvSpPr>
-        <p:spPr>
-          <a:xfrm>
-            <a:off x="457200" y="-24"/>
-            <a:ext cx="8229600" cy="1143000"/>
-          </a:xfrm>
-        </p:spPr>
-        <p:txBody>
-          <a:bodyPr/>
-          <a:lstStyle/>
-          <a:p>
-            <a:r>
-              <a:rPr lang="zh-TW" altLang="en-US" dirty="0" smtClean="0"/>
-              <a:t>確認訊息 </a:t>
-            </a:r>
-            <a:r>
-              <a:rPr lang="en-US" altLang="zh-TW" dirty="0" smtClean="0"/>
-              <a:t>(</a:t>
-            </a:r>
-            <a:r>
-              <a:rPr lang="zh-TW" altLang="en-US" dirty="0" smtClean="0"/>
-              <a:t>覆蓋整版</a:t>
-            </a:r>
-            <a:r>
-              <a:rPr lang="en-US" altLang="zh-TW" dirty="0" smtClean="0"/>
-              <a:t>)</a:t>
-            </a:r>
-            <a:endParaRPr lang="zh-TW" altLang="en-US" dirty="0"/>
-          </a:p>
-        </p:txBody>
-      </p:sp>
-      <p:sp>
-        <p:nvSpPr>
-          <p:cNvPr id="8" name="文字版面配置區 7"/>
-          <p:cNvSpPr>
-            <a:spLocks noGrp="1"/>
-          </p:cNvSpPr>
-          <p:nvPr>
-            <p:ph type="body" idx="1"/>
-          </p:nvPr>
-        </p:nvSpPr>
-        <p:spPr/>
-        <p:txBody>
-          <a:bodyPr>
-            <a:noAutofit/>
-          </a:bodyPr>
-          <a:lstStyle/>
-          <a:p>
-            <a:pPr marL="342900" indent="-342900"/>
-            <a:r>
-              <a:rPr lang="en-US" altLang="zh-TW" sz="2800" dirty="0" smtClean="0"/>
-              <a:t>Confirmation</a:t>
-            </a:r>
-          </a:p>
-        </p:txBody>
-      </p:sp>
-      <p:sp>
-        <p:nvSpPr>
-          <p:cNvPr id="10" name="文字版面配置區 9"/>
-          <p:cNvSpPr>
-            <a:spLocks noGrp="1"/>
-          </p:cNvSpPr>
-          <p:nvPr>
-            <p:ph type="body" sz="quarter" idx="3"/>
-          </p:nvPr>
-        </p:nvSpPr>
-        <p:spPr/>
-        <p:txBody>
-          <a:bodyPr>
-            <a:noAutofit/>
-          </a:bodyPr>
-          <a:lstStyle/>
-          <a:p>
-            <a:r>
-              <a:rPr lang="en-US" altLang="zh-TW" sz="2800" dirty="0" smtClean="0"/>
-              <a:t>Action Result</a:t>
-            </a:r>
-            <a:endParaRPr lang="zh-TW" altLang="en-US" sz="2800" dirty="0" smtClean="0"/>
-          </a:p>
-        </p:txBody>
-      </p:sp>
-      <p:sp>
-        <p:nvSpPr>
-          <p:cNvPr id="13" name="矩形 12"/>
-          <p:cNvSpPr/>
-          <p:nvPr/>
-        </p:nvSpPr>
-        <p:spPr>
-          <a:xfrm>
-            <a:off x="500034" y="2214554"/>
-            <a:ext cx="3714776" cy="1643074"/>
-          </a:xfrm>
-          <a:prstGeom prst="rect">
-            <a:avLst/>
-          </a:prstGeom>
-          <a:solidFill>
-            <a:schemeClr val="accent2">
-              <a:lumMod val="20000"/>
-              <a:lumOff val="80000"/>
-            </a:schemeClr>
-          </a:solidFill>
-        </p:spPr>
-        <p:style>
-          <a:lnRef idx="2">
-            <a:schemeClr val="accent2"/>
-          </a:lnRef>
-          <a:fillRef idx="1">
-            <a:schemeClr val="lt1"/>
-          </a:fillRef>
-          <a:effectRef idx="0">
-            <a:schemeClr val="accent2"/>
-          </a:effectRef>
-          <a:fontRef idx="minor">
-            <a:schemeClr val="dk1"/>
-          </a:fontRef>
-        </p:style>
-        <p:txBody>
-          <a:bodyPr rtlCol="0" anchor="t"/>
-          <a:lstStyle/>
-          <a:p>
-            <a:pPr algn="ctr"/>
-            <a:r>
-              <a:rPr lang="en-US" altLang="zh-TW" dirty="0" smtClean="0"/>
-              <a:t>Are you sure you want to </a:t>
-            </a:r>
-            <a:r>
-              <a:rPr lang="en-US" altLang="zh-TW" b="1" dirty="0" smtClean="0"/>
-              <a:t>XXX</a:t>
-            </a:r>
-            <a:r>
-              <a:rPr lang="en-US" altLang="zh-TW" dirty="0" smtClean="0"/>
-              <a:t>?</a:t>
-            </a:r>
-            <a:endParaRPr lang="zh-TW" altLang="en-US" dirty="0">
-              <a:solidFill>
-                <a:srgbClr val="FF0000"/>
-              </a:solidFill>
-            </a:endParaRPr>
-          </a:p>
-        </p:txBody>
-      </p:sp>
-      <p:sp>
-        <p:nvSpPr>
-          <p:cNvPr id="15" name="圓角矩形 14"/>
-          <p:cNvSpPr/>
-          <p:nvPr/>
-        </p:nvSpPr>
-        <p:spPr>
-          <a:xfrm>
-            <a:off x="857224" y="3143248"/>
-            <a:ext cx="1357322" cy="571504"/>
-          </a:xfrm>
-          <a:prstGeom prst="roundRect">
-            <a:avLst/>
-          </a:prstGeom>
-          <a:solidFill>
-            <a:schemeClr val="accent2">
-              <a:lumMod val="40000"/>
-              <a:lumOff val="60000"/>
-            </a:schemeClr>
-          </a:solidFill>
-        </p:spPr>
-        <p:style>
-          <a:lnRef idx="2">
-            <a:schemeClr val="accent2">
-              <a:shade val="50000"/>
-            </a:schemeClr>
-          </a:lnRef>
-          <a:fillRef idx="1">
-            <a:schemeClr val="accent2"/>
-          </a:fillRef>
-          <a:effectRef idx="0">
-            <a:schemeClr val="accent2"/>
-          </a:effectRef>
-          <a:fontRef idx="minor">
-            <a:schemeClr val="lt1"/>
-          </a:fontRef>
-        </p:style>
-        <p:txBody>
-          <a:bodyPr rtlCol="0" anchor="ctr"/>
-          <a:lstStyle/>
-          <a:p>
-            <a:pPr algn="ctr"/>
-            <a:r>
-              <a:rPr lang="en-US" altLang="zh-TW" dirty="0" smtClean="0"/>
-              <a:t>Cancel</a:t>
-            </a:r>
-            <a:endParaRPr lang="zh-TW" altLang="en-US" dirty="0"/>
-          </a:p>
-        </p:txBody>
-      </p:sp>
-      <p:sp>
-        <p:nvSpPr>
-          <p:cNvPr id="16" name="圓角矩形 15"/>
-          <p:cNvSpPr/>
-          <p:nvPr/>
-        </p:nvSpPr>
-        <p:spPr>
-          <a:xfrm>
-            <a:off x="2428860" y="3143248"/>
-            <a:ext cx="1357322" cy="571504"/>
-          </a:xfrm>
-          <a:prstGeom prst="roundRect">
-            <a:avLst/>
-          </a:prstGeom>
-        </p:spPr>
-        <p:style>
-          <a:lnRef idx="2">
-            <a:schemeClr val="accent2">
-              <a:shade val="50000"/>
-            </a:schemeClr>
-          </a:lnRef>
-          <a:fillRef idx="1">
-            <a:schemeClr val="accent2"/>
-          </a:fillRef>
-          <a:effectRef idx="0">
-            <a:schemeClr val="accent2"/>
-          </a:effectRef>
-          <a:fontRef idx="minor">
-            <a:schemeClr val="lt1"/>
-          </a:fontRef>
-        </p:style>
-        <p:txBody>
-          <a:bodyPr rtlCol="0" anchor="ctr"/>
-          <a:lstStyle/>
-          <a:p>
-            <a:pPr algn="ctr"/>
-            <a:r>
-              <a:rPr lang="en-US" altLang="zh-TW" dirty="0" smtClean="0"/>
-              <a:t>Confirm</a:t>
-            </a:r>
-            <a:endParaRPr lang="zh-TW" altLang="en-US" dirty="0"/>
-          </a:p>
-        </p:txBody>
-      </p:sp>
-      <p:sp>
-        <p:nvSpPr>
-          <p:cNvPr id="17" name="矩形 16"/>
-          <p:cNvSpPr/>
-          <p:nvPr/>
-        </p:nvSpPr>
-        <p:spPr>
-          <a:xfrm>
-            <a:off x="4714876" y="3714752"/>
-            <a:ext cx="3143272" cy="1928826"/>
-          </a:xfrm>
-          <a:prstGeom prst="rect">
-            <a:avLst/>
-          </a:prstGeom>
-          <a:solidFill>
-            <a:schemeClr val="accent2">
-              <a:lumMod val="20000"/>
-              <a:lumOff val="80000"/>
-            </a:schemeClr>
-          </a:solidFill>
-        </p:spPr>
-        <p:style>
-          <a:lnRef idx="2">
-            <a:schemeClr val="accent2"/>
-          </a:lnRef>
-          <a:fillRef idx="1">
-            <a:schemeClr val="lt1"/>
-          </a:fillRef>
-          <a:effectRef idx="0">
-            <a:schemeClr val="accent2"/>
-          </a:effectRef>
-          <a:fontRef idx="minor">
-            <a:schemeClr val="dk1"/>
-          </a:fontRef>
-        </p:style>
-        <p:txBody>
-          <a:bodyPr rtlCol="0" anchor="t"/>
-          <a:lstStyle/>
-          <a:p>
-            <a:pPr algn="ctr"/>
-            <a:r>
-              <a:rPr lang="en-US" altLang="zh-TW" b="1" dirty="0" smtClean="0">
-                <a:solidFill>
-                  <a:schemeClr val="tx1"/>
-                </a:solidFill>
-              </a:rPr>
-              <a:t>Error</a:t>
-            </a:r>
-          </a:p>
-        </p:txBody>
-      </p:sp>
-      <p:sp>
-        <p:nvSpPr>
-          <p:cNvPr id="18" name="矩形 17"/>
-          <p:cNvSpPr/>
-          <p:nvPr/>
-        </p:nvSpPr>
-        <p:spPr>
-          <a:xfrm>
-            <a:off x="4714876" y="2214554"/>
-            <a:ext cx="3143272" cy="1285884"/>
-          </a:xfrm>
-          <a:prstGeom prst="rect">
-            <a:avLst/>
-          </a:prstGeom>
-          <a:solidFill>
-            <a:schemeClr val="accent3">
-              <a:lumMod val="20000"/>
-              <a:lumOff val="80000"/>
-            </a:schemeClr>
-          </a:solidFill>
-        </p:spPr>
-        <p:style>
-          <a:lnRef idx="2">
-            <a:schemeClr val="accent3"/>
-          </a:lnRef>
-          <a:fillRef idx="1">
-            <a:schemeClr val="lt1"/>
-          </a:fillRef>
-          <a:effectRef idx="0">
-            <a:schemeClr val="accent3"/>
-          </a:effectRef>
-          <a:fontRef idx="minor">
-            <a:schemeClr val="dk1"/>
-          </a:fontRef>
-        </p:style>
-        <p:txBody>
-          <a:bodyPr rtlCol="0" anchor="t"/>
-          <a:lstStyle/>
-          <a:p>
-            <a:pPr algn="ctr"/>
-            <a:r>
-              <a:rPr lang="en-US" altLang="zh-TW" b="1" dirty="0" smtClean="0"/>
-              <a:t>Success</a:t>
-            </a:r>
-            <a:endParaRPr lang="zh-TW" altLang="en-US" b="1" dirty="0"/>
-          </a:p>
-        </p:txBody>
-      </p:sp>
-      <p:sp>
-        <p:nvSpPr>
-          <p:cNvPr id="19" name="圓角矩形 18"/>
-          <p:cNvSpPr/>
-          <p:nvPr/>
-        </p:nvSpPr>
-        <p:spPr>
-          <a:xfrm>
-            <a:off x="5786446" y="2714620"/>
-            <a:ext cx="1000132" cy="571504"/>
-          </a:xfrm>
-          <a:prstGeom prst="roundRect">
-            <a:avLst/>
-          </a:prstGeom>
-        </p:spPr>
-        <p:style>
-          <a:lnRef idx="2">
-            <a:schemeClr val="accent3">
-              <a:shade val="50000"/>
-            </a:schemeClr>
-          </a:lnRef>
-          <a:fillRef idx="1">
-            <a:schemeClr val="accent3"/>
-          </a:fillRef>
-          <a:effectRef idx="0">
-            <a:schemeClr val="accent3"/>
-          </a:effectRef>
-          <a:fontRef idx="minor">
-            <a:schemeClr val="lt1"/>
-          </a:fontRef>
-        </p:style>
-        <p:txBody>
-          <a:bodyPr rtlCol="0" anchor="ctr"/>
-          <a:lstStyle/>
-          <a:p>
-            <a:pPr algn="ctr"/>
-            <a:r>
-              <a:rPr lang="en-US" altLang="zh-TW" dirty="0" smtClean="0"/>
-              <a:t>OK</a:t>
-            </a:r>
-            <a:endParaRPr lang="zh-TW" altLang="en-US" dirty="0"/>
-          </a:p>
-        </p:txBody>
-      </p:sp>
-      <p:sp>
-        <p:nvSpPr>
-          <p:cNvPr id="23" name="圓角矩形 22"/>
-          <p:cNvSpPr/>
-          <p:nvPr/>
-        </p:nvSpPr>
-        <p:spPr>
-          <a:xfrm>
-            <a:off x="5143504" y="4143380"/>
-            <a:ext cx="2286016" cy="1357322"/>
-          </a:xfrm>
-          <a:prstGeom prst="roundRect">
-            <a:avLst/>
-          </a:prstGeom>
-          <a:solidFill>
-            <a:schemeClr val="bg1"/>
-          </a:solidFill>
-          <a:ln>
-            <a:noFill/>
-          </a:ln>
-        </p:spPr>
-        <p:style>
-          <a:lnRef idx="2">
-            <a:schemeClr val="accent1">
-              <a:shade val="50000"/>
-            </a:schemeClr>
-          </a:lnRef>
-          <a:fillRef idx="1">
-            <a:schemeClr val="accent1"/>
-          </a:fillRef>
-          <a:effectRef idx="0">
-            <a:schemeClr val="accent1"/>
-          </a:effectRef>
-          <a:fontRef idx="minor">
-            <a:schemeClr val="lt1"/>
-          </a:fontRef>
-        </p:style>
-        <p:txBody>
-          <a:bodyPr rtlCol="0" anchor="ctr"/>
-          <a:lstStyle/>
-          <a:p>
-            <a:pPr algn="ctr"/>
-            <a:r>
-              <a:rPr lang="en-US" altLang="zh-TW" dirty="0" smtClean="0">
-                <a:solidFill>
-                  <a:schemeClr val="tx1"/>
-                </a:solidFill>
-              </a:rPr>
-              <a:t>There’s</a:t>
-            </a:r>
-            <a:r>
-              <a:rPr lang="zh-TW" altLang="en-US" dirty="0" smtClean="0">
-                <a:solidFill>
-                  <a:schemeClr val="tx1"/>
-                </a:solidFill>
-              </a:rPr>
-              <a:t> </a:t>
-            </a:r>
-            <a:r>
-              <a:rPr lang="en-US" altLang="zh-TW" dirty="0" smtClean="0">
-                <a:solidFill>
-                  <a:schemeClr val="tx1"/>
-                </a:solidFill>
-              </a:rPr>
-              <a:t>something</a:t>
-            </a:r>
-            <a:r>
-              <a:rPr lang="zh-TW" altLang="en-US" dirty="0" smtClean="0">
-                <a:solidFill>
-                  <a:schemeClr val="tx1"/>
-                </a:solidFill>
-              </a:rPr>
-              <a:t> </a:t>
-            </a:r>
-            <a:r>
-              <a:rPr lang="en-US" altLang="zh-TW" dirty="0" smtClean="0">
-                <a:solidFill>
-                  <a:schemeClr val="tx1"/>
-                </a:solidFill>
-              </a:rPr>
-              <a:t>wrong!</a:t>
-            </a:r>
-            <a:endParaRPr lang="zh-TW" altLang="en-US" dirty="0">
-              <a:solidFill>
-                <a:schemeClr val="tx1"/>
-              </a:solidFill>
-            </a:endParaRPr>
-          </a:p>
-        </p:txBody>
-      </p:sp>
-      <p:sp>
-        <p:nvSpPr>
-          <p:cNvPr id="14" name="文字方塊 13"/>
-          <p:cNvSpPr txBox="1"/>
-          <p:nvPr/>
-        </p:nvSpPr>
-        <p:spPr>
-          <a:xfrm>
-            <a:off x="7500958" y="3714752"/>
-            <a:ext cx="304892" cy="369332"/>
-          </a:xfrm>
-          <a:prstGeom prst="rect">
-            <a:avLst/>
-          </a:prstGeom>
-          <a:noFill/>
-        </p:spPr>
-        <p:txBody>
-          <a:bodyPr wrap="none" rtlCol="0">
-            <a:spAutoFit/>
-          </a:bodyPr>
-          <a:lstStyle/>
-          <a:p>
-            <a:r>
-              <a:rPr lang="en-US" altLang="zh-TW" dirty="0" smtClean="0"/>
-              <a:t>X</a:t>
             </a:r>
             <a:endParaRPr lang="zh-TW" altLang="en-US" dirty="0"/>
           </a:p>

</xml_diff>

<commit_message>
Delete attributes in DB
</commit_message>
<xml_diff>
--- a/design/DynamoDB Manager.pptx
+++ b/design/DynamoDB Manager.pptx
@@ -210,7 +210,7 @@
             <a:fld id="{3EFBCEC4-59EF-4924-85C6-6463810B52A1}" type="datetimeFigureOut">
               <a:rPr lang="zh-TW" altLang="en-US" smtClean="0"/>
               <a:pPr/>
-              <a:t>2020/6/26</a:t>
+              <a:t>2020/6/28</a:t>
             </a:fld>
             <a:endParaRPr lang="zh-TW" altLang="en-US"/>
           </a:p>
@@ -1320,7 +1320,7 @@
             <a:fld id="{06EDFE59-1DA3-406F-94B4-33B1A2438A5C}" type="datetimeFigureOut">
               <a:rPr lang="zh-TW" altLang="en-US" smtClean="0"/>
               <a:pPr/>
-              <a:t>2020/6/26</a:t>
+              <a:t>2020/6/28</a:t>
             </a:fld>
             <a:endParaRPr lang="zh-TW" altLang="en-US"/>
           </a:p>
@@ -1487,7 +1487,7 @@
             <a:fld id="{06EDFE59-1DA3-406F-94B4-33B1A2438A5C}" type="datetimeFigureOut">
               <a:rPr lang="zh-TW" altLang="en-US" smtClean="0"/>
               <a:pPr/>
-              <a:t>2020/6/26</a:t>
+              <a:t>2020/6/28</a:t>
             </a:fld>
             <a:endParaRPr lang="zh-TW" altLang="en-US"/>
           </a:p>
@@ -1664,7 +1664,7 @@
             <a:fld id="{06EDFE59-1DA3-406F-94B4-33B1A2438A5C}" type="datetimeFigureOut">
               <a:rPr lang="zh-TW" altLang="en-US" smtClean="0"/>
               <a:pPr/>
-              <a:t>2020/6/26</a:t>
+              <a:t>2020/6/28</a:t>
             </a:fld>
             <a:endParaRPr lang="zh-TW" altLang="en-US"/>
           </a:p>
@@ -1831,7 +1831,7 @@
             <a:fld id="{06EDFE59-1DA3-406F-94B4-33B1A2438A5C}" type="datetimeFigureOut">
               <a:rPr lang="zh-TW" altLang="en-US" smtClean="0"/>
               <a:pPr/>
-              <a:t>2020/6/26</a:t>
+              <a:t>2020/6/28</a:t>
             </a:fld>
             <a:endParaRPr lang="zh-TW" altLang="en-US"/>
           </a:p>
@@ -2074,7 +2074,7 @@
             <a:fld id="{06EDFE59-1DA3-406F-94B4-33B1A2438A5C}" type="datetimeFigureOut">
               <a:rPr lang="zh-TW" altLang="en-US" smtClean="0"/>
               <a:pPr/>
-              <a:t>2020/6/26</a:t>
+              <a:t>2020/6/28</a:t>
             </a:fld>
             <a:endParaRPr lang="zh-TW" altLang="en-US"/>
           </a:p>
@@ -2359,7 +2359,7 @@
             <a:fld id="{06EDFE59-1DA3-406F-94B4-33B1A2438A5C}" type="datetimeFigureOut">
               <a:rPr lang="zh-TW" altLang="en-US" smtClean="0"/>
               <a:pPr/>
-              <a:t>2020/6/26</a:t>
+              <a:t>2020/6/28</a:t>
             </a:fld>
             <a:endParaRPr lang="zh-TW" altLang="en-US"/>
           </a:p>
@@ -2778,7 +2778,7 @@
             <a:fld id="{06EDFE59-1DA3-406F-94B4-33B1A2438A5C}" type="datetimeFigureOut">
               <a:rPr lang="zh-TW" altLang="en-US" smtClean="0"/>
               <a:pPr/>
-              <a:t>2020/6/26</a:t>
+              <a:t>2020/6/28</a:t>
             </a:fld>
             <a:endParaRPr lang="zh-TW" altLang="en-US"/>
           </a:p>
@@ -2893,7 +2893,7 @@
             <a:fld id="{06EDFE59-1DA3-406F-94B4-33B1A2438A5C}" type="datetimeFigureOut">
               <a:rPr lang="zh-TW" altLang="en-US" smtClean="0"/>
               <a:pPr/>
-              <a:t>2020/6/26</a:t>
+              <a:t>2020/6/28</a:t>
             </a:fld>
             <a:endParaRPr lang="zh-TW" altLang="en-US"/>
           </a:p>
@@ -2985,7 +2985,7 @@
             <a:fld id="{06EDFE59-1DA3-406F-94B4-33B1A2438A5C}" type="datetimeFigureOut">
               <a:rPr lang="zh-TW" altLang="en-US" smtClean="0"/>
               <a:pPr/>
-              <a:t>2020/6/26</a:t>
+              <a:t>2020/6/28</a:t>
             </a:fld>
             <a:endParaRPr lang="zh-TW" altLang="en-US"/>
           </a:p>
@@ -3259,7 +3259,7 @@
             <a:fld id="{06EDFE59-1DA3-406F-94B4-33B1A2438A5C}" type="datetimeFigureOut">
               <a:rPr lang="zh-TW" altLang="en-US" smtClean="0"/>
               <a:pPr/>
-              <a:t>2020/6/26</a:t>
+              <a:t>2020/6/28</a:t>
             </a:fld>
             <a:endParaRPr lang="zh-TW" altLang="en-US"/>
           </a:p>
@@ -3509,7 +3509,7 @@
             <a:fld id="{06EDFE59-1DA3-406F-94B4-33B1A2438A5C}" type="datetimeFigureOut">
               <a:rPr lang="zh-TW" altLang="en-US" smtClean="0"/>
               <a:pPr/>
-              <a:t>2020/6/26</a:t>
+              <a:t>2020/6/28</a:t>
             </a:fld>
             <a:endParaRPr lang="zh-TW" altLang="en-US"/>
           </a:p>
@@ -3724,7 +3724,7 @@
             <a:fld id="{06EDFE59-1DA3-406F-94B4-33B1A2438A5C}" type="datetimeFigureOut">
               <a:rPr lang="zh-TW" altLang="en-US" smtClean="0"/>
               <a:pPr/>
-              <a:t>2020/6/26</a:t>
+              <a:t>2020/6/28</a:t>
             </a:fld>
             <a:endParaRPr lang="zh-TW" altLang="en-US"/>
           </a:p>
@@ -13752,7 +13752,7 @@
         </p:nvSpPr>
         <p:spPr>
           <a:xfrm>
-            <a:off x="7929586" y="4429132"/>
+            <a:off x="7929586" y="4500570"/>
             <a:ext cx="874150" cy="369332"/>
           </a:xfrm>
           <a:prstGeom prst="rect">
@@ -13846,7 +13846,7 @@
         </p:nvSpPr>
         <p:spPr>
           <a:xfrm>
-            <a:off x="1857356" y="4786322"/>
+            <a:off x="1857356" y="5115839"/>
             <a:ext cx="5857916" cy="1384995"/>
           </a:xfrm>
           <a:prstGeom prst="rect">
@@ -14229,7 +14229,7 @@
           <p:nvPr/>
         </p:nvGraphicFramePr>
         <p:xfrm>
-          <a:off x="6858016" y="2000240"/>
+          <a:off x="6858016" y="2071678"/>
           <a:ext cx="2000264" cy="2357455"/>
         </p:xfrm>
         <a:graphic>
@@ -14427,7 +14427,7 @@
         </p:blipFill>
         <p:spPr bwMode="auto">
           <a:xfrm>
-            <a:off x="7572396" y="2071678"/>
+            <a:off x="7572396" y="2143116"/>
             <a:ext cx="177779" cy="177779"/>
           </a:xfrm>
           <a:prstGeom prst="rect">
@@ -14453,7 +14453,7 @@
         </p:blipFill>
         <p:spPr bwMode="auto">
           <a:xfrm>
-            <a:off x="8643966" y="2071678"/>
+            <a:off x="8643966" y="2143116"/>
             <a:ext cx="177779" cy="177779"/>
           </a:xfrm>
           <a:prstGeom prst="rect">
@@ -14519,8 +14519,8 @@
           <p:nvPr/>
         </p:nvGraphicFramePr>
         <p:xfrm>
-          <a:off x="357158" y="2000240"/>
-          <a:ext cx="6096000" cy="1854200"/>
+          <a:off x="357158" y="2071678"/>
+          <a:ext cx="6096000" cy="2225040"/>
         </p:xfrm>
         <a:graphic>
           <a:graphicData uri="http://schemas.openxmlformats.org/drawingml/2006/table">
@@ -14534,6 +14534,80 @@
                 <a:gridCol w="1524000"/>
                 <a:gridCol w="1524000"/>
               </a:tblGrid>
+              <a:tr h="370840">
+                <a:tc>
+                  <a:txBody>
+                    <a:bodyPr/>
+                    <a:lstStyle/>
+                    <a:p>
+                      <a:r>
+                        <a:rPr lang="en-US" altLang="zh-TW" b="1" dirty="0" smtClean="0"/>
+                        <a:t>Delete</a:t>
+                      </a:r>
+                      <a:endParaRPr lang="zh-TW" altLang="en-US" b="1" dirty="0"/>
+                    </a:p>
+                  </a:txBody>
+                  <a:tcPr>
+                    <a:solidFill>
+                      <a:schemeClr val="accent2">
+                        <a:lumMod val="40000"/>
+                        <a:lumOff val="60000"/>
+                      </a:schemeClr>
+                    </a:solidFill>
+                  </a:tcPr>
+                </a:tc>
+                <a:tc>
+                  <a:txBody>
+                    <a:bodyPr/>
+                    <a:lstStyle/>
+                    <a:p>
+                      <a:endParaRPr lang="zh-TW" altLang="en-US" dirty="0"/>
+                    </a:p>
+                  </a:txBody>
+                  <a:tcPr>
+                    <a:solidFill>
+                      <a:schemeClr val="accent2">
+                        <a:lumMod val="40000"/>
+                        <a:lumOff val="60000"/>
+                      </a:schemeClr>
+                    </a:solidFill>
+                  </a:tcPr>
+                </a:tc>
+                <a:tc>
+                  <a:txBody>
+                    <a:bodyPr/>
+                    <a:lstStyle/>
+                    <a:p>
+                      <a:endParaRPr lang="zh-TW" altLang="en-US" dirty="0"/>
+                    </a:p>
+                  </a:txBody>
+                  <a:tcPr>
+                    <a:solidFill>
+                      <a:schemeClr val="accent2">
+                        <a:lumMod val="40000"/>
+                        <a:lumOff val="60000"/>
+                      </a:schemeClr>
+                    </a:solidFill>
+                  </a:tcPr>
+                </a:tc>
+                <a:tc>
+                  <a:txBody>
+                    <a:bodyPr/>
+                    <a:lstStyle/>
+                    <a:p>
+                      <a:endParaRPr lang="zh-TW" altLang="en-US" dirty="0"/>
+                    </a:p>
+                  </a:txBody>
+                  <a:tcPr>
+                    <a:solidFill>
+                      <a:schemeClr val="accent2">
+                        <a:lumMod val="40000"/>
+                        <a:lumOff val="60000"/>
+                      </a:schemeClr>
+                    </a:solidFill>
+                  </a:tcPr>
+                </a:tc>
+              </a:tr>
               <a:tr h="370840">
                 <a:tc>
                   <a:txBody>
@@ -14921,7 +14995,7 @@
         </p:nvSpPr>
         <p:spPr>
           <a:xfrm>
-            <a:off x="428596" y="3152001"/>
+            <a:off x="428596" y="3223439"/>
             <a:ext cx="1357322" cy="276999"/>
           </a:xfrm>
           <a:prstGeom prst="rect">
@@ -14969,7 +15043,7 @@
         </p:nvSpPr>
         <p:spPr>
           <a:xfrm>
-            <a:off x="1571604" y="3223439"/>
+            <a:off x="1643042" y="3286124"/>
             <a:ext cx="142876" cy="71438"/>
           </a:xfrm>
           <a:prstGeom prst="flowChartMerge">
@@ -15012,7 +15086,7 @@
         </p:nvSpPr>
         <p:spPr>
           <a:xfrm>
-            <a:off x="214282" y="4000504"/>
+            <a:off x="214282" y="4330021"/>
             <a:ext cx="1671740" cy="923330"/>
           </a:xfrm>
           <a:prstGeom prst="rect">
@@ -15059,8 +15133,8 @@
         </p:nvCxnSpPr>
         <p:spPr>
           <a:xfrm rot="5400000">
-            <a:off x="993784" y="3351245"/>
-            <a:ext cx="705627" cy="592890"/>
+            <a:off x="896087" y="3511627"/>
+            <a:ext cx="972459" cy="664328"/>
           </a:xfrm>
           <a:prstGeom prst="straightConnector1">
             <a:avLst/>
@@ -15084,6 +15158,162 @@
           </a:fontRef>
         </p:style>
       </p:cxnSp>
+      <p:sp>
+        <p:nvSpPr>
+          <p:cNvPr id="21" name="矩形 20"/>
+          <p:cNvSpPr/>
+          <p:nvPr/>
+        </p:nvSpPr>
+        <p:spPr>
+          <a:xfrm>
+            <a:off x="1928794" y="2143116"/>
+            <a:ext cx="214314" cy="214314"/>
+          </a:xfrm>
+          <a:prstGeom prst="rect">
+            <a:avLst/>
+          </a:prstGeom>
+          <a:solidFill>
+            <a:schemeClr val="bg1">
+              <a:lumMod val="95000"/>
+            </a:schemeClr>
+          </a:solidFill>
+          <a:ln>
+            <a:solidFill>
+              <a:schemeClr val="accent2">
+                <a:lumMod val="75000"/>
+              </a:schemeClr>
+            </a:solidFill>
+          </a:ln>
+        </p:spPr>
+        <p:style>
+          <a:lnRef idx="2">
+            <a:schemeClr val="accent1">
+              <a:shade val="50000"/>
+            </a:schemeClr>
+          </a:lnRef>
+          <a:fillRef idx="1">
+            <a:schemeClr val="accent1"/>
+          </a:fillRef>
+          <a:effectRef idx="0">
+            <a:schemeClr val="accent1"/>
+          </a:effectRef>
+          <a:fontRef idx="minor">
+            <a:schemeClr val="lt1"/>
+          </a:fontRef>
+        </p:style>
+        <p:txBody>
+          <a:bodyPr rtlCol="0" anchor="ctr"/>
+          <a:lstStyle/>
+          <a:p>
+            <a:pPr algn="ctr"/>
+            <a:endParaRPr lang="zh-TW" altLang="en-US"/>
+          </a:p>
+        </p:txBody>
+      </p:sp>
+      <p:sp>
+        <p:nvSpPr>
+          <p:cNvPr id="22" name="矩形 21"/>
+          <p:cNvSpPr/>
+          <p:nvPr/>
+        </p:nvSpPr>
+        <p:spPr>
+          <a:xfrm>
+            <a:off x="3428992" y="2143116"/>
+            <a:ext cx="214314" cy="214314"/>
+          </a:xfrm>
+          <a:prstGeom prst="rect">
+            <a:avLst/>
+          </a:prstGeom>
+          <a:solidFill>
+            <a:schemeClr val="bg1">
+              <a:lumMod val="95000"/>
+            </a:schemeClr>
+          </a:solidFill>
+          <a:ln>
+            <a:solidFill>
+              <a:schemeClr val="accent2">
+                <a:lumMod val="75000"/>
+              </a:schemeClr>
+            </a:solidFill>
+          </a:ln>
+        </p:spPr>
+        <p:style>
+          <a:lnRef idx="2">
+            <a:schemeClr val="accent1">
+              <a:shade val="50000"/>
+            </a:schemeClr>
+          </a:lnRef>
+          <a:fillRef idx="1">
+            <a:schemeClr val="accent1"/>
+          </a:fillRef>
+          <a:effectRef idx="0">
+            <a:schemeClr val="accent1"/>
+          </a:effectRef>
+          <a:fontRef idx="minor">
+            <a:schemeClr val="lt1"/>
+          </a:fontRef>
+        </p:style>
+        <p:txBody>
+          <a:bodyPr rtlCol="0" anchor="ctr"/>
+          <a:lstStyle/>
+          <a:p>
+            <a:pPr algn="ctr"/>
+            <a:endParaRPr lang="zh-TW" altLang="en-US"/>
+          </a:p>
+        </p:txBody>
+      </p:sp>
+      <p:sp>
+        <p:nvSpPr>
+          <p:cNvPr id="23" name="矩形 22"/>
+          <p:cNvSpPr/>
+          <p:nvPr/>
+        </p:nvSpPr>
+        <p:spPr>
+          <a:xfrm>
+            <a:off x="4929190" y="2143116"/>
+            <a:ext cx="214314" cy="214314"/>
+          </a:xfrm>
+          <a:prstGeom prst="rect">
+            <a:avLst/>
+          </a:prstGeom>
+          <a:solidFill>
+            <a:schemeClr val="bg1">
+              <a:lumMod val="95000"/>
+            </a:schemeClr>
+          </a:solidFill>
+          <a:ln>
+            <a:solidFill>
+              <a:schemeClr val="accent2">
+                <a:lumMod val="75000"/>
+              </a:schemeClr>
+            </a:solidFill>
+          </a:ln>
+        </p:spPr>
+        <p:style>
+          <a:lnRef idx="2">
+            <a:schemeClr val="accent1">
+              <a:shade val="50000"/>
+            </a:schemeClr>
+          </a:lnRef>
+          <a:fillRef idx="1">
+            <a:schemeClr val="accent1"/>
+          </a:fillRef>
+          <a:effectRef idx="0">
+            <a:schemeClr val="accent1"/>
+          </a:effectRef>
+          <a:fontRef idx="minor">
+            <a:schemeClr val="lt1"/>
+          </a:fontRef>
+        </p:style>
+        <p:txBody>
+          <a:bodyPr rtlCol="0" anchor="ctr"/>
+          <a:lstStyle/>
+          <a:p>
+            <a:pPr algn="ctr"/>
+            <a:endParaRPr lang="zh-TW" altLang="en-US"/>
+          </a:p>
+        </p:txBody>
+      </p:sp>
     </p:spTree>
   </p:cSld>
   <p:clrMapOvr>

</xml_diff>

<commit_message>
1) Delete attribute 2) Filter view
</commit_message>
<xml_diff>
--- a/design/DynamoDB Manager.pptx
+++ b/design/DynamoDB Manager.pptx
@@ -210,7 +210,7 @@
             <a:fld id="{3EFBCEC4-59EF-4924-85C6-6463810B52A1}" type="datetimeFigureOut">
               <a:rPr lang="zh-TW" altLang="en-US" smtClean="0"/>
               <a:pPr/>
-              <a:t>2020/6/28</a:t>
+              <a:t>2020/6/29</a:t>
             </a:fld>
             <a:endParaRPr lang="zh-TW" altLang="en-US"/>
           </a:p>
@@ -1320,7 +1320,7 @@
             <a:fld id="{06EDFE59-1DA3-406F-94B4-33B1A2438A5C}" type="datetimeFigureOut">
               <a:rPr lang="zh-TW" altLang="en-US" smtClean="0"/>
               <a:pPr/>
-              <a:t>2020/6/28</a:t>
+              <a:t>2020/6/29</a:t>
             </a:fld>
             <a:endParaRPr lang="zh-TW" altLang="en-US"/>
           </a:p>
@@ -1487,7 +1487,7 @@
             <a:fld id="{06EDFE59-1DA3-406F-94B4-33B1A2438A5C}" type="datetimeFigureOut">
               <a:rPr lang="zh-TW" altLang="en-US" smtClean="0"/>
               <a:pPr/>
-              <a:t>2020/6/28</a:t>
+              <a:t>2020/6/29</a:t>
             </a:fld>
             <a:endParaRPr lang="zh-TW" altLang="en-US"/>
           </a:p>
@@ -1664,7 +1664,7 @@
             <a:fld id="{06EDFE59-1DA3-406F-94B4-33B1A2438A5C}" type="datetimeFigureOut">
               <a:rPr lang="zh-TW" altLang="en-US" smtClean="0"/>
               <a:pPr/>
-              <a:t>2020/6/28</a:t>
+              <a:t>2020/6/29</a:t>
             </a:fld>
             <a:endParaRPr lang="zh-TW" altLang="en-US"/>
           </a:p>
@@ -1831,7 +1831,7 @@
             <a:fld id="{06EDFE59-1DA3-406F-94B4-33B1A2438A5C}" type="datetimeFigureOut">
               <a:rPr lang="zh-TW" altLang="en-US" smtClean="0"/>
               <a:pPr/>
-              <a:t>2020/6/28</a:t>
+              <a:t>2020/6/29</a:t>
             </a:fld>
             <a:endParaRPr lang="zh-TW" altLang="en-US"/>
           </a:p>
@@ -2074,7 +2074,7 @@
             <a:fld id="{06EDFE59-1DA3-406F-94B4-33B1A2438A5C}" type="datetimeFigureOut">
               <a:rPr lang="zh-TW" altLang="en-US" smtClean="0"/>
               <a:pPr/>
-              <a:t>2020/6/28</a:t>
+              <a:t>2020/6/29</a:t>
             </a:fld>
             <a:endParaRPr lang="zh-TW" altLang="en-US"/>
           </a:p>
@@ -2359,7 +2359,7 @@
             <a:fld id="{06EDFE59-1DA3-406F-94B4-33B1A2438A5C}" type="datetimeFigureOut">
               <a:rPr lang="zh-TW" altLang="en-US" smtClean="0"/>
               <a:pPr/>
-              <a:t>2020/6/28</a:t>
+              <a:t>2020/6/29</a:t>
             </a:fld>
             <a:endParaRPr lang="zh-TW" altLang="en-US"/>
           </a:p>
@@ -2778,7 +2778,7 @@
             <a:fld id="{06EDFE59-1DA3-406F-94B4-33B1A2438A5C}" type="datetimeFigureOut">
               <a:rPr lang="zh-TW" altLang="en-US" smtClean="0"/>
               <a:pPr/>
-              <a:t>2020/6/28</a:t>
+              <a:t>2020/6/29</a:t>
             </a:fld>
             <a:endParaRPr lang="zh-TW" altLang="en-US"/>
           </a:p>
@@ -2893,7 +2893,7 @@
             <a:fld id="{06EDFE59-1DA3-406F-94B4-33B1A2438A5C}" type="datetimeFigureOut">
               <a:rPr lang="zh-TW" altLang="en-US" smtClean="0"/>
               <a:pPr/>
-              <a:t>2020/6/28</a:t>
+              <a:t>2020/6/29</a:t>
             </a:fld>
             <a:endParaRPr lang="zh-TW" altLang="en-US"/>
           </a:p>
@@ -2985,7 +2985,7 @@
             <a:fld id="{06EDFE59-1DA3-406F-94B4-33B1A2438A5C}" type="datetimeFigureOut">
               <a:rPr lang="zh-TW" altLang="en-US" smtClean="0"/>
               <a:pPr/>
-              <a:t>2020/6/28</a:t>
+              <a:t>2020/6/29</a:t>
             </a:fld>
             <a:endParaRPr lang="zh-TW" altLang="en-US"/>
           </a:p>
@@ -3259,7 +3259,7 @@
             <a:fld id="{06EDFE59-1DA3-406F-94B4-33B1A2438A5C}" type="datetimeFigureOut">
               <a:rPr lang="zh-TW" altLang="en-US" smtClean="0"/>
               <a:pPr/>
-              <a:t>2020/6/28</a:t>
+              <a:t>2020/6/29</a:t>
             </a:fld>
             <a:endParaRPr lang="zh-TW" altLang="en-US"/>
           </a:p>
@@ -3509,7 +3509,7 @@
             <a:fld id="{06EDFE59-1DA3-406F-94B4-33B1A2438A5C}" type="datetimeFigureOut">
               <a:rPr lang="zh-TW" altLang="en-US" smtClean="0"/>
               <a:pPr/>
-              <a:t>2020/6/28</a:t>
+              <a:t>2020/6/29</a:t>
             </a:fld>
             <a:endParaRPr lang="zh-TW" altLang="en-US"/>
           </a:p>
@@ -3724,7 +3724,7 @@
             <a:fld id="{06EDFE59-1DA3-406F-94B4-33B1A2438A5C}" type="datetimeFigureOut">
               <a:rPr lang="zh-TW" altLang="en-US" smtClean="0"/>
               <a:pPr/>
-              <a:t>2020/6/28</a:t>
+              <a:t>2020/6/29</a:t>
             </a:fld>
             <a:endParaRPr lang="zh-TW" altLang="en-US"/>
           </a:p>
@@ -13846,7 +13846,7 @@
         </p:nvSpPr>
         <p:spPr>
           <a:xfrm>
-            <a:off x="1857356" y="5115839"/>
+            <a:off x="1857356" y="5401591"/>
             <a:ext cx="5857916" cy="1384995"/>
           </a:xfrm>
           <a:prstGeom prst="rect">
@@ -14519,8 +14519,8 @@
           <p:nvPr/>
         </p:nvGraphicFramePr>
         <p:xfrm>
-          <a:off x="357158" y="2071678"/>
-          <a:ext cx="6096000" cy="2225040"/>
+          <a:off x="357158" y="2000240"/>
+          <a:ext cx="6096000" cy="2595880"/>
         </p:xfrm>
         <a:graphic>
           <a:graphicData uri="http://schemas.openxmlformats.org/drawingml/2006/table">
@@ -14540,11 +14540,28 @@
                     <a:bodyPr/>
                     <a:lstStyle/>
                     <a:p>
+                      <a:pPr marL="0" marR="0" indent="0" algn="l" defTabSz="914400" rtl="0" eaLnBrk="1" fontAlgn="auto" latinLnBrk="0" hangingPunct="1">
+                        <a:lnSpc>
+                          <a:spcPct val="100000"/>
+                        </a:lnSpc>
+                        <a:spcBef>
+                          <a:spcPts val="0"/>
+                        </a:spcBef>
+                        <a:spcAft>
+                          <a:spcPts val="0"/>
+                        </a:spcAft>
+                        <a:buClrTx/>
+                        <a:buSzTx/>
+                        <a:buFontTx/>
+                        <a:buNone/>
+                        <a:tabLst/>
+                        <a:defRPr/>
+                      </a:pPr>
                       <a:r>
                         <a:rPr lang="en-US" altLang="zh-TW" b="1" dirty="0" smtClean="0"/>
                         <a:t>Delete</a:t>
                       </a:r>
-                      <a:endParaRPr lang="zh-TW" altLang="en-US" b="1" dirty="0"/>
+                      <a:endParaRPr lang="zh-TW" altLang="en-US" b="1" dirty="0" smtClean="0"/>
                     </a:p>
                   </a:txBody>
                   <a:tcPr>
@@ -14601,6 +14618,80 @@
                   <a:tcPr>
                     <a:solidFill>
                       <a:schemeClr val="accent2">
+                        <a:lumMod val="40000"/>
+                        <a:lumOff val="60000"/>
+                      </a:schemeClr>
+                    </a:solidFill>
+                  </a:tcPr>
+                </a:tc>
+              </a:tr>
+              <a:tr h="370840">
+                <a:tc>
+                  <a:txBody>
+                    <a:bodyPr/>
+                    <a:lstStyle/>
+                    <a:p>
+                      <a:r>
+                        <a:rPr lang="en-US" altLang="zh-TW" b="1" dirty="0" smtClean="0"/>
+                        <a:t>Filter</a:t>
+                      </a:r>
+                      <a:endParaRPr lang="zh-TW" altLang="en-US" b="1" dirty="0"/>
+                    </a:p>
+                  </a:txBody>
+                  <a:tcPr>
+                    <a:solidFill>
+                      <a:schemeClr val="accent1">
+                        <a:lumMod val="40000"/>
+                        <a:lumOff val="60000"/>
+                      </a:schemeClr>
+                    </a:solidFill>
+                  </a:tcPr>
+                </a:tc>
+                <a:tc>
+                  <a:txBody>
+                    <a:bodyPr/>
+                    <a:lstStyle/>
+                    <a:p>
+                      <a:endParaRPr lang="zh-TW" altLang="en-US" dirty="0"/>
+                    </a:p>
+                  </a:txBody>
+                  <a:tcPr>
+                    <a:solidFill>
+                      <a:schemeClr val="accent1">
+                        <a:lumMod val="40000"/>
+                        <a:lumOff val="60000"/>
+                      </a:schemeClr>
+                    </a:solidFill>
+                  </a:tcPr>
+                </a:tc>
+                <a:tc>
+                  <a:txBody>
+                    <a:bodyPr/>
+                    <a:lstStyle/>
+                    <a:p>
+                      <a:endParaRPr lang="zh-TW" altLang="en-US" dirty="0"/>
+                    </a:p>
+                  </a:txBody>
+                  <a:tcPr>
+                    <a:solidFill>
+                      <a:schemeClr val="accent1">
+                        <a:lumMod val="40000"/>
+                        <a:lumOff val="60000"/>
+                      </a:schemeClr>
+                    </a:solidFill>
+                  </a:tcPr>
+                </a:tc>
+                <a:tc>
+                  <a:txBody>
+                    <a:bodyPr/>
+                    <a:lstStyle/>
+                    <a:p>
+                      <a:endParaRPr lang="zh-TW" altLang="en-US" dirty="0"/>
+                    </a:p>
+                  </a:txBody>
+                  <a:tcPr>
+                    <a:solidFill>
+                      <a:schemeClr val="accent1">
                         <a:lumMod val="40000"/>
                         <a:lumOff val="60000"/>
                       </a:schemeClr>
@@ -14995,7 +15086,7 @@
         </p:nvSpPr>
         <p:spPr>
           <a:xfrm>
-            <a:off x="428596" y="3223439"/>
+            <a:off x="428596" y="3509191"/>
             <a:ext cx="1357322" cy="276999"/>
           </a:xfrm>
           <a:prstGeom prst="rect">
@@ -15043,7 +15134,7 @@
         </p:nvSpPr>
         <p:spPr>
           <a:xfrm>
-            <a:off x="1643042" y="3286124"/>
+            <a:off x="1643042" y="3571876"/>
             <a:ext cx="142876" cy="71438"/>
           </a:xfrm>
           <a:prstGeom prst="flowChartMerge">
@@ -15086,7 +15177,7 @@
         </p:nvSpPr>
         <p:spPr>
           <a:xfrm>
-            <a:off x="214282" y="4330021"/>
+            <a:off x="214282" y="4615773"/>
             <a:ext cx="1671740" cy="923330"/>
           </a:xfrm>
           <a:prstGeom prst="rect">
@@ -15133,7 +15224,7 @@
         </p:nvCxnSpPr>
         <p:spPr>
           <a:xfrm rot="5400000">
-            <a:off x="896087" y="3511627"/>
+            <a:off x="896087" y="3797379"/>
             <a:ext cx="972459" cy="664328"/>
           </a:xfrm>
           <a:prstGeom prst="straightConnector1">
@@ -15166,7 +15257,7 @@
         </p:nvSpPr>
         <p:spPr>
           <a:xfrm>
-            <a:off x="1928794" y="2143116"/>
+            <a:off x="2000232" y="2071678"/>
             <a:ext cx="214314" cy="214314"/>
           </a:xfrm>
           <a:prstGeom prst="rect">
@@ -15218,7 +15309,7 @@
         </p:nvSpPr>
         <p:spPr>
           <a:xfrm>
-            <a:off x="3428992" y="2143116"/>
+            <a:off x="3500430" y="2071678"/>
             <a:ext cx="214314" cy="214314"/>
           </a:xfrm>
           <a:prstGeom prst="rect">
@@ -15270,7 +15361,7 @@
         </p:nvSpPr>
         <p:spPr>
           <a:xfrm>
-            <a:off x="4929190" y="2143116"/>
+            <a:off x="5000628" y="2071678"/>
             <a:ext cx="214314" cy="214314"/>
           </a:xfrm>
           <a:prstGeom prst="rect">
@@ -15314,6 +15405,312 @@
           </a:p>
         </p:txBody>
       </p:sp>
+      <p:grpSp>
+        <p:nvGrpSpPr>
+          <p:cNvPr id="35" name="群組 34"/>
+          <p:cNvGrpSpPr/>
+          <p:nvPr/>
+        </p:nvGrpSpPr>
+        <p:grpSpPr>
+          <a:xfrm>
+            <a:off x="5000628" y="2428868"/>
+            <a:ext cx="1071570" cy="276999"/>
+            <a:chOff x="4500562" y="714356"/>
+            <a:chExt cx="1071570" cy="276999"/>
+          </a:xfrm>
+        </p:grpSpPr>
+        <p:sp>
+          <p:nvSpPr>
+            <p:cNvPr id="25" name="文字方塊 24"/>
+            <p:cNvSpPr txBox="1"/>
+            <p:nvPr/>
+          </p:nvSpPr>
+          <p:spPr>
+            <a:xfrm>
+              <a:off x="4500562" y="714356"/>
+              <a:ext cx="1071570" cy="276999"/>
+            </a:xfrm>
+            <a:prstGeom prst="rect">
+              <a:avLst/>
+            </a:prstGeom>
+            <a:solidFill>
+              <a:schemeClr val="bg1">
+                <a:lumMod val="85000"/>
+              </a:schemeClr>
+            </a:solidFill>
+          </p:spPr>
+          <p:style>
+            <a:lnRef idx="2">
+              <a:schemeClr val="accent1"/>
+            </a:lnRef>
+            <a:fillRef idx="1">
+              <a:schemeClr val="lt1"/>
+            </a:fillRef>
+            <a:effectRef idx="0">
+              <a:schemeClr val="accent1"/>
+            </a:effectRef>
+            <a:fontRef idx="minor">
+              <a:schemeClr val="dk1"/>
+            </a:fontRef>
+          </p:style>
+          <p:txBody>
+            <a:bodyPr wrap="square" rtlCol="0" anchor="ctr">
+              <a:spAutoFit/>
+            </a:bodyPr>
+            <a:lstStyle/>
+            <a:p>
+              <a:endParaRPr lang="zh-TW" altLang="en-US" sz="1200" dirty="0"/>
+            </a:p>
+          </p:txBody>
+        </p:sp>
+        <p:sp>
+          <p:nvSpPr>
+            <p:cNvPr id="26" name="流程圖: 合併 25"/>
+            <p:cNvSpPr/>
+            <p:nvPr/>
+          </p:nvSpPr>
+          <p:spPr>
+            <a:xfrm>
+              <a:off x="5357818" y="857232"/>
+              <a:ext cx="142876" cy="71438"/>
+            </a:xfrm>
+            <a:prstGeom prst="flowChartMerge">
+              <a:avLst/>
+            </a:prstGeom>
+            <a:solidFill>
+              <a:schemeClr val="bg1"/>
+            </a:solidFill>
+          </p:spPr>
+          <p:style>
+            <a:lnRef idx="2">
+              <a:schemeClr val="accent1">
+                <a:shade val="50000"/>
+              </a:schemeClr>
+            </a:lnRef>
+            <a:fillRef idx="1">
+              <a:schemeClr val="accent1"/>
+            </a:fillRef>
+            <a:effectRef idx="0">
+              <a:schemeClr val="accent1"/>
+            </a:effectRef>
+            <a:fontRef idx="minor">
+              <a:schemeClr val="lt1"/>
+            </a:fontRef>
+          </p:style>
+          <p:txBody>
+            <a:bodyPr rtlCol="0" anchor="ctr"/>
+            <a:lstStyle/>
+            <a:p>
+              <a:pPr algn="ctr"/>
+              <a:endParaRPr lang="zh-TW" altLang="en-US" sz="1200"/>
+            </a:p>
+          </p:txBody>
+        </p:sp>
+      </p:grpSp>
+      <p:grpSp>
+        <p:nvGrpSpPr>
+          <p:cNvPr id="36" name="群組 35"/>
+          <p:cNvGrpSpPr/>
+          <p:nvPr/>
+        </p:nvGrpSpPr>
+        <p:grpSpPr>
+          <a:xfrm>
+            <a:off x="1928794" y="2428868"/>
+            <a:ext cx="1071570" cy="276999"/>
+            <a:chOff x="4500562" y="714356"/>
+            <a:chExt cx="1071570" cy="276999"/>
+          </a:xfrm>
+        </p:grpSpPr>
+        <p:sp>
+          <p:nvSpPr>
+            <p:cNvPr id="38" name="文字方塊 37"/>
+            <p:cNvSpPr txBox="1"/>
+            <p:nvPr/>
+          </p:nvSpPr>
+          <p:spPr>
+            <a:xfrm>
+              <a:off x="4500562" y="714356"/>
+              <a:ext cx="1071570" cy="276999"/>
+            </a:xfrm>
+            <a:prstGeom prst="rect">
+              <a:avLst/>
+            </a:prstGeom>
+            <a:solidFill>
+              <a:schemeClr val="bg1">
+                <a:lumMod val="85000"/>
+              </a:schemeClr>
+            </a:solidFill>
+          </p:spPr>
+          <p:style>
+            <a:lnRef idx="2">
+              <a:schemeClr val="accent1"/>
+            </a:lnRef>
+            <a:fillRef idx="1">
+              <a:schemeClr val="lt1"/>
+            </a:fillRef>
+            <a:effectRef idx="0">
+              <a:schemeClr val="accent1"/>
+            </a:effectRef>
+            <a:fontRef idx="minor">
+              <a:schemeClr val="dk1"/>
+            </a:fontRef>
+          </p:style>
+          <p:txBody>
+            <a:bodyPr wrap="square" rtlCol="0" anchor="ctr">
+              <a:spAutoFit/>
+            </a:bodyPr>
+            <a:lstStyle/>
+            <a:p>
+              <a:endParaRPr lang="zh-TW" altLang="en-US" sz="1200" dirty="0"/>
+            </a:p>
+          </p:txBody>
+        </p:sp>
+        <p:sp>
+          <p:nvSpPr>
+            <p:cNvPr id="39" name="流程圖: 合併 38"/>
+            <p:cNvSpPr/>
+            <p:nvPr/>
+          </p:nvSpPr>
+          <p:spPr>
+            <a:xfrm>
+              <a:off x="5357818" y="857232"/>
+              <a:ext cx="142876" cy="71438"/>
+            </a:xfrm>
+            <a:prstGeom prst="flowChartMerge">
+              <a:avLst/>
+            </a:prstGeom>
+            <a:solidFill>
+              <a:schemeClr val="bg1"/>
+            </a:solidFill>
+          </p:spPr>
+          <p:style>
+            <a:lnRef idx="2">
+              <a:schemeClr val="accent1">
+                <a:shade val="50000"/>
+              </a:schemeClr>
+            </a:lnRef>
+            <a:fillRef idx="1">
+              <a:schemeClr val="accent1"/>
+            </a:fillRef>
+            <a:effectRef idx="0">
+              <a:schemeClr val="accent1"/>
+            </a:effectRef>
+            <a:fontRef idx="minor">
+              <a:schemeClr val="lt1"/>
+            </a:fontRef>
+          </p:style>
+          <p:txBody>
+            <a:bodyPr rtlCol="0" anchor="ctr"/>
+            <a:lstStyle/>
+            <a:p>
+              <a:pPr algn="ctr"/>
+              <a:endParaRPr lang="zh-TW" altLang="en-US" sz="1200"/>
+            </a:p>
+          </p:txBody>
+        </p:sp>
+      </p:grpSp>
+      <p:grpSp>
+        <p:nvGrpSpPr>
+          <p:cNvPr id="41" name="群組 40"/>
+          <p:cNvGrpSpPr/>
+          <p:nvPr/>
+        </p:nvGrpSpPr>
+        <p:grpSpPr>
+          <a:xfrm>
+            <a:off x="3428992" y="2428868"/>
+            <a:ext cx="1071570" cy="276999"/>
+            <a:chOff x="4500562" y="714356"/>
+            <a:chExt cx="1071570" cy="276999"/>
+          </a:xfrm>
+        </p:grpSpPr>
+        <p:sp>
+          <p:nvSpPr>
+            <p:cNvPr id="42" name="文字方塊 41"/>
+            <p:cNvSpPr txBox="1"/>
+            <p:nvPr/>
+          </p:nvSpPr>
+          <p:spPr>
+            <a:xfrm>
+              <a:off x="4500562" y="714356"/>
+              <a:ext cx="1071570" cy="276999"/>
+            </a:xfrm>
+            <a:prstGeom prst="rect">
+              <a:avLst/>
+            </a:prstGeom>
+            <a:solidFill>
+              <a:schemeClr val="bg1">
+                <a:lumMod val="85000"/>
+              </a:schemeClr>
+            </a:solidFill>
+          </p:spPr>
+          <p:style>
+            <a:lnRef idx="2">
+              <a:schemeClr val="accent1"/>
+            </a:lnRef>
+            <a:fillRef idx="1">
+              <a:schemeClr val="lt1"/>
+            </a:fillRef>
+            <a:effectRef idx="0">
+              <a:schemeClr val="accent1"/>
+            </a:effectRef>
+            <a:fontRef idx="minor">
+              <a:schemeClr val="dk1"/>
+            </a:fontRef>
+          </p:style>
+          <p:txBody>
+            <a:bodyPr wrap="square" rtlCol="0" anchor="ctr">
+              <a:spAutoFit/>
+            </a:bodyPr>
+            <a:lstStyle/>
+            <a:p>
+              <a:endParaRPr lang="zh-TW" altLang="en-US" sz="1200" dirty="0"/>
+            </a:p>
+          </p:txBody>
+        </p:sp>
+        <p:sp>
+          <p:nvSpPr>
+            <p:cNvPr id="43" name="流程圖: 合併 42"/>
+            <p:cNvSpPr/>
+            <p:nvPr/>
+          </p:nvSpPr>
+          <p:spPr>
+            <a:xfrm>
+              <a:off x="5357818" y="857232"/>
+              <a:ext cx="142876" cy="71438"/>
+            </a:xfrm>
+            <a:prstGeom prst="flowChartMerge">
+              <a:avLst/>
+            </a:prstGeom>
+            <a:solidFill>
+              <a:schemeClr val="bg1"/>
+            </a:solidFill>
+          </p:spPr>
+          <p:style>
+            <a:lnRef idx="2">
+              <a:schemeClr val="accent1">
+                <a:shade val="50000"/>
+              </a:schemeClr>
+            </a:lnRef>
+            <a:fillRef idx="1">
+              <a:schemeClr val="accent1"/>
+            </a:fillRef>
+            <a:effectRef idx="0">
+              <a:schemeClr val="accent1"/>
+            </a:effectRef>
+            <a:fontRef idx="minor">
+              <a:schemeClr val="lt1"/>
+            </a:fontRef>
+          </p:style>
+          <p:txBody>
+            <a:bodyPr rtlCol="0" anchor="ctr"/>
+            <a:lstStyle/>
+            <a:p>
+              <a:pPr algn="ctr"/>
+              <a:endParaRPr lang="zh-TW" altLang="en-US" sz="1200"/>
+            </a:p>
+          </p:txBody>
+        </p:sp>
+      </p:grpSp>
     </p:spTree>
   </p:cSld>
   <p:clrMapOvr>

</xml_diff>